<commit_message>
[Review] A survey of current trends in computational drug 160706
</commit_message>
<xml_diff>
--- a/Review/[2] A Survey Off Current Trends In Computational Drug/A survey of current trends in computational drug.pptx
+++ b/Review/[2] A Survey Off Current Trends In Computational Drug/A survey of current trends in computational drug.pptx
@@ -8,6 +8,16 @@
     <p:sldId id="256" r:id="rId2"/>
     <p:sldId id="257" r:id="rId3"/>
     <p:sldId id="258" r:id="rId4"/>
+    <p:sldId id="266" r:id="rId5"/>
+    <p:sldId id="267" r:id="rId6"/>
+    <p:sldId id="259" r:id="rId7"/>
+    <p:sldId id="268" r:id="rId8"/>
+    <p:sldId id="260" r:id="rId9"/>
+    <p:sldId id="269" r:id="rId10"/>
+    <p:sldId id="261" r:id="rId11"/>
+    <p:sldId id="262" r:id="rId12"/>
+    <p:sldId id="265" r:id="rId13"/>
+    <p:sldId id="264" r:id="rId14"/>
   </p:sldIdLst>
   <p:sldSz cx="12192000" cy="6858000"/>
   <p:notesSz cx="6858000" cy="9144000"/>
@@ -3137,6 +3147,628 @@
   <p:clrMapOvr>
     <a:masterClrMapping/>
   </p:clrMapOvr>
+  <p:timing>
+    <p:tnLst>
+      <p:par>
+        <p:cTn id="1" dur="indefinite" restart="never" nodeType="tmRoot"/>
+      </p:par>
+    </p:tnLst>
+  </p:timing>
+</p:sld>
+</file>
+
+<file path=ppt/slides/slide10.xml><?xml version="1.0" encoding="utf-8"?>
+<p:sld xmlns:a="http://schemas.openxmlformats.org/drawingml/2006/main" xmlns:r="http://schemas.openxmlformats.org/officeDocument/2006/relationships" xmlns:p="http://schemas.openxmlformats.org/presentationml/2006/main">
+  <p:cSld>
+    <p:spTree>
+      <p:nvGrpSpPr>
+        <p:cNvPr id="1" name=""/>
+        <p:cNvGrpSpPr/>
+        <p:nvPr/>
+      </p:nvGrpSpPr>
+      <p:grpSpPr>
+        <a:xfrm>
+          <a:off x="0" y="0"/>
+          <a:ext cx="0" cy="0"/>
+          <a:chOff x="0" y="0"/>
+          <a:chExt cx="0" cy="0"/>
+        </a:xfrm>
+      </p:grpSpPr>
+      <p:sp>
+        <p:nvSpPr>
+          <p:cNvPr id="2" name="제목 1"/>
+          <p:cNvSpPr>
+            <a:spLocks noGrp="1"/>
+          </p:cNvSpPr>
+          <p:nvPr>
+            <p:ph type="title"/>
+          </p:nvPr>
+        </p:nvSpPr>
+        <p:spPr/>
+        <p:txBody>
+          <a:bodyPr/>
+          <a:lstStyle/>
+          <a:p>
+            <a:r>
+              <a:rPr lang="en-US" altLang="ko-KR" dirty="0" smtClean="0"/>
+              <a:t>Validation for computational drug repositioning</a:t>
+            </a:r>
+            <a:endParaRPr lang="ko-KR" altLang="en-US" dirty="0"/>
+          </a:p>
+        </p:txBody>
+      </p:sp>
+      <p:sp>
+        <p:nvSpPr>
+          <p:cNvPr id="3" name="내용 개체 틀 2"/>
+          <p:cNvSpPr>
+            <a:spLocks noGrp="1"/>
+          </p:cNvSpPr>
+          <p:nvPr>
+            <p:ph idx="1"/>
+          </p:nvPr>
+        </p:nvSpPr>
+        <p:spPr/>
+        <p:txBody>
+          <a:bodyPr>
+            <a:normAutofit fontScale="92500"/>
+          </a:bodyPr>
+          <a:lstStyle/>
+          <a:p>
+            <a:pPr marL="0" indent="0">
+              <a:buNone/>
+            </a:pPr>
+            <a:r>
+              <a:rPr lang="en-US" altLang="ko-KR" dirty="0" smtClean="0"/>
+              <a:t>Computational models often predict a handful interesting hits;</a:t>
+            </a:r>
+          </a:p>
+          <a:p>
+            <a:pPr marL="0" indent="0">
+              <a:buNone/>
+            </a:pPr>
+            <a:r>
+              <a:rPr lang="en-US" altLang="ko-KR" dirty="0" smtClean="0"/>
+              <a:t>however, the ultimate goal of drug repositioning is to move only</a:t>
+            </a:r>
+          </a:p>
+          <a:p>
+            <a:pPr marL="0" indent="0">
+              <a:buNone/>
+            </a:pPr>
+            <a:r>
+              <a:rPr lang="en-US" altLang="ko-KR" dirty="0" smtClean="0"/>
+              <a:t>one or two hits into clinical application to benefit patients.</a:t>
+            </a:r>
+          </a:p>
+          <a:p>
+            <a:pPr marL="0" indent="0">
+              <a:buNone/>
+            </a:pPr>
+            <a:r>
+              <a:rPr lang="en-US" altLang="ko-KR" dirty="0" smtClean="0"/>
+              <a:t>Therefore, experimental validation of these computer-generated</a:t>
+            </a:r>
+          </a:p>
+          <a:p>
+            <a:pPr marL="0" indent="0">
+              <a:buNone/>
+            </a:pPr>
+            <a:r>
+              <a:rPr lang="en-US" altLang="ko-KR" dirty="0" smtClean="0"/>
+              <a:t>hits becomes important. Despite some known limitations,</a:t>
+            </a:r>
+          </a:p>
+          <a:p>
+            <a:pPr marL="0" indent="0">
+              <a:buNone/>
+            </a:pPr>
+            <a:r>
+              <a:rPr lang="en-US" altLang="ko-KR" dirty="0" smtClean="0"/>
+              <a:t>in vitro and in vivo models (e.g. cell-based targeted assays</a:t>
+            </a:r>
+          </a:p>
+          <a:p>
+            <a:pPr marL="0" indent="0">
+              <a:buNone/>
+            </a:pPr>
+            <a:r>
+              <a:rPr lang="en-US" altLang="ko-KR" dirty="0" smtClean="0"/>
+              <a:t>and mouse models) have been increasingly used to validate the</a:t>
+            </a:r>
+          </a:p>
+          <a:p>
+            <a:pPr marL="0" indent="0">
+              <a:buNone/>
+            </a:pPr>
+            <a:r>
+              <a:rPr lang="en-US" altLang="ko-KR" dirty="0" smtClean="0"/>
+              <a:t>candidate hits for preclinical drug evaluation.</a:t>
+            </a:r>
+            <a:endParaRPr lang="ko-KR" altLang="en-US" dirty="0"/>
+          </a:p>
+        </p:txBody>
+      </p:sp>
+    </p:spTree>
+    <p:extLst>
+      <p:ext uri="{BB962C8B-B14F-4D97-AF65-F5344CB8AC3E}">
+        <p14:creationId xmlns:p14="http://schemas.microsoft.com/office/powerpoint/2010/main" val="3908017773"/>
+      </p:ext>
+    </p:extLst>
+  </p:cSld>
+  <p:clrMapOvr>
+    <a:masterClrMapping/>
+  </p:clrMapOvr>
+  <p:timing>
+    <p:tnLst>
+      <p:par>
+        <p:cTn id="1" dur="indefinite" restart="never" nodeType="tmRoot"/>
+      </p:par>
+    </p:tnLst>
+  </p:timing>
+</p:sld>
+</file>
+
+<file path=ppt/slides/slide11.xml><?xml version="1.0" encoding="utf-8"?>
+<p:sld xmlns:a="http://schemas.openxmlformats.org/drawingml/2006/main" xmlns:r="http://schemas.openxmlformats.org/officeDocument/2006/relationships" xmlns:p="http://schemas.openxmlformats.org/presentationml/2006/main">
+  <p:cSld>
+    <p:spTree>
+      <p:nvGrpSpPr>
+        <p:cNvPr id="1" name=""/>
+        <p:cNvGrpSpPr/>
+        <p:nvPr/>
+      </p:nvGrpSpPr>
+      <p:grpSpPr>
+        <a:xfrm>
+          <a:off x="0" y="0"/>
+          <a:ext cx="0" cy="0"/>
+          <a:chOff x="0" y="0"/>
+          <a:chExt cx="0" cy="0"/>
+        </a:xfrm>
+      </p:grpSpPr>
+      <p:sp>
+        <p:nvSpPr>
+          <p:cNvPr id="2" name="제목 1"/>
+          <p:cNvSpPr>
+            <a:spLocks noGrp="1"/>
+          </p:cNvSpPr>
+          <p:nvPr>
+            <p:ph type="title"/>
+          </p:nvPr>
+        </p:nvSpPr>
+        <p:spPr/>
+        <p:txBody>
+          <a:bodyPr/>
+          <a:lstStyle/>
+          <a:p>
+            <a:r>
+              <a:rPr lang="en-US" altLang="ko-KR" dirty="0" smtClean="0"/>
+              <a:t>Validation for computational drug repositioning</a:t>
+            </a:r>
+            <a:endParaRPr lang="ko-KR" altLang="en-US" dirty="0"/>
+          </a:p>
+        </p:txBody>
+      </p:sp>
+      <p:sp>
+        <p:nvSpPr>
+          <p:cNvPr id="3" name="내용 개체 틀 2"/>
+          <p:cNvSpPr>
+            <a:spLocks noGrp="1"/>
+          </p:cNvSpPr>
+          <p:nvPr>
+            <p:ph idx="1"/>
+          </p:nvPr>
+        </p:nvSpPr>
+        <p:spPr/>
+        <p:txBody>
+          <a:bodyPr>
+            <a:normAutofit lnSpcReduction="10000"/>
+          </a:bodyPr>
+          <a:lstStyle/>
+          <a:p>
+            <a:pPr marL="514350" indent="-514350">
+              <a:buFont typeface="+mj-lt"/>
+              <a:buAutoNum type="arabicPeriod"/>
+            </a:pPr>
+            <a:r>
+              <a:rPr lang="en-US" altLang="ko-KR" dirty="0" err="1" smtClean="0"/>
+              <a:t>Zerbini</a:t>
+            </a:r>
+            <a:r>
+              <a:rPr lang="en-US" altLang="ko-KR" dirty="0" smtClean="0"/>
+              <a:t> et al</a:t>
+            </a:r>
+          </a:p>
+          <a:p>
+            <a:pPr marL="457200" lvl="1" indent="0">
+              <a:buNone/>
+            </a:pPr>
+            <a:r>
+              <a:rPr lang="en-US" altLang="ko-KR" dirty="0" err="1" smtClean="0"/>
+              <a:t>Zerbini</a:t>
+            </a:r>
+            <a:r>
+              <a:rPr lang="en-US" altLang="ko-KR" dirty="0" smtClean="0"/>
+              <a:t> identified several FDA-approved drugs showed</a:t>
+            </a:r>
+          </a:p>
+          <a:p>
+            <a:pPr marL="457200" lvl="1" indent="0">
+              <a:buNone/>
+            </a:pPr>
+            <a:r>
+              <a:rPr lang="en-US" altLang="ko-KR" dirty="0" smtClean="0"/>
+              <a:t>sensitivity for clear cell renal cell carcinoma (</a:t>
+            </a:r>
+            <a:r>
+              <a:rPr lang="en-US" altLang="ko-KR" dirty="0" err="1" smtClean="0"/>
+              <a:t>ccRCC</a:t>
+            </a:r>
+            <a:r>
+              <a:rPr lang="en-US" altLang="ko-KR" dirty="0" smtClean="0"/>
+              <a:t>). To confirm</a:t>
+            </a:r>
+          </a:p>
+          <a:p>
+            <a:pPr marL="457200" lvl="1" indent="0">
+              <a:buNone/>
+            </a:pPr>
+            <a:r>
+              <a:rPr lang="en-US" altLang="ko-KR" dirty="0" smtClean="0"/>
+              <a:t>the drug efficacy, they further used apoptosis assays and </a:t>
+            </a:r>
+            <a:r>
+              <a:rPr lang="en-US" altLang="ko-KR" dirty="0" err="1" smtClean="0"/>
+              <a:t>xenograft</a:t>
+            </a:r>
+            <a:endParaRPr lang="en-US" altLang="ko-KR" dirty="0" smtClean="0"/>
+          </a:p>
+          <a:p>
+            <a:pPr marL="457200" lvl="1" indent="0">
+              <a:buNone/>
+            </a:pPr>
+            <a:r>
+              <a:rPr lang="en-US" altLang="ko-KR" dirty="0" smtClean="0"/>
+              <a:t>mouse models and demonstrated </a:t>
+            </a:r>
+            <a:r>
+              <a:rPr lang="en-US" altLang="ko-KR" dirty="0" err="1" smtClean="0"/>
+              <a:t>pentamidine</a:t>
+            </a:r>
+            <a:r>
+              <a:rPr lang="en-US" altLang="ko-KR" dirty="0" smtClean="0"/>
+              <a:t> as a potential</a:t>
+            </a:r>
+          </a:p>
+          <a:p>
+            <a:pPr marL="457200" lvl="1" indent="0">
+              <a:buNone/>
+            </a:pPr>
+            <a:r>
+              <a:rPr lang="en-US" altLang="ko-KR" dirty="0" smtClean="0"/>
+              <a:t>therapeutic agent for </a:t>
+            </a:r>
+            <a:r>
+              <a:rPr lang="en-US" altLang="ko-KR" dirty="0" err="1" smtClean="0"/>
+              <a:t>ccRCC</a:t>
+            </a:r>
+            <a:r>
+              <a:rPr lang="en-US" altLang="ko-KR" dirty="0" smtClean="0"/>
+              <a:t>, as it can significantly induce</a:t>
+            </a:r>
+          </a:p>
+          <a:p>
+            <a:pPr marL="457200" lvl="1" indent="0">
+              <a:buNone/>
+            </a:pPr>
+            <a:r>
+              <a:rPr lang="en-US" altLang="ko-KR" dirty="0" smtClean="0"/>
+              <a:t>apoptosis in tumor cells and slow tumor growth. </a:t>
+            </a:r>
+          </a:p>
+          <a:p>
+            <a:pPr marL="514350" indent="-514350">
+              <a:buFont typeface="+mj-lt"/>
+              <a:buAutoNum type="arabicPeriod"/>
+            </a:pPr>
+            <a:r>
+              <a:rPr lang="en-US" altLang="ko-KR" dirty="0" smtClean="0"/>
+              <a:t>Kang et al</a:t>
+            </a:r>
+          </a:p>
+          <a:p>
+            <a:pPr marL="514350" indent="-514350">
+              <a:buFont typeface="+mj-lt"/>
+              <a:buAutoNum type="arabicPeriod"/>
+            </a:pPr>
+            <a:r>
+              <a:rPr lang="en-US" altLang="ko-KR" dirty="0" err="1" smtClean="0"/>
+              <a:t>Vegner</a:t>
+            </a:r>
+            <a:r>
+              <a:rPr lang="en-US" altLang="ko-KR" dirty="0" smtClean="0"/>
+              <a:t> et al</a:t>
+            </a:r>
+          </a:p>
+          <a:p>
+            <a:pPr marL="514350" indent="-514350">
+              <a:buFont typeface="+mj-lt"/>
+              <a:buAutoNum type="arabicPeriod"/>
+            </a:pPr>
+            <a:r>
+              <a:rPr lang="en-US" altLang="ko-KR" dirty="0" smtClean="0"/>
+              <a:t>Khatri el al</a:t>
+            </a:r>
+          </a:p>
+          <a:p>
+            <a:pPr marL="0" indent="0">
+              <a:buNone/>
+            </a:pPr>
+            <a:endParaRPr lang="ko-KR" altLang="en-US" dirty="0"/>
+          </a:p>
+        </p:txBody>
+      </p:sp>
+    </p:spTree>
+    <p:extLst>
+      <p:ext uri="{BB962C8B-B14F-4D97-AF65-F5344CB8AC3E}">
+        <p14:creationId xmlns:p14="http://schemas.microsoft.com/office/powerpoint/2010/main" val="3821969656"/>
+      </p:ext>
+    </p:extLst>
+  </p:cSld>
+  <p:clrMapOvr>
+    <a:masterClrMapping/>
+  </p:clrMapOvr>
+  <p:timing>
+    <p:tnLst>
+      <p:par>
+        <p:cTn id="1" dur="indefinite" restart="never" nodeType="tmRoot"/>
+      </p:par>
+    </p:tnLst>
+  </p:timing>
+</p:sld>
+</file>
+
+<file path=ppt/slides/slide12.xml><?xml version="1.0" encoding="utf-8"?>
+<p:sld xmlns:a="http://schemas.openxmlformats.org/drawingml/2006/main" xmlns:r="http://schemas.openxmlformats.org/officeDocument/2006/relationships" xmlns:p="http://schemas.openxmlformats.org/presentationml/2006/main">
+  <p:cSld>
+    <p:spTree>
+      <p:nvGrpSpPr>
+        <p:cNvPr id="1" name=""/>
+        <p:cNvGrpSpPr/>
+        <p:nvPr/>
+      </p:nvGrpSpPr>
+      <p:grpSpPr>
+        <a:xfrm>
+          <a:off x="0" y="0"/>
+          <a:ext cx="0" cy="0"/>
+          <a:chOff x="0" y="0"/>
+          <a:chExt cx="0" cy="0"/>
+        </a:xfrm>
+      </p:grpSpPr>
+      <p:sp>
+        <p:nvSpPr>
+          <p:cNvPr id="2" name="제목 1"/>
+          <p:cNvSpPr>
+            <a:spLocks noGrp="1"/>
+          </p:cNvSpPr>
+          <p:nvPr>
+            <p:ph type="title"/>
+          </p:nvPr>
+        </p:nvSpPr>
+        <p:spPr/>
+        <p:txBody>
+          <a:bodyPr/>
+          <a:lstStyle/>
+          <a:p>
+            <a:r>
+              <a:rPr lang="en-US" altLang="ko-KR" dirty="0" smtClean="0"/>
+              <a:t>Validation for computational drug repositioning</a:t>
+            </a:r>
+            <a:endParaRPr lang="ko-KR" altLang="en-US" dirty="0"/>
+          </a:p>
+        </p:txBody>
+      </p:sp>
+      <p:sp>
+        <p:nvSpPr>
+          <p:cNvPr id="3" name="내용 개체 틀 2"/>
+          <p:cNvSpPr>
+            <a:spLocks noGrp="1"/>
+          </p:cNvSpPr>
+          <p:nvPr>
+            <p:ph idx="1"/>
+          </p:nvPr>
+        </p:nvSpPr>
+        <p:spPr/>
+        <p:txBody>
+          <a:bodyPr>
+            <a:normAutofit/>
+          </a:bodyPr>
+          <a:lstStyle/>
+          <a:p>
+            <a:r>
+              <a:rPr lang="en-US" altLang="ko-KR" dirty="0" smtClean="0"/>
+              <a:t>Network-based analysis is used strategy for computational drug repositioning.</a:t>
+            </a:r>
+          </a:p>
+          <a:p>
+            <a:endParaRPr lang="en-US" altLang="ko-KR" dirty="0"/>
+          </a:p>
+          <a:p>
+            <a:r>
+              <a:rPr lang="en-US" altLang="ko-KR" dirty="0" smtClean="0"/>
+              <a:t>Previous studies have suggested that many network are useful in the identification of therapeutic targets of characteristics of drug targets</a:t>
+            </a:r>
+          </a:p>
+          <a:p>
+            <a:r>
+              <a:rPr lang="en-US" altLang="ko-KR" sz="1100" dirty="0" smtClean="0"/>
+              <a:t>drug-target network</a:t>
+            </a:r>
+          </a:p>
+          <a:p>
+            <a:r>
+              <a:rPr lang="en-US" altLang="ko-KR" sz="1100" dirty="0" smtClean="0"/>
+              <a:t>drug-drug network</a:t>
+            </a:r>
+          </a:p>
+          <a:p>
+            <a:r>
+              <a:rPr lang="en-US" altLang="ko-KR" sz="1100" dirty="0" smtClean="0"/>
+              <a:t>drug-disease network</a:t>
+            </a:r>
+          </a:p>
+          <a:p>
+            <a:r>
+              <a:rPr lang="en-US" altLang="ko-KR" sz="1100" dirty="0" smtClean="0"/>
+              <a:t>protein interaction network</a:t>
+            </a:r>
+          </a:p>
+          <a:p>
+            <a:r>
+              <a:rPr lang="en-US" altLang="ko-KR" sz="1100" dirty="0" smtClean="0"/>
+              <a:t>transcriptional networks</a:t>
+            </a:r>
+          </a:p>
+          <a:p>
+            <a:r>
+              <a:rPr lang="en-US" altLang="ko-KR" sz="1100" dirty="0" smtClean="0"/>
+              <a:t>signaling networks </a:t>
+            </a:r>
+            <a:endParaRPr lang="ko-KR" altLang="en-US" sz="1100" dirty="0"/>
+          </a:p>
+        </p:txBody>
+      </p:sp>
+    </p:spTree>
+    <p:extLst>
+      <p:ext uri="{BB962C8B-B14F-4D97-AF65-F5344CB8AC3E}">
+        <p14:creationId xmlns:p14="http://schemas.microsoft.com/office/powerpoint/2010/main" val="1012089453"/>
+      </p:ext>
+    </p:extLst>
+  </p:cSld>
+  <p:clrMapOvr>
+    <a:masterClrMapping/>
+  </p:clrMapOvr>
+  <p:timing>
+    <p:tnLst>
+      <p:par>
+        <p:cTn id="1" dur="indefinite" restart="never" nodeType="tmRoot"/>
+      </p:par>
+    </p:tnLst>
+  </p:timing>
+</p:sld>
+</file>
+
+<file path=ppt/slides/slide13.xml><?xml version="1.0" encoding="utf-8"?>
+<p:sld xmlns:a="http://schemas.openxmlformats.org/drawingml/2006/main" xmlns:r="http://schemas.openxmlformats.org/officeDocument/2006/relationships" xmlns:p="http://schemas.openxmlformats.org/presentationml/2006/main">
+  <p:cSld>
+    <p:spTree>
+      <p:nvGrpSpPr>
+        <p:cNvPr id="1" name=""/>
+        <p:cNvGrpSpPr/>
+        <p:nvPr/>
+      </p:nvGrpSpPr>
+      <p:grpSpPr>
+        <a:xfrm>
+          <a:off x="0" y="0"/>
+          <a:ext cx="0" cy="0"/>
+          <a:chOff x="0" y="0"/>
+          <a:chExt cx="0" cy="0"/>
+        </a:xfrm>
+      </p:grpSpPr>
+      <p:sp>
+        <p:nvSpPr>
+          <p:cNvPr id="2" name="제목 1"/>
+          <p:cNvSpPr>
+            <a:spLocks noGrp="1"/>
+          </p:cNvSpPr>
+          <p:nvPr>
+            <p:ph type="title"/>
+          </p:nvPr>
+        </p:nvSpPr>
+        <p:spPr/>
+        <p:txBody>
+          <a:bodyPr/>
+          <a:lstStyle/>
+          <a:p>
+            <a:r>
+              <a:rPr lang="en-US" altLang="ko-KR" dirty="0" smtClean="0"/>
+              <a:t>Discussion</a:t>
+            </a:r>
+            <a:endParaRPr lang="ko-KR" altLang="en-US" dirty="0"/>
+          </a:p>
+        </p:txBody>
+      </p:sp>
+      <p:sp>
+        <p:nvSpPr>
+          <p:cNvPr id="3" name="내용 개체 틀 2"/>
+          <p:cNvSpPr>
+            <a:spLocks noGrp="1"/>
+          </p:cNvSpPr>
+          <p:nvPr>
+            <p:ph idx="1"/>
+          </p:nvPr>
+        </p:nvSpPr>
+        <p:spPr/>
+        <p:txBody>
+          <a:bodyPr>
+            <a:normAutofit/>
+          </a:bodyPr>
+          <a:lstStyle/>
+          <a:p>
+            <a:pPr marL="0" indent="0">
+              <a:buNone/>
+            </a:pPr>
+            <a:r>
+              <a:rPr lang="en-US" altLang="ko-KR" dirty="0" smtClean="0"/>
+              <a:t>+</a:t>
+            </a:r>
+          </a:p>
+          <a:p>
+            <a:pPr marL="0" indent="0">
+              <a:buNone/>
+            </a:pPr>
+            <a:endParaRPr lang="en-US" altLang="ko-KR" dirty="0"/>
+          </a:p>
+          <a:p>
+            <a:pPr marL="0" indent="0">
+              <a:buNone/>
+            </a:pPr>
+            <a:endParaRPr lang="en-US" altLang="ko-KR" dirty="0" smtClean="0"/>
+          </a:p>
+          <a:p>
+            <a:pPr marL="0" indent="0">
+              <a:buNone/>
+            </a:pPr>
+            <a:endParaRPr lang="en-US" altLang="ko-KR" dirty="0"/>
+          </a:p>
+          <a:p>
+            <a:pPr marL="0" indent="0">
+              <a:buNone/>
+            </a:pPr>
+            <a:r>
+              <a:rPr lang="en-US" altLang="ko-KR" dirty="0" smtClean="0"/>
+              <a:t>-</a:t>
+            </a:r>
+            <a:endParaRPr lang="en-US" altLang="ko-KR" sz="1100" dirty="0" smtClean="0"/>
+          </a:p>
+        </p:txBody>
+      </p:sp>
+    </p:spTree>
+    <p:extLst>
+      <p:ext uri="{BB962C8B-B14F-4D97-AF65-F5344CB8AC3E}">
+        <p14:creationId xmlns:p14="http://schemas.microsoft.com/office/powerpoint/2010/main" val="1091140017"/>
+      </p:ext>
+    </p:extLst>
+  </p:cSld>
+  <p:clrMapOvr>
+    <a:masterClrMapping/>
+  </p:clrMapOvr>
+  <p:timing>
+    <p:tnLst>
+      <p:par>
+        <p:cTn id="1" dur="indefinite" restart="never" nodeType="tmRoot"/>
+      </p:par>
+    </p:tnLst>
+  </p:timing>
 </p:sld>
 </file>
 
@@ -3327,17 +3959,118 @@
           </a:bodyPr>
           <a:lstStyle/>
           <a:p>
-            <a:r>
-              <a:rPr lang="en-US" altLang="ko-KR" dirty="0" smtClean="0"/>
-              <a:t>Network-based analysis is used strategy for computational drug repositioning.</a:t>
-            </a:r>
+            <a:pPr marL="514350" indent="-514350">
+              <a:buFont typeface="+mj-lt"/>
+              <a:buAutoNum type="arabicPeriod"/>
+            </a:pPr>
+            <a:r>
+              <a:rPr lang="en-US" altLang="ko-KR" dirty="0" smtClean="0"/>
+              <a:t>Li et al</a:t>
+            </a:r>
+          </a:p>
+          <a:p>
+            <a:pPr marL="457200" lvl="1" indent="0">
+              <a:buNone/>
+            </a:pPr>
+            <a:r>
+              <a:rPr lang="en-US" altLang="ko-KR" sz="1800" dirty="0" smtClean="0"/>
+              <a:t>Li developed a bipartite drug-target network to identity potential new indications of an existing drug through its relation to similar drugs.</a:t>
+            </a:r>
+          </a:p>
+          <a:p>
+            <a:pPr marL="457200" lvl="1" indent="0">
+              <a:buNone/>
+            </a:pPr>
+            <a:endParaRPr lang="en-US" altLang="ko-KR" sz="1800" dirty="0"/>
+          </a:p>
+          <a:p>
+            <a:pPr marL="457200" lvl="1" indent="0">
+              <a:buNone/>
+            </a:pPr>
+            <a:r>
+              <a:rPr lang="en-US" altLang="ko-KR" sz="1800" dirty="0" smtClean="0"/>
+              <a:t>In the bipartite network model, Drug pair similarity integrated drug chemical structure similarity and common drug targets and their interaction.</a:t>
+            </a:r>
+          </a:p>
+          <a:p>
+            <a:pPr marL="457200" lvl="1" indent="0">
+              <a:buNone/>
+            </a:pPr>
+            <a:endParaRPr lang="en-US" altLang="ko-KR" sz="1800" dirty="0"/>
+          </a:p>
+          <a:p>
+            <a:pPr marL="457200" lvl="1" indent="0">
+              <a:buNone/>
+            </a:pPr>
+            <a:r>
+              <a:rPr lang="en-US" altLang="ko-KR" sz="1800" dirty="0" smtClean="0"/>
+              <a:t>In addition, Li made </a:t>
+            </a:r>
+            <a:r>
+              <a:rPr lang="en-US" altLang="ko-KR" sz="1800" dirty="0" err="1" smtClean="0"/>
+              <a:t>CauseNet</a:t>
+            </a:r>
+            <a:r>
+              <a:rPr lang="en-US" altLang="ko-KR" sz="1800" dirty="0" smtClean="0"/>
+              <a:t> - multilayered pathway of gene, disease and drug target – to identify new therapeutic uses of existing drugs.</a:t>
+            </a:r>
+          </a:p>
+          <a:p>
+            <a:pPr marL="457200" lvl="1" indent="0">
+              <a:buNone/>
+            </a:pPr>
+            <a:endParaRPr lang="en-US" altLang="ko-KR" sz="1800" dirty="0"/>
+          </a:p>
+          <a:p>
+            <a:pPr marL="457200" lvl="1" indent="0">
+              <a:buNone/>
+            </a:pPr>
+            <a:r>
+              <a:rPr lang="en-US" altLang="ko-KR" sz="1800" dirty="0" smtClean="0"/>
+              <a:t>In the causal network, the transition likelihood of each</a:t>
+            </a:r>
+          </a:p>
+          <a:p>
+            <a:pPr marL="457200" lvl="1" indent="0">
+              <a:buNone/>
+            </a:pPr>
+            <a:r>
+              <a:rPr lang="en-US" altLang="ko-KR" sz="1800" dirty="0" smtClean="0"/>
+              <a:t>chain is estimated on the basis of known drug–disease treatment</a:t>
+            </a:r>
+          </a:p>
+          <a:p>
+            <a:pPr marL="457200" lvl="1" indent="0">
+              <a:buNone/>
+            </a:pPr>
+            <a:r>
+              <a:rPr lang="en-US" altLang="ko-KR" sz="1800" dirty="0" smtClean="0"/>
+              <a:t>association.</a:t>
+            </a:r>
+          </a:p>
+          <a:p>
+            <a:pPr marL="457200" lvl="1" indent="0">
+              <a:buNone/>
+            </a:pPr>
+            <a:endParaRPr lang="en-US" altLang="ko-KR" sz="1800" dirty="0"/>
+          </a:p>
+          <a:p>
+            <a:pPr marL="457200" lvl="1" indent="0">
+              <a:buNone/>
+            </a:pPr>
+            <a:endParaRPr lang="en-US" altLang="ko-KR" sz="1800" dirty="0" smtClean="0"/>
+          </a:p>
+          <a:p>
+            <a:pPr marL="457200" lvl="1" indent="0">
+              <a:buNone/>
+            </a:pPr>
+            <a:endParaRPr lang="en-US" altLang="ko-KR" dirty="0"/>
+          </a:p>
+          <a:p>
+            <a:pPr marL="457200" lvl="1" indent="0">
+              <a:buNone/>
+            </a:pPr>
             <a:endParaRPr lang="en-US" altLang="ko-KR" dirty="0" smtClean="0"/>
-          </a:p>
-          <a:p>
-            <a:pPr marL="0" indent="0">
-              <a:buNone/>
-            </a:pPr>
-            <a:endParaRPr lang="ko-KR" altLang="en-US" dirty="0"/>
           </a:p>
         </p:txBody>
       </p:sp>
@@ -3345,6 +4078,724 @@
     <p:extLst>
       <p:ext uri="{BB962C8B-B14F-4D97-AF65-F5344CB8AC3E}">
         <p14:creationId xmlns:p14="http://schemas.microsoft.com/office/powerpoint/2010/main" val="749993611"/>
+      </p:ext>
+    </p:extLst>
+  </p:cSld>
+  <p:clrMapOvr>
+    <a:masterClrMapping/>
+  </p:clrMapOvr>
+  <p:timing>
+    <p:tnLst>
+      <p:par>
+        <p:cTn id="1" dur="indefinite" restart="never" nodeType="tmRoot"/>
+      </p:par>
+    </p:tnLst>
+  </p:timing>
+</p:sld>
+</file>
+
+<file path=ppt/slides/slide4.xml><?xml version="1.0" encoding="utf-8"?>
+<p:sld xmlns:a="http://schemas.openxmlformats.org/drawingml/2006/main" xmlns:r="http://schemas.openxmlformats.org/officeDocument/2006/relationships" xmlns:p="http://schemas.openxmlformats.org/presentationml/2006/main">
+  <p:cSld>
+    <p:spTree>
+      <p:nvGrpSpPr>
+        <p:cNvPr id="1" name=""/>
+        <p:cNvGrpSpPr/>
+        <p:nvPr/>
+      </p:nvGrpSpPr>
+      <p:grpSpPr>
+        <a:xfrm>
+          <a:off x="0" y="0"/>
+          <a:ext cx="0" cy="0"/>
+          <a:chOff x="0" y="0"/>
+          <a:chExt cx="0" cy="0"/>
+        </a:xfrm>
+      </p:grpSpPr>
+      <p:sp>
+        <p:nvSpPr>
+          <p:cNvPr id="2" name="제목 1"/>
+          <p:cNvSpPr>
+            <a:spLocks noGrp="1"/>
+          </p:cNvSpPr>
+          <p:nvPr>
+            <p:ph type="title"/>
+          </p:nvPr>
+        </p:nvSpPr>
+        <p:spPr/>
+        <p:txBody>
+          <a:bodyPr/>
+          <a:lstStyle/>
+          <a:p>
+            <a:r>
+              <a:rPr lang="en-US" altLang="ko-KR" dirty="0" smtClean="0"/>
+              <a:t>Network Analysis</a:t>
+            </a:r>
+            <a:endParaRPr lang="ko-KR" altLang="en-US" dirty="0"/>
+          </a:p>
+        </p:txBody>
+      </p:sp>
+      <p:sp>
+        <p:nvSpPr>
+          <p:cNvPr id="3" name="내용 개체 틀 2"/>
+          <p:cNvSpPr>
+            <a:spLocks noGrp="1"/>
+          </p:cNvSpPr>
+          <p:nvPr>
+            <p:ph idx="1"/>
+          </p:nvPr>
+        </p:nvSpPr>
+        <p:spPr/>
+        <p:txBody>
+          <a:bodyPr>
+            <a:normAutofit/>
+          </a:bodyPr>
+          <a:lstStyle/>
+          <a:p>
+            <a:pPr marL="514350" indent="-514350">
+              <a:buAutoNum type="arabicPeriod" startAt="2"/>
+            </a:pPr>
+            <a:r>
+              <a:rPr lang="en-US" altLang="ko-KR" dirty="0" smtClean="0"/>
+              <a:t>Wu et al</a:t>
+            </a:r>
+            <a:endParaRPr lang="en-US" altLang="ko-KR" dirty="0"/>
+          </a:p>
+          <a:p>
+            <a:pPr marL="457200" lvl="1" indent="0">
+              <a:buNone/>
+            </a:pPr>
+            <a:r>
+              <a:rPr lang="en-US" altLang="ko-KR" sz="1800" dirty="0" smtClean="0"/>
+              <a:t>Wu applied network clustering to a</a:t>
+            </a:r>
+          </a:p>
+          <a:p>
+            <a:pPr marL="457200" lvl="1" indent="0">
+              <a:buNone/>
+            </a:pPr>
+            <a:r>
+              <a:rPr lang="en-US" altLang="ko-KR" sz="1800" dirty="0" smtClean="0"/>
+              <a:t>drug–disease heterogeneous network to identify closely connected</a:t>
+            </a:r>
+          </a:p>
+          <a:p>
+            <a:pPr marL="457200" lvl="1" indent="0">
+              <a:buNone/>
+            </a:pPr>
+            <a:r>
+              <a:rPr lang="en-US" altLang="ko-KR" sz="1800" dirty="0" smtClean="0"/>
+              <a:t>modules of disease and drugs, which can be used for extracting</a:t>
+            </a:r>
+          </a:p>
+          <a:p>
+            <a:pPr marL="457200" lvl="1" indent="0">
+              <a:buNone/>
+            </a:pPr>
+            <a:r>
+              <a:rPr lang="en-US" altLang="ko-KR" sz="1800" dirty="0" smtClean="0"/>
+              <a:t>possible drug–disease pairs for drug repositioning.</a:t>
+            </a:r>
+          </a:p>
+          <a:p>
+            <a:pPr marL="457200" lvl="1" indent="0">
+              <a:buNone/>
+            </a:pPr>
+            <a:endParaRPr lang="en-US" altLang="ko-KR" sz="1800" dirty="0"/>
+          </a:p>
+          <a:p>
+            <a:pPr marL="457200" lvl="1" indent="0">
+              <a:buNone/>
+            </a:pPr>
+            <a:r>
+              <a:rPr lang="en-US" altLang="ko-KR" sz="1800" dirty="0" smtClean="0"/>
+              <a:t>In the network, two nodes (one drug or one disease) with shared</a:t>
+            </a:r>
+          </a:p>
+          <a:p>
+            <a:pPr marL="457200" lvl="1" indent="0">
+              <a:buNone/>
+            </a:pPr>
+            <a:r>
+              <a:rPr lang="en-US" altLang="ko-KR" sz="1800" dirty="0" smtClean="0"/>
+              <a:t>genes/targets and enriched features (biological process, pathway</a:t>
+            </a:r>
+          </a:p>
+          <a:p>
+            <a:pPr marL="457200" lvl="1" indent="0">
+              <a:buNone/>
+            </a:pPr>
+            <a:r>
+              <a:rPr lang="en-US" altLang="ko-KR" sz="1800" dirty="0" smtClean="0"/>
+              <a:t>and phenotypes) were connected and the connection was</a:t>
+            </a:r>
+          </a:p>
+          <a:p>
+            <a:pPr marL="457200" lvl="1" indent="0">
+              <a:buNone/>
+            </a:pPr>
+            <a:r>
+              <a:rPr lang="en-US" altLang="ko-KR" sz="1800" dirty="0" smtClean="0"/>
+              <a:t>weighted by a </a:t>
+            </a:r>
+            <a:r>
+              <a:rPr lang="en-US" altLang="ko-KR" sz="1800" dirty="0" err="1" smtClean="0"/>
+              <a:t>Jaccard</a:t>
+            </a:r>
+            <a:r>
+              <a:rPr lang="en-US" altLang="ko-KR" sz="1800" dirty="0" smtClean="0"/>
+              <a:t> score.</a:t>
+            </a:r>
+          </a:p>
+        </p:txBody>
+      </p:sp>
+    </p:spTree>
+    <p:extLst>
+      <p:ext uri="{BB962C8B-B14F-4D97-AF65-F5344CB8AC3E}">
+        <p14:creationId xmlns:p14="http://schemas.microsoft.com/office/powerpoint/2010/main" val="3915354591"/>
+      </p:ext>
+    </p:extLst>
+  </p:cSld>
+  <p:clrMapOvr>
+    <a:masterClrMapping/>
+  </p:clrMapOvr>
+  <p:timing>
+    <p:tnLst>
+      <p:par>
+        <p:cTn id="1" dur="indefinite" restart="never" nodeType="tmRoot"/>
+      </p:par>
+    </p:tnLst>
+  </p:timing>
+</p:sld>
+</file>
+
+<file path=ppt/slides/slide5.xml><?xml version="1.0" encoding="utf-8"?>
+<p:sld xmlns:a="http://schemas.openxmlformats.org/drawingml/2006/main" xmlns:r="http://schemas.openxmlformats.org/officeDocument/2006/relationships" xmlns:p="http://schemas.openxmlformats.org/presentationml/2006/main">
+  <p:cSld>
+    <p:spTree>
+      <p:nvGrpSpPr>
+        <p:cNvPr id="1" name=""/>
+        <p:cNvGrpSpPr/>
+        <p:nvPr/>
+      </p:nvGrpSpPr>
+      <p:grpSpPr>
+        <a:xfrm>
+          <a:off x="0" y="0"/>
+          <a:ext cx="0" cy="0"/>
+          <a:chOff x="0" y="0"/>
+          <a:chExt cx="0" cy="0"/>
+        </a:xfrm>
+      </p:grpSpPr>
+      <p:sp>
+        <p:nvSpPr>
+          <p:cNvPr id="2" name="제목 1"/>
+          <p:cNvSpPr>
+            <a:spLocks noGrp="1"/>
+          </p:cNvSpPr>
+          <p:nvPr>
+            <p:ph type="title"/>
+          </p:nvPr>
+        </p:nvSpPr>
+        <p:spPr/>
+        <p:txBody>
+          <a:bodyPr/>
+          <a:lstStyle/>
+          <a:p>
+            <a:r>
+              <a:rPr lang="en-US" altLang="ko-KR" dirty="0" smtClean="0"/>
+              <a:t>Network Analysis</a:t>
+            </a:r>
+            <a:endParaRPr lang="ko-KR" altLang="en-US" dirty="0"/>
+          </a:p>
+        </p:txBody>
+      </p:sp>
+      <p:sp>
+        <p:nvSpPr>
+          <p:cNvPr id="3" name="내용 개체 틀 2"/>
+          <p:cNvSpPr>
+            <a:spLocks noGrp="1"/>
+          </p:cNvSpPr>
+          <p:nvPr>
+            <p:ph idx="1"/>
+          </p:nvPr>
+        </p:nvSpPr>
+        <p:spPr/>
+        <p:txBody>
+          <a:bodyPr>
+            <a:normAutofit/>
+          </a:bodyPr>
+          <a:lstStyle/>
+          <a:p>
+            <a:pPr marL="0" indent="0">
+              <a:buNone/>
+            </a:pPr>
+            <a:r>
+              <a:rPr lang="en-US" altLang="ko-KR" dirty="0" smtClean="0"/>
+              <a:t>3.  Jin et al</a:t>
+            </a:r>
+          </a:p>
+          <a:p>
+            <a:pPr marL="0" indent="0">
+              <a:buNone/>
+            </a:pPr>
+            <a:endParaRPr lang="ko-KR" altLang="en-US" dirty="0"/>
+          </a:p>
+        </p:txBody>
+      </p:sp>
+    </p:spTree>
+    <p:extLst>
+      <p:ext uri="{BB962C8B-B14F-4D97-AF65-F5344CB8AC3E}">
+        <p14:creationId xmlns:p14="http://schemas.microsoft.com/office/powerpoint/2010/main" val="2106776271"/>
+      </p:ext>
+    </p:extLst>
+  </p:cSld>
+  <p:clrMapOvr>
+    <a:masterClrMapping/>
+  </p:clrMapOvr>
+  <p:timing>
+    <p:tnLst>
+      <p:par>
+        <p:cTn id="1" dur="indefinite" restart="never" nodeType="tmRoot"/>
+      </p:par>
+    </p:tnLst>
+  </p:timing>
+</p:sld>
+</file>
+
+<file path=ppt/slides/slide6.xml><?xml version="1.0" encoding="utf-8"?>
+<p:sld xmlns:a="http://schemas.openxmlformats.org/drawingml/2006/main" xmlns:r="http://schemas.openxmlformats.org/officeDocument/2006/relationships" xmlns:p="http://schemas.openxmlformats.org/presentationml/2006/main">
+  <p:cSld>
+    <p:spTree>
+      <p:nvGrpSpPr>
+        <p:cNvPr id="1" name=""/>
+        <p:cNvGrpSpPr/>
+        <p:nvPr/>
+      </p:nvGrpSpPr>
+      <p:grpSpPr>
+        <a:xfrm>
+          <a:off x="0" y="0"/>
+          <a:ext cx="0" cy="0"/>
+          <a:chOff x="0" y="0"/>
+          <a:chExt cx="0" cy="0"/>
+        </a:xfrm>
+      </p:grpSpPr>
+      <p:sp>
+        <p:nvSpPr>
+          <p:cNvPr id="2" name="제목 1"/>
+          <p:cNvSpPr>
+            <a:spLocks noGrp="1"/>
+          </p:cNvSpPr>
+          <p:nvPr>
+            <p:ph type="title"/>
+          </p:nvPr>
+        </p:nvSpPr>
+        <p:spPr/>
+        <p:txBody>
+          <a:bodyPr/>
+          <a:lstStyle/>
+          <a:p>
+            <a:r>
+              <a:rPr lang="en-US" altLang="ko-KR" dirty="0" smtClean="0"/>
+              <a:t>Text mining and semantic inference</a:t>
+            </a:r>
+            <a:endParaRPr lang="ko-KR" altLang="en-US" dirty="0"/>
+          </a:p>
+        </p:txBody>
+      </p:sp>
+      <p:sp>
+        <p:nvSpPr>
+          <p:cNvPr id="3" name="내용 개체 틀 2"/>
+          <p:cNvSpPr>
+            <a:spLocks noGrp="1"/>
+          </p:cNvSpPr>
+          <p:nvPr>
+            <p:ph idx="1"/>
+          </p:nvPr>
+        </p:nvSpPr>
+        <p:spPr/>
+        <p:txBody>
+          <a:bodyPr>
+            <a:normAutofit/>
+          </a:bodyPr>
+          <a:lstStyle/>
+          <a:p>
+            <a:endParaRPr lang="ko-KR" altLang="en-US" dirty="0"/>
+          </a:p>
+        </p:txBody>
+      </p:sp>
+    </p:spTree>
+    <p:extLst>
+      <p:ext uri="{BB962C8B-B14F-4D97-AF65-F5344CB8AC3E}">
+        <p14:creationId xmlns:p14="http://schemas.microsoft.com/office/powerpoint/2010/main" val="2060605470"/>
+      </p:ext>
+    </p:extLst>
+  </p:cSld>
+  <p:clrMapOvr>
+    <a:masterClrMapping/>
+  </p:clrMapOvr>
+  <p:timing>
+    <p:tnLst>
+      <p:par>
+        <p:cTn id="1" dur="indefinite" restart="never" nodeType="tmRoot"/>
+      </p:par>
+    </p:tnLst>
+  </p:timing>
+</p:sld>
+</file>
+
+<file path=ppt/slides/slide7.xml><?xml version="1.0" encoding="utf-8"?>
+<p:sld xmlns:a="http://schemas.openxmlformats.org/drawingml/2006/main" xmlns:r="http://schemas.openxmlformats.org/officeDocument/2006/relationships" xmlns:p="http://schemas.openxmlformats.org/presentationml/2006/main">
+  <p:cSld>
+    <p:spTree>
+      <p:nvGrpSpPr>
+        <p:cNvPr id="1" name=""/>
+        <p:cNvGrpSpPr/>
+        <p:nvPr/>
+      </p:nvGrpSpPr>
+      <p:grpSpPr>
+        <a:xfrm>
+          <a:off x="0" y="0"/>
+          <a:ext cx="0" cy="0"/>
+          <a:chOff x="0" y="0"/>
+          <a:chExt cx="0" cy="0"/>
+        </a:xfrm>
+      </p:grpSpPr>
+      <p:sp>
+        <p:nvSpPr>
+          <p:cNvPr id="2" name="제목 1"/>
+          <p:cNvSpPr>
+            <a:spLocks noGrp="1"/>
+          </p:cNvSpPr>
+          <p:nvPr>
+            <p:ph type="title"/>
+          </p:nvPr>
+        </p:nvSpPr>
+        <p:spPr/>
+        <p:txBody>
+          <a:bodyPr/>
+          <a:lstStyle/>
+          <a:p>
+            <a:r>
+              <a:rPr lang="en-US" altLang="ko-KR" dirty="0" smtClean="0"/>
+              <a:t>Text mining and semantic inference</a:t>
+            </a:r>
+            <a:endParaRPr lang="ko-KR" altLang="en-US" dirty="0"/>
+          </a:p>
+        </p:txBody>
+      </p:sp>
+      <p:sp>
+        <p:nvSpPr>
+          <p:cNvPr id="3" name="내용 개체 틀 2"/>
+          <p:cNvSpPr>
+            <a:spLocks noGrp="1"/>
+          </p:cNvSpPr>
+          <p:nvPr>
+            <p:ph idx="1"/>
+          </p:nvPr>
+        </p:nvSpPr>
+        <p:spPr/>
+        <p:txBody>
+          <a:bodyPr>
+            <a:normAutofit/>
+          </a:bodyPr>
+          <a:lstStyle/>
+          <a:p>
+            <a:pPr marL="514350" indent="-514350">
+              <a:buFont typeface="+mj-lt"/>
+              <a:buAutoNum type="arabicPeriod"/>
+            </a:pPr>
+            <a:r>
+              <a:rPr lang="en-US" altLang="ko-KR" dirty="0" err="1" smtClean="0"/>
+              <a:t>Andronis</a:t>
+            </a:r>
+            <a:r>
+              <a:rPr lang="en-US" altLang="ko-KR" dirty="0" smtClean="0"/>
+              <a:t> et al</a:t>
+            </a:r>
+          </a:p>
+          <a:p>
+            <a:pPr marL="457200" lvl="1" indent="0">
+              <a:buNone/>
+            </a:pPr>
+            <a:r>
+              <a:rPr lang="en-US" altLang="ko-KR" dirty="0" smtClean="0"/>
+              <a:t>Study summarized several literature mining approaches and </a:t>
+            </a:r>
+            <a:r>
+              <a:rPr lang="en-US" altLang="ko-KR" dirty="0" err="1" smtClean="0"/>
+              <a:t>soucres</a:t>
+            </a:r>
+            <a:r>
+              <a:rPr lang="en-US" altLang="ko-KR" dirty="0" smtClean="0"/>
+              <a:t> for drug </a:t>
+            </a:r>
+            <a:r>
+              <a:rPr lang="en-US" altLang="ko-KR" dirty="0" err="1" smtClean="0"/>
+              <a:t>repuposing</a:t>
+            </a:r>
+            <a:r>
+              <a:rPr lang="en-US" altLang="ko-KR" dirty="0"/>
+              <a:t>.</a:t>
+            </a:r>
+            <a:endParaRPr lang="en-US" altLang="ko-KR" dirty="0"/>
+          </a:p>
+          <a:p>
+            <a:pPr marL="457200" lvl="1" indent="0">
+              <a:buNone/>
+            </a:pPr>
+            <a:endParaRPr lang="en-US" altLang="ko-KR" dirty="0" smtClean="0"/>
+          </a:p>
+          <a:p>
+            <a:pPr marL="457200" lvl="1" indent="0">
+              <a:buNone/>
+            </a:pPr>
+            <a:r>
+              <a:rPr lang="en-US" altLang="ko-KR" dirty="0" smtClean="0"/>
+              <a:t>if one study finds that disease A was caused by the lack of nutrition B while another study reports that drug C used for another disease was an activator of nutrition B, then drug C</a:t>
+            </a:r>
+          </a:p>
+        </p:txBody>
+      </p:sp>
+    </p:spTree>
+    <p:extLst>
+      <p:ext uri="{BB962C8B-B14F-4D97-AF65-F5344CB8AC3E}">
+        <p14:creationId xmlns:p14="http://schemas.microsoft.com/office/powerpoint/2010/main" val="2512614603"/>
+      </p:ext>
+    </p:extLst>
+  </p:cSld>
+  <p:clrMapOvr>
+    <a:masterClrMapping/>
+  </p:clrMapOvr>
+  <p:timing>
+    <p:tnLst>
+      <p:par>
+        <p:cTn id="1" dur="indefinite" restart="never" nodeType="tmRoot"/>
+      </p:par>
+    </p:tnLst>
+  </p:timing>
+</p:sld>
+</file>
+
+<file path=ppt/slides/slide8.xml><?xml version="1.0" encoding="utf-8"?>
+<p:sld xmlns:a="http://schemas.openxmlformats.org/drawingml/2006/main" xmlns:r="http://schemas.openxmlformats.org/officeDocument/2006/relationships" xmlns:p="http://schemas.openxmlformats.org/presentationml/2006/main">
+  <p:cSld>
+    <p:spTree>
+      <p:nvGrpSpPr>
+        <p:cNvPr id="1" name=""/>
+        <p:cNvGrpSpPr/>
+        <p:nvPr/>
+      </p:nvGrpSpPr>
+      <p:grpSpPr>
+        <a:xfrm>
+          <a:off x="0" y="0"/>
+          <a:ext cx="0" cy="0"/>
+          <a:chOff x="0" y="0"/>
+          <a:chExt cx="0" cy="0"/>
+        </a:xfrm>
+      </p:grpSpPr>
+      <p:sp>
+        <p:nvSpPr>
+          <p:cNvPr id="2" name="제목 1"/>
+          <p:cNvSpPr>
+            <a:spLocks noGrp="1"/>
+          </p:cNvSpPr>
+          <p:nvPr>
+            <p:ph type="title"/>
+          </p:nvPr>
+        </p:nvSpPr>
+        <p:spPr/>
+        <p:txBody>
+          <a:bodyPr/>
+          <a:lstStyle/>
+          <a:p>
+            <a:r>
+              <a:rPr lang="en-US" altLang="ko-KR" dirty="0" smtClean="0"/>
+              <a:t>Text mining and semantic inference</a:t>
+            </a:r>
+            <a:endParaRPr lang="ko-KR" altLang="en-US" dirty="0"/>
+          </a:p>
+        </p:txBody>
+      </p:sp>
+      <p:sp>
+        <p:nvSpPr>
+          <p:cNvPr id="3" name="내용 개체 틀 2"/>
+          <p:cNvSpPr>
+            <a:spLocks noGrp="1"/>
+          </p:cNvSpPr>
+          <p:nvPr>
+            <p:ph idx="1"/>
+          </p:nvPr>
+        </p:nvSpPr>
+        <p:spPr/>
+        <p:txBody>
+          <a:bodyPr>
+            <a:normAutofit/>
+          </a:bodyPr>
+          <a:lstStyle/>
+          <a:p>
+            <a:pPr marL="0" indent="0">
+              <a:buNone/>
+            </a:pPr>
+            <a:r>
+              <a:rPr lang="en-US" altLang="ko-KR" dirty="0"/>
+              <a:t>2</a:t>
+            </a:r>
+            <a:r>
+              <a:rPr lang="en-US" altLang="ko-KR" dirty="0" smtClean="0"/>
+              <a:t>.  Zhu et al</a:t>
+            </a:r>
+          </a:p>
+          <a:p>
+            <a:pPr marL="0" indent="0">
+              <a:buNone/>
+            </a:pPr>
+            <a:r>
+              <a:rPr lang="en-US" altLang="ko-KR" dirty="0" smtClean="0"/>
+              <a:t>	Zhu developed an ontology to model FDA-approved 	breast cancer drugs and their relations with pathways, 	drugs, genes, SNPs and diseases.</a:t>
+            </a:r>
+          </a:p>
+          <a:p>
+            <a:pPr marL="0" indent="0">
+              <a:buNone/>
+            </a:pPr>
+            <a:endParaRPr lang="en-US" altLang="ko-KR" dirty="0"/>
+          </a:p>
+          <a:p>
+            <a:pPr marL="0" indent="0">
+              <a:buNone/>
+            </a:pPr>
+            <a:r>
+              <a:rPr lang="en-US" altLang="ko-KR" dirty="0" smtClean="0"/>
+              <a:t>	Through this ontology, new drug-disease pairs were 	inferred.</a:t>
+            </a:r>
+            <a:endParaRPr lang="ko-KR" altLang="en-US" dirty="0"/>
+          </a:p>
+        </p:txBody>
+      </p:sp>
+    </p:spTree>
+    <p:extLst>
+      <p:ext uri="{BB962C8B-B14F-4D97-AF65-F5344CB8AC3E}">
+        <p14:creationId xmlns:p14="http://schemas.microsoft.com/office/powerpoint/2010/main" val="1670437373"/>
+      </p:ext>
+    </p:extLst>
+  </p:cSld>
+  <p:clrMapOvr>
+    <a:masterClrMapping/>
+  </p:clrMapOvr>
+  <p:timing>
+    <p:tnLst>
+      <p:par>
+        <p:cTn id="1" dur="indefinite" restart="never" nodeType="tmRoot"/>
+      </p:par>
+    </p:tnLst>
+  </p:timing>
+</p:sld>
+</file>
+
+<file path=ppt/slides/slide9.xml><?xml version="1.0" encoding="utf-8"?>
+<p:sld xmlns:a="http://schemas.openxmlformats.org/drawingml/2006/main" xmlns:r="http://schemas.openxmlformats.org/officeDocument/2006/relationships" xmlns:p="http://schemas.openxmlformats.org/presentationml/2006/main">
+  <p:cSld>
+    <p:spTree>
+      <p:nvGrpSpPr>
+        <p:cNvPr id="1" name=""/>
+        <p:cNvGrpSpPr/>
+        <p:nvPr/>
+      </p:nvGrpSpPr>
+      <p:grpSpPr>
+        <a:xfrm>
+          <a:off x="0" y="0"/>
+          <a:ext cx="0" cy="0"/>
+          <a:chOff x="0" y="0"/>
+          <a:chExt cx="0" cy="0"/>
+        </a:xfrm>
+      </p:grpSpPr>
+      <p:sp>
+        <p:nvSpPr>
+          <p:cNvPr id="2" name="제목 1"/>
+          <p:cNvSpPr>
+            <a:spLocks noGrp="1"/>
+          </p:cNvSpPr>
+          <p:nvPr>
+            <p:ph type="title"/>
+          </p:nvPr>
+        </p:nvSpPr>
+        <p:spPr/>
+        <p:txBody>
+          <a:bodyPr/>
+          <a:lstStyle/>
+          <a:p>
+            <a:r>
+              <a:rPr lang="en-US" altLang="ko-KR" dirty="0" smtClean="0"/>
+              <a:t>Text mining and semantic inference</a:t>
+            </a:r>
+            <a:endParaRPr lang="ko-KR" altLang="en-US" dirty="0"/>
+          </a:p>
+        </p:txBody>
+      </p:sp>
+      <p:sp>
+        <p:nvSpPr>
+          <p:cNvPr id="3" name="내용 개체 틀 2"/>
+          <p:cNvSpPr>
+            <a:spLocks noGrp="1"/>
+          </p:cNvSpPr>
+          <p:nvPr>
+            <p:ph idx="1"/>
+          </p:nvPr>
+        </p:nvSpPr>
+        <p:spPr/>
+        <p:txBody>
+          <a:bodyPr>
+            <a:normAutofit fontScale="92500" lnSpcReduction="10000"/>
+          </a:bodyPr>
+          <a:lstStyle/>
+          <a:p>
+            <a:pPr marL="0" indent="0">
+              <a:buNone/>
+            </a:pPr>
+            <a:r>
+              <a:rPr lang="en-US" altLang="ko-KR" dirty="0" smtClean="0"/>
+              <a:t>3.  Chen et al</a:t>
+            </a:r>
+          </a:p>
+          <a:p>
+            <a:pPr marL="0" indent="0">
+              <a:buNone/>
+            </a:pPr>
+            <a:r>
+              <a:rPr lang="en-US" altLang="ko-KR" dirty="0" smtClean="0"/>
+              <a:t>	Chen developed a statistical model to assess drug-target 	associations from a semantic linked network comprised 	by drugs, chemical compounds, protein targets, diseases, 	side effects and pathways and their relations.</a:t>
+            </a:r>
+          </a:p>
+          <a:p>
+            <a:pPr marL="0" indent="0">
+              <a:buNone/>
+            </a:pPr>
+            <a:endParaRPr lang="en-US" altLang="ko-KR" dirty="0"/>
+          </a:p>
+          <a:p>
+            <a:pPr marL="0" indent="0">
+              <a:buNone/>
+            </a:pPr>
+            <a:r>
+              <a:rPr lang="en-US" altLang="ko-KR" dirty="0" smtClean="0"/>
+              <a:t>	The model considered the topology and semantics of the sub-graph between a</a:t>
+            </a:r>
+          </a:p>
+          <a:p>
+            <a:pPr marL="0" indent="0">
+              <a:buNone/>
+            </a:pPr>
+            <a:r>
+              <a:rPr lang="en-US" altLang="ko-KR" dirty="0" smtClean="0"/>
+              <a:t>	drug and a target. The similar drug–drug pair from different 	disease areas may indicate a potential repositioning 	opportunity.</a:t>
+            </a:r>
+            <a:endParaRPr lang="ko-KR" altLang="en-US" dirty="0"/>
+          </a:p>
+        </p:txBody>
+      </p:sp>
+    </p:spTree>
+    <p:extLst>
+      <p:ext uri="{BB962C8B-B14F-4D97-AF65-F5344CB8AC3E}">
+        <p14:creationId xmlns:p14="http://schemas.microsoft.com/office/powerpoint/2010/main" val="3572417565"/>
       </p:ext>
     </p:extLst>
   </p:cSld>

</xml_diff>

<commit_message>
[Publication Review] Literature mining, ontologies and information visualization for drug repurposing
</commit_message>
<xml_diff>
--- a/Review/[2] A Survey Off Current Trends In Computational Drug/A survey of current trends in computational drug.pptx
+++ b/Review/[2] A Survey Off Current Trends In Computational Drug/A survey of current trends in computational drug.pptx
@@ -120,6 +120,22 @@
       </a:defRPr>
     </a:lvl9pPr>
   </p:defaultTextStyle>
+  <p:extLst>
+    <p:ext uri="{EFAFB233-063F-42B5-8137-9DF3F51BA10A}">
+      <p15:sldGuideLst xmlns:p15="http://schemas.microsoft.com/office/powerpoint/2012/main">
+        <p15:guide id="1" orient="horz" pos="2160">
+          <p15:clr>
+            <a:srgbClr val="A4A3A4"/>
+          </p15:clr>
+        </p15:guide>
+        <p15:guide id="2" pos="3840">
+          <p15:clr>
+            <a:srgbClr val="A4A3A4"/>
+          </p15:clr>
+        </p15:guide>
+      </p15:sldGuideLst>
+    </p:ext>
+  </p:extLst>
 </p:presentation>
 </file>
 
@@ -517,62 +533,7 @@
           <a:bodyPr/>
           <a:lstStyle/>
           <a:p>
-            <a:r>
-              <a:rPr lang="ko-KR" altLang="en-US" dirty="0" smtClean="0"/>
-              <a:t>대량의 데이터를 처리할 수 있는 기술과 </a:t>
-            </a:r>
-            <a:r>
-              <a:rPr lang="en-US" altLang="ko-KR" dirty="0" smtClean="0"/>
-              <a:t>bioinformatics</a:t>
-            </a:r>
-            <a:r>
-              <a:rPr lang="en-US" altLang="ko-KR" baseline="0" dirty="0" smtClean="0"/>
-              <a:t> </a:t>
-            </a:r>
-            <a:r>
-              <a:rPr lang="ko-KR" altLang="en-US" baseline="0" dirty="0" err="1" smtClean="0"/>
-              <a:t>메소드의</a:t>
-            </a:r>
-            <a:r>
-              <a:rPr lang="ko-KR" altLang="en-US" baseline="0" dirty="0" smtClean="0"/>
-              <a:t> 발전과 함께</a:t>
-            </a:r>
-            <a:endParaRPr lang="en-US" altLang="ko-KR" baseline="0" dirty="0" smtClean="0"/>
-          </a:p>
-          <a:p>
-            <a:r>
-              <a:rPr lang="en-US" altLang="ko-KR" baseline="0" dirty="0" smtClean="0"/>
-              <a:t>Biological </a:t>
-            </a:r>
-            <a:r>
-              <a:rPr lang="ko-KR" altLang="en-US" baseline="0" dirty="0" smtClean="0"/>
-              <a:t>시스템에서의 분자 상호는 네트워크에 의해 그려질 수 있다</a:t>
-            </a:r>
-            <a:r>
-              <a:rPr lang="en-US" altLang="ko-KR" baseline="0" dirty="0" smtClean="0"/>
-              <a:t>.</a:t>
-            </a:r>
-          </a:p>
-          <a:p>
-            <a:endParaRPr lang="en-US" altLang="ko-KR" baseline="0" dirty="0" smtClean="0"/>
-          </a:p>
-          <a:p>
-            <a:r>
-              <a:rPr lang="ko-KR" altLang="en-US" baseline="0" dirty="0" smtClean="0"/>
-              <a:t>이전 연구들을 통해 많은 네트워크가 치료하기 위한 </a:t>
-            </a:r>
-            <a:r>
-              <a:rPr lang="ko-KR" altLang="en-US" baseline="0" dirty="0" err="1" smtClean="0"/>
-              <a:t>타겟의</a:t>
-            </a:r>
-            <a:r>
-              <a:rPr lang="ko-KR" altLang="en-US" baseline="0" dirty="0" smtClean="0"/>
-              <a:t> 식별에서 많은 네트워크들이 유용하다고 하다</a:t>
-            </a:r>
-            <a:r>
-              <a:rPr lang="en-US" altLang="ko-KR" baseline="0" dirty="0" smtClean="0"/>
-              <a:t>.</a:t>
-            </a:r>
+            <a:endParaRPr lang="ko-KR" altLang="en-US" dirty="0"/>
           </a:p>
         </p:txBody>
       </p:sp>
@@ -593,7 +554,7 @@
           <a:p>
             <a:fld id="{CDFAA85D-13B5-4E8D-B933-74E9D559D487}" type="slidenum">
               <a:rPr lang="ko-KR" altLang="en-US" smtClean="0"/>
-              <a:t>2</a:t>
+              <a:t>1</a:t>
             </a:fld>
             <a:endParaRPr lang="ko-KR" altLang="en-US"/>
           </a:p>
@@ -602,7 +563,7 @@
     </p:spTree>
     <p:extLst>
       <p:ext uri="{BB962C8B-B14F-4D97-AF65-F5344CB8AC3E}">
-        <p14:creationId xmlns:p14="http://schemas.microsoft.com/office/powerpoint/2010/main" val="103948362"/>
+        <p14:creationId xmlns:p14="http://schemas.microsoft.com/office/powerpoint/2010/main" val="781409542"/>
       </p:ext>
     </p:extLst>
   </p:cSld>
@@ -657,62 +618,36 @@
           <a:lstStyle/>
           <a:p>
             <a:r>
-              <a:rPr lang="en-US" altLang="ko-KR" dirty="0" smtClean="0"/>
-              <a:t>Viability : </a:t>
+              <a:rPr lang="en-US" altLang="ko-KR" dirty="0" err="1" smtClean="0"/>
+              <a:t>Zerbini</a:t>
             </a:r>
             <a:r>
               <a:rPr lang="ko-KR" altLang="en-US" dirty="0" smtClean="0"/>
-              <a:t>생존 능력</a:t>
-            </a:r>
-            <a:endParaRPr lang="en-US" altLang="ko-KR" dirty="0" smtClean="0"/>
-          </a:p>
-          <a:p>
+              <a:t>는 </a:t>
+            </a:r>
+            <a:r>
+              <a:rPr lang="en-US" altLang="ko-KR" dirty="0" smtClean="0"/>
+              <a:t>FDA</a:t>
+            </a:r>
             <a:r>
               <a:rPr lang="ko-KR" altLang="en-US" dirty="0" smtClean="0"/>
-              <a:t>한번 읽고</a:t>
-            </a:r>
-            <a:endParaRPr lang="en-US" altLang="ko-KR" dirty="0" smtClean="0"/>
-          </a:p>
-          <a:p>
-            <a:r>
-              <a:rPr lang="en-US" altLang="ko-KR" dirty="0" smtClean="0"/>
-              <a:t>Computational search</a:t>
+              <a:t>에 승인된 몇몇 약들이 </a:t>
+            </a:r>
+            <a:r>
+              <a:rPr lang="en-US" altLang="ko-KR" dirty="0" err="1" smtClean="0"/>
+              <a:t>ccRCC</a:t>
+            </a:r>
+            <a:r>
+              <a:rPr lang="en-US" altLang="ko-KR" dirty="0" smtClean="0"/>
+              <a:t>,</a:t>
             </a:r>
             <a:r>
               <a:rPr lang="en-US" altLang="ko-KR" baseline="0" dirty="0" smtClean="0"/>
               <a:t> </a:t>
             </a:r>
             <a:r>
-              <a:rPr lang="en-US" altLang="ko-KR" dirty="0" smtClean="0"/>
-              <a:t>algorithm</a:t>
-            </a:r>
-            <a:r>
-              <a:rPr lang="ko-KR" altLang="en-US" dirty="0" smtClean="0"/>
-              <a:t>을 통해 </a:t>
-            </a:r>
-            <a:r>
-              <a:rPr lang="ko-KR" altLang="en-US" baseline="0" dirty="0" smtClean="0"/>
-              <a:t>만들어진 </a:t>
-            </a:r>
-            <a:r>
-              <a:rPr lang="en-US" altLang="ko-KR" dirty="0" smtClean="0"/>
-              <a:t>Drug</a:t>
-            </a:r>
-            <a:r>
-              <a:rPr lang="en-US" altLang="ko-KR" baseline="0" dirty="0" smtClean="0"/>
-              <a:t> combinations </a:t>
-            </a:r>
-            <a:r>
-              <a:rPr lang="ko-KR" altLang="en-US" baseline="0" dirty="0" smtClean="0"/>
-              <a:t>을 검증하기 위해 생존 능력 </a:t>
-            </a:r>
-            <a:r>
-              <a:rPr lang="en-US" altLang="ko-KR" baseline="0" dirty="0" smtClean="0"/>
-              <a:t>assays</a:t>
-            </a:r>
-            <a:r>
-              <a:rPr lang="ko-KR" altLang="en-US" baseline="0" dirty="0" smtClean="0"/>
-              <a:t>를 사용했다</a:t>
+              <a:rPr lang="ko-KR" altLang="en-US" baseline="0" dirty="0" smtClean="0"/>
+              <a:t>신장암세포에 민감한 것을 발견했습니다</a:t>
             </a:r>
             <a:r>
               <a:rPr lang="en-US" altLang="ko-KR" baseline="0" dirty="0" smtClean="0"/>
@@ -720,26 +655,98 @@
             </a:r>
           </a:p>
           <a:p>
-            <a:endParaRPr lang="en-US" altLang="ko-KR" dirty="0" smtClean="0"/>
-          </a:p>
-          <a:p>
-            <a:r>
-              <a:rPr lang="ko-KR" altLang="en-US" dirty="0" smtClean="0"/>
-              <a:t>그 결과 암 세포 안에서 죽이는 높은 효율의 </a:t>
-            </a:r>
-            <a:r>
-              <a:rPr lang="en-US" altLang="ko-KR" dirty="0" smtClean="0"/>
-              <a:t>Drug combinations</a:t>
-            </a:r>
-            <a:r>
-              <a:rPr lang="ko-KR" altLang="en-US" baseline="0" dirty="0" smtClean="0"/>
-              <a:t>가 발견되었다</a:t>
+            <a:r>
+              <a:rPr lang="ko-KR" altLang="en-US" baseline="0" dirty="0" smtClean="0"/>
+              <a:t>이 약의 효과를 증명하기 위해</a:t>
+            </a:r>
+            <a:r>
+              <a:rPr lang="en-US" altLang="ko-KR" baseline="0" dirty="0" smtClean="0"/>
+              <a:t>, </a:t>
+            </a:r>
+            <a:r>
+              <a:rPr lang="ko-KR" altLang="en-US" baseline="0" dirty="0" smtClean="0"/>
+              <a:t>세포자살에 관한 에세이와</a:t>
+            </a:r>
+            <a:r>
+              <a:rPr lang="en-US" altLang="ko-KR" baseline="0" dirty="0" smtClean="0"/>
+              <a:t>, </a:t>
+            </a:r>
+            <a:r>
+              <a:rPr lang="ko-KR" altLang="en-US" baseline="0" dirty="0" smtClean="0"/>
+              <a:t>이종이식 </a:t>
+            </a:r>
+            <a:r>
+              <a:rPr lang="en-US" altLang="ko-KR" baseline="0" dirty="0" smtClean="0"/>
+              <a:t>mouse models</a:t>
+            </a:r>
+            <a:r>
+              <a:rPr lang="ko-KR" altLang="en-US" baseline="0" dirty="0" smtClean="0"/>
+              <a:t>를 사용하였고</a:t>
+            </a:r>
+            <a:r>
+              <a:rPr lang="en-US" altLang="ko-KR" baseline="0" dirty="0" smtClean="0"/>
+              <a:t>,</a:t>
+            </a:r>
+          </a:p>
+          <a:p>
+            <a:r>
+              <a:rPr lang="en-US" altLang="ko-KR" baseline="0" dirty="0" err="1" smtClean="0"/>
+              <a:t>Pentamidine</a:t>
+            </a:r>
+            <a:r>
+              <a:rPr lang="ko-KR" altLang="en-US" baseline="0" dirty="0" smtClean="0"/>
+              <a:t>이 </a:t>
+            </a:r>
+            <a:r>
+              <a:rPr lang="en-US" altLang="ko-KR" baseline="0" dirty="0" err="1" smtClean="0"/>
+              <a:t>ccRCC</a:t>
+            </a:r>
+            <a:r>
+              <a:rPr lang="ko-KR" altLang="en-US" baseline="0" dirty="0" smtClean="0"/>
+              <a:t>에 대해 잠재적 치료 </a:t>
+            </a:r>
+            <a:r>
+              <a:rPr lang="en-US" altLang="ko-KR" baseline="0" dirty="0" smtClean="0"/>
+              <a:t>agent </a:t>
+            </a:r>
+            <a:r>
+              <a:rPr lang="ko-KR" altLang="en-US" baseline="0" dirty="0" smtClean="0"/>
+              <a:t>임을 보였습니다</a:t>
             </a:r>
             <a:r>
               <a:rPr lang="en-US" altLang="ko-KR" baseline="0" dirty="0" smtClean="0"/>
               <a:t>.</a:t>
             </a:r>
-            <a:endParaRPr lang="ko-KR" altLang="en-US" dirty="0"/>
+          </a:p>
+          <a:p>
+            <a:r>
+              <a:rPr lang="en-US" altLang="ko-KR" baseline="0" dirty="0" err="1" smtClean="0"/>
+              <a:t>Pentamidine</a:t>
+            </a:r>
+            <a:r>
+              <a:rPr lang="ko-KR" altLang="en-US" baseline="0" dirty="0" smtClean="0"/>
+              <a:t>은 </a:t>
+            </a:r>
+            <a:r>
+              <a:rPr lang="en-US" altLang="ko-KR" baseline="0" dirty="0" err="1" smtClean="0"/>
+              <a:t>ccRCC</a:t>
+            </a:r>
+            <a:r>
+              <a:rPr lang="ko-KR" altLang="en-US" baseline="0" dirty="0" smtClean="0"/>
+              <a:t>의 종양을 세포 자살로 유도하고</a:t>
+            </a:r>
+            <a:r>
+              <a:rPr lang="en-US" altLang="ko-KR" baseline="0" dirty="0" smtClean="0"/>
+              <a:t>, </a:t>
+            </a:r>
+            <a:r>
+              <a:rPr lang="ko-KR" altLang="en-US" baseline="0" dirty="0" smtClean="0"/>
+              <a:t>종양의 성장을 늦춘다고 한다</a:t>
+            </a:r>
+            <a:r>
+              <a:rPr lang="en-US" altLang="ko-KR" baseline="0" dirty="0" smtClean="0"/>
+              <a:t>.</a:t>
+            </a:r>
           </a:p>
         </p:txBody>
       </p:sp>
@@ -760,7 +767,7 @@
           <a:p>
             <a:fld id="{CDFAA85D-13B5-4E8D-B933-74E9D559D487}" type="slidenum">
               <a:rPr lang="ko-KR" altLang="en-US" smtClean="0"/>
-              <a:t>11</a:t>
+              <a:t>10</a:t>
             </a:fld>
             <a:endParaRPr lang="ko-KR" altLang="en-US"/>
           </a:p>
@@ -769,7 +776,7 @@
     </p:spTree>
     <p:extLst>
       <p:ext uri="{BB962C8B-B14F-4D97-AF65-F5344CB8AC3E}">
-        <p14:creationId xmlns:p14="http://schemas.microsoft.com/office/powerpoint/2010/main" val="739925934"/>
+        <p14:creationId xmlns:p14="http://schemas.microsoft.com/office/powerpoint/2010/main" val="1433889537"/>
       </p:ext>
     </p:extLst>
   </p:cSld>
@@ -825,72 +832,87 @@
           <a:p>
             <a:r>
               <a:rPr lang="en-US" altLang="ko-KR" dirty="0" smtClean="0"/>
-              <a:t>22</a:t>
+              <a:t>Viability : </a:t>
             </a:r>
             <a:r>
               <a:rPr lang="ko-KR" altLang="en-US" dirty="0" smtClean="0"/>
-              <a:t>년에 걸친 신장 이식 환자 </a:t>
-            </a:r>
-            <a:r>
-              <a:rPr lang="en-US" altLang="ko-KR" dirty="0" smtClean="0"/>
-              <a:t>2515</a:t>
-            </a:r>
+              <a:t>생존 능력</a:t>
+            </a:r>
+            <a:endParaRPr lang="en-US" altLang="ko-KR" dirty="0" smtClean="0"/>
+          </a:p>
+          <a:p>
             <a:r>
               <a:rPr lang="ko-KR" altLang="en-US" dirty="0" smtClean="0"/>
-              <a:t>명의 </a:t>
-            </a:r>
-            <a:r>
-              <a:rPr lang="en-US" altLang="ko-KR" dirty="0" smtClean="0"/>
-              <a:t>EMRs</a:t>
+              <a:t>한번 읽고</a:t>
+            </a:r>
+            <a:endParaRPr lang="en-US" altLang="ko-KR" dirty="0" smtClean="0"/>
+          </a:p>
+          <a:p>
+            <a:r>
+              <a:rPr lang="en-US" altLang="ko-KR" dirty="0" smtClean="0"/>
+              <a:t>Computational search</a:t>
+            </a:r>
+            <a:r>
+              <a:rPr lang="en-US" altLang="ko-KR" baseline="0" dirty="0" smtClean="0"/>
+              <a:t> </a:t>
+            </a:r>
+            <a:r>
+              <a:rPr lang="en-US" altLang="ko-KR" dirty="0" smtClean="0"/>
+              <a:t>algorithm</a:t>
             </a:r>
             <a:r>
               <a:rPr lang="ko-KR" altLang="en-US" dirty="0" smtClean="0"/>
-              <a:t>을 분석하여</a:t>
-            </a:r>
-            <a:r>
-              <a:rPr lang="en-US" altLang="ko-KR" dirty="0" smtClean="0"/>
-              <a:t>,</a:t>
-            </a:r>
-          </a:p>
-          <a:p>
-            <a:r>
-              <a:rPr lang="en-US" altLang="ko-KR" dirty="0" smtClean="0"/>
-              <a:t>Atorvastatin</a:t>
-            </a:r>
-            <a:r>
-              <a:rPr lang="ko-KR" altLang="en-US" baseline="0" dirty="0" smtClean="0"/>
-              <a:t> 이 장기 이식의 새로운 치료법임을 발견했으며</a:t>
-            </a:r>
-            <a:r>
-              <a:rPr lang="en-US" altLang="ko-KR" baseline="0" dirty="0" smtClean="0"/>
-              <a:t>,</a:t>
-            </a:r>
-          </a:p>
-          <a:p>
-            <a:r>
-              <a:rPr lang="ko-KR" altLang="en-US" baseline="0" dirty="0" smtClean="0"/>
-              <a:t>이식 </a:t>
-            </a:r>
-            <a:r>
-              <a:rPr lang="ko-KR" altLang="en-US" baseline="0" dirty="0" err="1" smtClean="0"/>
-              <a:t>생존률</a:t>
-            </a:r>
-            <a:r>
-              <a:rPr lang="ko-KR" altLang="en-US" baseline="0" dirty="0" smtClean="0"/>
-              <a:t> 에서의 </a:t>
-            </a:r>
-            <a:r>
-              <a:rPr lang="en-US" altLang="ko-KR" baseline="0" dirty="0" smtClean="0"/>
-              <a:t>beneficial effect</a:t>
-            </a:r>
-            <a:r>
-              <a:rPr lang="ko-KR" altLang="en-US" baseline="0" dirty="0" smtClean="0"/>
-              <a:t>를 검증했다고 한다</a:t>
+              <a:t>을 통해 </a:t>
+            </a:r>
+            <a:r>
+              <a:rPr lang="ko-KR" altLang="en-US" baseline="0" dirty="0" smtClean="0"/>
+              <a:t>만들어진 </a:t>
+            </a:r>
+            <a:r>
+              <a:rPr lang="en-US" altLang="ko-KR" dirty="0" smtClean="0"/>
+              <a:t>Drug</a:t>
+            </a:r>
+            <a:r>
+              <a:rPr lang="en-US" altLang="ko-KR" baseline="0" dirty="0" smtClean="0"/>
+              <a:t> combinations </a:t>
+            </a:r>
+            <a:r>
+              <a:rPr lang="ko-KR" altLang="en-US" baseline="0" dirty="0" smtClean="0"/>
+              <a:t>을 검증하기 위해 생존 능력 </a:t>
+            </a:r>
+            <a:r>
+              <a:rPr lang="en-US" altLang="ko-KR" baseline="0" dirty="0" smtClean="0"/>
+              <a:t>assays</a:t>
+            </a:r>
+            <a:r>
+              <a:rPr lang="ko-KR" altLang="en-US" baseline="0" dirty="0" smtClean="0"/>
+              <a:t>를 사용했다</a:t>
             </a:r>
             <a:r>
               <a:rPr lang="en-US" altLang="ko-KR" baseline="0" dirty="0" smtClean="0"/>
               <a:t>.</a:t>
             </a:r>
+          </a:p>
+          <a:p>
+            <a:endParaRPr lang="en-US" altLang="ko-KR" dirty="0" smtClean="0"/>
+          </a:p>
+          <a:p>
+            <a:r>
+              <a:rPr lang="ko-KR" altLang="en-US" dirty="0" smtClean="0"/>
+              <a:t>그 결과 암 세포 안에서 죽이는 높은 효율의 </a:t>
+            </a:r>
+            <a:r>
+              <a:rPr lang="en-US" altLang="ko-KR" dirty="0" smtClean="0"/>
+              <a:t>Drug combinations</a:t>
+            </a:r>
+            <a:r>
+              <a:rPr lang="ko-KR" altLang="en-US" baseline="0" dirty="0" smtClean="0"/>
+              <a:t>가 발견되었다</a:t>
+            </a:r>
+            <a:r>
+              <a:rPr lang="en-US" altLang="ko-KR" baseline="0" dirty="0" smtClean="0"/>
+              <a:t>.</a:t>
+            </a:r>
             <a:endParaRPr lang="ko-KR" altLang="en-US" dirty="0"/>
           </a:p>
         </p:txBody>
@@ -912,7 +934,7 @@
           <a:p>
             <a:fld id="{CDFAA85D-13B5-4E8D-B933-74E9D559D487}" type="slidenum">
               <a:rPr lang="ko-KR" altLang="en-US" smtClean="0"/>
-              <a:t>12</a:t>
+              <a:t>11</a:t>
             </a:fld>
             <a:endParaRPr lang="ko-KR" altLang="en-US"/>
           </a:p>
@@ -921,7 +943,7 @@
     </p:spTree>
     <p:extLst>
       <p:ext uri="{BB962C8B-B14F-4D97-AF65-F5344CB8AC3E}">
-        <p14:creationId xmlns:p14="http://schemas.microsoft.com/office/powerpoint/2010/main" val="293717136"/>
+        <p14:creationId xmlns:p14="http://schemas.microsoft.com/office/powerpoint/2010/main" val="739925934"/>
       </p:ext>
     </p:extLst>
   </p:cSld>
@@ -976,16 +998,68 @@
           <a:lstStyle/>
           <a:p>
             <a:r>
-              <a:rPr lang="ko-KR" altLang="en-US" baseline="0" dirty="0" smtClean="0"/>
-              <a:t>많은 </a:t>
+              <a:rPr lang="en-US" altLang="ko-KR" dirty="0" smtClean="0"/>
+              <a:t>22</a:t>
+            </a:r>
+            <a:r>
+              <a:rPr lang="ko-KR" altLang="en-US" dirty="0" smtClean="0"/>
+              <a:t>년에 걸친 신장 이식 환자 </a:t>
+            </a:r>
+            <a:r>
+              <a:rPr lang="en-US" altLang="ko-KR" dirty="0" smtClean="0"/>
+              <a:t>2515</a:t>
+            </a:r>
+            <a:r>
+              <a:rPr lang="ko-KR" altLang="en-US" dirty="0" smtClean="0"/>
+              <a:t>명의 </a:t>
+            </a:r>
+            <a:r>
+              <a:rPr lang="en-US" altLang="ko-KR" dirty="0" smtClean="0"/>
+              <a:t>EMRs</a:t>
+            </a:r>
+            <a:r>
+              <a:rPr lang="ko-KR" altLang="en-US" dirty="0" smtClean="0"/>
+              <a:t>을 분석하여</a:t>
+            </a:r>
+            <a:r>
+              <a:rPr lang="en-US" altLang="ko-KR" dirty="0" smtClean="0"/>
+              <a:t>,</a:t>
+            </a:r>
+          </a:p>
+          <a:p>
+            <a:r>
+              <a:rPr lang="en-US" altLang="ko-KR" dirty="0" smtClean="0"/>
+              <a:t>Atorvastatin</a:t>
+            </a:r>
+            <a:r>
+              <a:rPr lang="ko-KR" altLang="en-US" baseline="0" dirty="0" smtClean="0"/>
+              <a:t> 이 장기 이식의 새로운 치료법임을 발견했으며</a:t>
+            </a:r>
+            <a:r>
+              <a:rPr lang="en-US" altLang="ko-KR" baseline="0" dirty="0" smtClean="0"/>
+              <a:t>,</a:t>
+            </a:r>
+          </a:p>
+          <a:p>
+            <a:r>
+              <a:rPr lang="ko-KR" altLang="en-US" baseline="0" dirty="0" smtClean="0"/>
+              <a:t>이식 </a:t>
             </a:r>
             <a:r>
               <a:rPr lang="ko-KR" altLang="en-US" baseline="0" dirty="0" err="1" smtClean="0"/>
-              <a:t>논란점이</a:t>
-            </a:r>
-            <a:r>
-              <a:rPr lang="ko-KR" altLang="en-US" baseline="0" dirty="0" smtClean="0"/>
-              <a:t> 존재한다</a:t>
+              <a:t>생존률</a:t>
+            </a:r>
+            <a:r>
+              <a:rPr lang="ko-KR" altLang="en-US" baseline="0" dirty="0" smtClean="0"/>
+              <a:t> 에서의 </a:t>
+            </a:r>
+            <a:r>
+              <a:rPr lang="en-US" altLang="ko-KR" baseline="0" dirty="0" smtClean="0"/>
+              <a:t>beneficial effect</a:t>
+            </a:r>
+            <a:r>
+              <a:rPr lang="ko-KR" altLang="en-US" baseline="0" dirty="0" smtClean="0"/>
+              <a:t>를 검증했다고 한다</a:t>
             </a:r>
             <a:r>
               <a:rPr lang="en-US" altLang="ko-KR" baseline="0" dirty="0" smtClean="0"/>
@@ -993,80 +1067,22 @@
             </a:r>
           </a:p>
           <a:p>
-            <a:r>
-              <a:rPr lang="ko-KR" altLang="en-US" baseline="0" dirty="0" smtClean="0"/>
-              <a:t>영어 한번 읽기</a:t>
-            </a:r>
             <a:endParaRPr lang="en-US" altLang="ko-KR" baseline="0" dirty="0" smtClean="0"/>
           </a:p>
           <a:p>
             <a:r>
-              <a:rPr lang="en-US" altLang="ko-KR" baseline="0" dirty="0" smtClean="0"/>
-              <a:t>drug chemical structures, drug side-effects</a:t>
-            </a:r>
-            <a:r>
-              <a:rPr lang="ko-KR" altLang="en-US" baseline="0" dirty="0" smtClean="0"/>
-              <a:t>와 같은 것을 포함하는 </a:t>
-            </a:r>
-            <a:r>
-              <a:rPr lang="ko-KR" altLang="en-US" dirty="0" smtClean="0"/>
-              <a:t>통합된 </a:t>
+              <a:rPr lang="en-US" altLang="ko-KR" dirty="0" smtClean="0"/>
+              <a:t>	1.an oral drug that is effective in lowering triglycerides (</a:t>
             </a:r>
             <a:r>
               <a:rPr lang="ko-KR" altLang="en-US" dirty="0" err="1" smtClean="0"/>
-              <a:t>메소드는</a:t>
-            </a:r>
-            <a:r>
-              <a:rPr lang="ko-KR" altLang="en-US" dirty="0" smtClean="0"/>
-              <a:t> 각각의 </a:t>
-            </a:r>
-            <a:r>
-              <a:rPr lang="ko-KR" altLang="en-US" dirty="0" err="1" smtClean="0"/>
-              <a:t>메소드와</a:t>
-            </a:r>
-            <a:r>
-              <a:rPr lang="ko-KR" altLang="en-US" dirty="0" smtClean="0"/>
-              <a:t> </a:t>
-            </a:r>
-            <a:r>
-              <a:rPr lang="ko-KR" altLang="en-US" dirty="0" err="1" smtClean="0"/>
-              <a:t>비교했을때</a:t>
-            </a:r>
-            <a:r>
-              <a:rPr lang="en-US" altLang="ko-KR" dirty="0" smtClean="0"/>
-              <a:t>, </a:t>
-            </a:r>
-            <a:r>
-              <a:rPr lang="ko-KR" altLang="en-US" dirty="0" smtClean="0"/>
-              <a:t>민감성과 </a:t>
-            </a:r>
-            <a:r>
-              <a:rPr lang="ko-KR" altLang="en-US" dirty="0" err="1" smtClean="0"/>
-              <a:t>특이성면에서</a:t>
-            </a:r>
-            <a:r>
-              <a:rPr lang="ko-KR" altLang="en-US" dirty="0" smtClean="0"/>
-              <a:t> 더 나은 </a:t>
-            </a:r>
-            <a:r>
-              <a:rPr lang="ko-KR" altLang="en-US" dirty="0" err="1" smtClean="0"/>
-              <a:t>퍼포먼스를</a:t>
-            </a:r>
-            <a:r>
-              <a:rPr lang="ko-KR" altLang="en-US" dirty="0" smtClean="0"/>
-              <a:t> 보여준다고 한다</a:t>
-            </a:r>
-            <a:r>
-              <a:rPr lang="en-US" altLang="ko-KR" dirty="0" smtClean="0"/>
-              <a:t>.</a:t>
-            </a:r>
-          </a:p>
-          <a:p>
-            <a:r>
-              <a:rPr lang="ko-KR" altLang="en-US" dirty="0" smtClean="0"/>
-              <a:t>하지만 단점도 존재한다</a:t>
-            </a:r>
-            <a:endParaRPr lang="en-US" altLang="ko-KR" dirty="0" smtClean="0"/>
+              <a:t>트리글리세리드</a:t>
+            </a:r>
+            <a:r>
+              <a:rPr lang="en-US" altLang="ko-KR" dirty="0" smtClean="0"/>
+              <a:t>)</a:t>
+            </a:r>
+            <a:endParaRPr lang="ko-KR" altLang="en-US" dirty="0"/>
           </a:p>
         </p:txBody>
       </p:sp>
@@ -1087,7 +1103,7 @@
           <a:p>
             <a:fld id="{CDFAA85D-13B5-4E8D-B933-74E9D559D487}" type="slidenum">
               <a:rPr lang="ko-KR" altLang="en-US" smtClean="0"/>
-              <a:t>13</a:t>
+              <a:t>12</a:t>
             </a:fld>
             <a:endParaRPr lang="ko-KR" altLang="en-US"/>
           </a:p>
@@ -1096,7 +1112,7 @@
     </p:spTree>
     <p:extLst>
       <p:ext uri="{BB962C8B-B14F-4D97-AF65-F5344CB8AC3E}">
-        <p14:creationId xmlns:p14="http://schemas.microsoft.com/office/powerpoint/2010/main" val="3886842590"/>
+        <p14:creationId xmlns:p14="http://schemas.microsoft.com/office/powerpoint/2010/main" val="293717136"/>
       </p:ext>
     </p:extLst>
   </p:cSld>
@@ -1151,6 +1167,190 @@
           <a:lstStyle/>
           <a:p>
             <a:r>
+              <a:rPr lang="ko-KR" altLang="en-US" baseline="0" dirty="0" smtClean="0"/>
+              <a:t>많은 </a:t>
+            </a:r>
+            <a:r>
+              <a:rPr lang="ko-KR" altLang="en-US" baseline="0" dirty="0" err="1" smtClean="0"/>
+              <a:t>논란점이</a:t>
+            </a:r>
+            <a:r>
+              <a:rPr lang="ko-KR" altLang="en-US" baseline="0" dirty="0" smtClean="0"/>
+              <a:t> 존재한다</a:t>
+            </a:r>
+            <a:r>
+              <a:rPr lang="en-US" altLang="ko-KR" baseline="0" dirty="0" smtClean="0"/>
+              <a:t>.</a:t>
+            </a:r>
+          </a:p>
+          <a:p>
+            <a:r>
+              <a:rPr lang="ko-KR" altLang="en-US" baseline="0" dirty="0" smtClean="0"/>
+              <a:t>영어 한번 읽기</a:t>
+            </a:r>
+            <a:endParaRPr lang="en-US" altLang="ko-KR" baseline="0" dirty="0" smtClean="0"/>
+          </a:p>
+          <a:p>
+            <a:r>
+              <a:rPr lang="en-US" altLang="ko-KR" baseline="0" dirty="0" smtClean="0"/>
+              <a:t>drug chemical structures, drug side-effects</a:t>
+            </a:r>
+            <a:r>
+              <a:rPr lang="ko-KR" altLang="en-US" baseline="0" dirty="0" smtClean="0"/>
+              <a:t>와 </a:t>
+            </a:r>
+            <a:r>
+              <a:rPr lang="ko-KR" altLang="en-US" baseline="0" dirty="0" smtClean="0"/>
+              <a:t>같은 정보를 </a:t>
+            </a:r>
+            <a:r>
+              <a:rPr lang="ko-KR" altLang="en-US" baseline="0" dirty="0" smtClean="0"/>
+              <a:t>포함하는 </a:t>
+            </a:r>
+            <a:r>
+              <a:rPr lang="ko-KR" altLang="en-US" dirty="0" smtClean="0"/>
+              <a:t>통합된 </a:t>
+            </a:r>
+            <a:r>
+              <a:rPr lang="ko-KR" altLang="en-US" dirty="0" err="1" smtClean="0"/>
+              <a:t>메소드는</a:t>
+            </a:r>
+            <a:r>
+              <a:rPr lang="ko-KR" altLang="en-US" dirty="0" smtClean="0"/>
+              <a:t> 각각의 </a:t>
+            </a:r>
+            <a:r>
+              <a:rPr lang="ko-KR" altLang="en-US" dirty="0" err="1" smtClean="0"/>
+              <a:t>메소드와</a:t>
+            </a:r>
+            <a:r>
+              <a:rPr lang="ko-KR" altLang="en-US" dirty="0" smtClean="0"/>
+              <a:t> </a:t>
+            </a:r>
+            <a:r>
+              <a:rPr lang="ko-KR" altLang="en-US" dirty="0" err="1" smtClean="0"/>
+              <a:t>비교했을때</a:t>
+            </a:r>
+            <a:r>
+              <a:rPr lang="en-US" altLang="ko-KR" dirty="0" smtClean="0"/>
+              <a:t>, </a:t>
+            </a:r>
+            <a:r>
+              <a:rPr lang="ko-KR" altLang="en-US" dirty="0" smtClean="0"/>
+              <a:t>민감성과 </a:t>
+            </a:r>
+            <a:r>
+              <a:rPr lang="ko-KR" altLang="en-US" dirty="0" err="1" smtClean="0"/>
+              <a:t>특이성면에서</a:t>
+            </a:r>
+            <a:r>
+              <a:rPr lang="ko-KR" altLang="en-US" dirty="0" smtClean="0"/>
+              <a:t> 더 나은 </a:t>
+            </a:r>
+            <a:r>
+              <a:rPr lang="ko-KR" altLang="en-US" dirty="0" err="1" smtClean="0"/>
+              <a:t>퍼포먼스를</a:t>
+            </a:r>
+            <a:r>
+              <a:rPr lang="ko-KR" altLang="en-US" dirty="0" smtClean="0"/>
+              <a:t> </a:t>
+            </a:r>
+            <a:r>
+              <a:rPr lang="ko-KR" altLang="en-US" dirty="0" smtClean="0"/>
+              <a:t>보여준다고 한다</a:t>
+            </a:r>
+            <a:endParaRPr lang="en-US" altLang="ko-KR" dirty="0" smtClean="0"/>
+          </a:p>
+          <a:p>
+            <a:r>
+              <a:rPr lang="ko-KR" altLang="en-US" dirty="0" smtClean="0"/>
+              <a:t>하지만</a:t>
+            </a:r>
+            <a:endParaRPr lang="en-US" altLang="ko-KR" dirty="0" smtClean="0"/>
+          </a:p>
+        </p:txBody>
+      </p:sp>
+      <p:sp>
+        <p:nvSpPr>
+          <p:cNvPr id="4" name="슬라이드 번호 개체 틀 3"/>
+          <p:cNvSpPr>
+            <a:spLocks noGrp="1"/>
+          </p:cNvSpPr>
+          <p:nvPr>
+            <p:ph type="sldNum" sz="quarter" idx="10"/>
+          </p:nvPr>
+        </p:nvSpPr>
+        <p:spPr/>
+        <p:txBody>
+          <a:bodyPr/>
+          <a:lstStyle/>
+          <a:p>
+            <a:fld id="{CDFAA85D-13B5-4E8D-B933-74E9D559D487}" type="slidenum">
+              <a:rPr lang="ko-KR" altLang="en-US" smtClean="0"/>
+              <a:t>13</a:t>
+            </a:fld>
+            <a:endParaRPr lang="ko-KR" altLang="en-US"/>
+          </a:p>
+        </p:txBody>
+      </p:sp>
+    </p:spTree>
+    <p:extLst>
+      <p:ext uri="{BB962C8B-B14F-4D97-AF65-F5344CB8AC3E}">
+        <p14:creationId xmlns:p14="http://schemas.microsoft.com/office/powerpoint/2010/main" val="3886842590"/>
+      </p:ext>
+    </p:extLst>
+  </p:cSld>
+  <p:clrMapOvr>
+    <a:masterClrMapping/>
+  </p:clrMapOvr>
+</p:notes>
+</file>
+
+<file path=ppt/notesSlides/notesSlide14.xml><?xml version="1.0" encoding="utf-8"?>
+<p:notes xmlns:a="http://schemas.openxmlformats.org/drawingml/2006/main" xmlns:r="http://schemas.openxmlformats.org/officeDocument/2006/relationships" xmlns:p="http://schemas.openxmlformats.org/presentationml/2006/main">
+  <p:cSld>
+    <p:spTree>
+      <p:nvGrpSpPr>
+        <p:cNvPr id="1" name=""/>
+        <p:cNvGrpSpPr/>
+        <p:nvPr/>
+      </p:nvGrpSpPr>
+      <p:grpSpPr>
+        <a:xfrm>
+          <a:off x="0" y="0"/>
+          <a:ext cx="0" cy="0"/>
+          <a:chOff x="0" y="0"/>
+          <a:chExt cx="0" cy="0"/>
+        </a:xfrm>
+      </p:grpSpPr>
+      <p:sp>
+        <p:nvSpPr>
+          <p:cNvPr id="2" name="슬라이드 이미지 개체 틀 1"/>
+          <p:cNvSpPr>
+            <a:spLocks noGrp="1" noRot="1" noChangeAspect="1"/>
+          </p:cNvSpPr>
+          <p:nvPr>
+            <p:ph type="sldImg"/>
+          </p:nvPr>
+        </p:nvSpPr>
+        <p:spPr/>
+      </p:sp>
+      <p:sp>
+        <p:nvSpPr>
+          <p:cNvPr id="3" name="슬라이드 노트 개체 틀 2"/>
+          <p:cNvSpPr>
+            <a:spLocks noGrp="1"/>
+          </p:cNvSpPr>
+          <p:nvPr>
+            <p:ph type="body" idx="1"/>
+          </p:nvPr>
+        </p:nvSpPr>
+        <p:spPr/>
+        <p:txBody>
+          <a:bodyPr/>
+          <a:lstStyle/>
+          <a:p>
+            <a:r>
               <a:rPr lang="en-US" altLang="ko-KR" dirty="0" smtClean="0"/>
               <a:t>1. </a:t>
             </a:r>
@@ -1218,12 +1418,20 @@
               <a:t>현재에 와서 </a:t>
             </a:r>
             <a:r>
+              <a:rPr lang="en-US" altLang="ko-KR" baseline="0" dirty="0" smtClean="0"/>
+              <a:t>computational </a:t>
+            </a:r>
+            <a:r>
               <a:rPr lang="ko-KR" altLang="en-US" baseline="0" dirty="0" err="1" smtClean="0"/>
               <a:t>메소드에</a:t>
             </a:r>
             <a:r>
               <a:rPr lang="ko-KR" altLang="en-US" baseline="0" dirty="0" smtClean="0"/>
-              <a:t> 민감도</a:t>
+              <a:t> </a:t>
+            </a:r>
+            <a:r>
+              <a:rPr lang="ko-KR" altLang="en-US" baseline="0" dirty="0" smtClean="0"/>
+              <a:t>민감도</a:t>
             </a:r>
             <a:r>
               <a:rPr lang="en-US" altLang="ko-KR" baseline="0" dirty="0" smtClean="0"/>
@@ -1274,12 +1482,20 @@
               <a:t> </a:t>
             </a:r>
             <a:r>
+              <a:rPr lang="en-US" altLang="ko-KR" baseline="0" dirty="0" smtClean="0"/>
+              <a:t>computational </a:t>
+            </a:r>
+            <a:r>
               <a:rPr lang="ko-KR" altLang="en-US" baseline="0" dirty="0" err="1" smtClean="0"/>
               <a:t>메소드들의</a:t>
             </a:r>
             <a:r>
               <a:rPr lang="ko-KR" altLang="en-US" baseline="0" dirty="0" smtClean="0"/>
-              <a:t> 평가와 비교가 어렵다</a:t>
+              <a:t> </a:t>
+            </a:r>
+            <a:r>
+              <a:rPr lang="ko-KR" altLang="en-US" baseline="0" dirty="0" smtClean="0"/>
+              <a:t>평가와 비교가 어렵다</a:t>
             </a:r>
             <a:r>
               <a:rPr lang="en-US" altLang="ko-KR" baseline="0" dirty="0" smtClean="0"/>
@@ -1484,7 +1700,19 @@
                 <a:ea typeface="+mn-ea"/>
                 <a:cs typeface="+mn-cs"/>
               </a:rPr>
-              <a:t>안전복용범위와 부작용을 검사한다</a:t>
+              <a:t>안전복용범위와 </a:t>
+            </a:r>
+            <a:r>
+              <a:rPr lang="ko-KR" altLang="en-US" sz="1200" b="0" i="0" kern="1200" baseline="0" dirty="0" smtClean="0">
+                <a:solidFill>
+                  <a:schemeClr val="tx1"/>
+                </a:solidFill>
+                <a:effectLst/>
+                <a:latin typeface="+mn-lt"/>
+                <a:ea typeface="+mn-ea"/>
+                <a:cs typeface="+mn-cs"/>
+              </a:rPr>
+              <a:t>부작용을 검사한다</a:t>
             </a:r>
             <a:r>
               <a:rPr lang="en-US" altLang="ko-KR" sz="1200" b="0" i="0" kern="1200" baseline="0" dirty="0" smtClean="0">
@@ -1750,53 +1978,46 @@
           <a:p>
             <a:r>
               <a:rPr lang="ko-KR" altLang="en-US" dirty="0" smtClean="0"/>
-              <a:t>한번 읽기</a:t>
-            </a:r>
-            <a:endParaRPr lang="en-US" altLang="ko-KR" dirty="0" smtClean="0"/>
-          </a:p>
-          <a:p>
-            <a:r>
-              <a:rPr lang="en-US" altLang="ko-KR" dirty="0" smtClean="0"/>
-              <a:t>Li</a:t>
+              <a:t>대량의 데이터를 처리할 수 있는 기술과 </a:t>
+            </a:r>
+            <a:r>
+              <a:rPr lang="en-US" altLang="ko-KR" dirty="0" smtClean="0"/>
+              <a:t>bioinformatics</a:t>
             </a:r>
             <a:r>
               <a:rPr lang="en-US" altLang="ko-KR" baseline="0" dirty="0" smtClean="0"/>
               <a:t> </a:t>
             </a:r>
             <a:r>
-              <a:rPr lang="ko-KR" altLang="en-US" baseline="0" dirty="0" smtClean="0"/>
-              <a:t>라는 사람은 비슷한 </a:t>
-            </a:r>
-            <a:r>
-              <a:rPr lang="en-US" altLang="ko-KR" baseline="0" dirty="0" smtClean="0"/>
-              <a:t>drug</a:t>
-            </a:r>
-            <a:r>
-              <a:rPr lang="ko-KR" altLang="en-US" baseline="0" dirty="0" smtClean="0"/>
-              <a:t>와의 관계를 통해 이미 존재하는 약의 새로운 잠재적 </a:t>
-            </a:r>
-            <a:r>
-              <a:rPr lang="en-US" altLang="ko-KR" baseline="0" dirty="0" smtClean="0"/>
-              <a:t>indication</a:t>
-            </a:r>
-            <a:r>
-              <a:rPr lang="ko-KR" altLang="en-US" baseline="0" dirty="0" smtClean="0"/>
-              <a:t>을 발견하고자</a:t>
+              <a:rPr lang="ko-KR" altLang="en-US" baseline="0" dirty="0" err="1" smtClean="0"/>
+              <a:t>메소드의</a:t>
+            </a:r>
+            <a:r>
+              <a:rPr lang="ko-KR" altLang="en-US" baseline="0" dirty="0" smtClean="0"/>
+              <a:t> 발전과 함께</a:t>
             </a:r>
             <a:endParaRPr lang="en-US" altLang="ko-KR" baseline="0" dirty="0" smtClean="0"/>
           </a:p>
           <a:p>
             <a:r>
-              <a:rPr lang="en-US" altLang="ko-KR" dirty="0" smtClean="0"/>
-              <a:t>Drug-target</a:t>
-            </a:r>
-            <a:r>
-              <a:rPr lang="en-US" altLang="ko-KR" baseline="0" dirty="0" smtClean="0"/>
-              <a:t> network</a:t>
-            </a:r>
-            <a:r>
-              <a:rPr lang="ko-KR" altLang="en-US" baseline="0" dirty="0" smtClean="0"/>
-              <a:t>를 이용했다고 한다</a:t>
+              <a:rPr lang="en-US" altLang="ko-KR" baseline="0" dirty="0" smtClean="0"/>
+              <a:t>Biological </a:t>
+            </a:r>
+            <a:r>
+              <a:rPr lang="ko-KR" altLang="en-US" baseline="0" dirty="0" smtClean="0"/>
+              <a:t>시스템에서의 분자 </a:t>
+            </a:r>
+            <a:r>
+              <a:rPr lang="en-US" altLang="ko-KR" baseline="0" dirty="0" smtClean="0"/>
+              <a:t>interaction </a:t>
+            </a:r>
+            <a:r>
+              <a:rPr lang="ko-KR" altLang="en-US" baseline="0" dirty="0" smtClean="0"/>
+              <a:t>은 네트워크로 </a:t>
+            </a:r>
+            <a:r>
+              <a:rPr lang="ko-KR" altLang="en-US" baseline="0" dirty="0" smtClean="0"/>
+              <a:t>그려질 수 있다</a:t>
             </a:r>
             <a:r>
               <a:rPr lang="en-US" altLang="ko-KR" baseline="0" dirty="0" smtClean="0"/>
@@ -1809,119 +2030,33 @@
           <a:p>
             <a:r>
               <a:rPr lang="ko-KR" altLang="en-US" baseline="0" dirty="0" smtClean="0"/>
-              <a:t>이 </a:t>
-            </a:r>
-            <a:r>
-              <a:rPr lang="en-US" altLang="ko-KR" baseline="0" dirty="0" smtClean="0"/>
-              <a:t>bipartite network model</a:t>
-            </a:r>
-            <a:r>
-              <a:rPr lang="ko-KR" altLang="en-US" baseline="0" dirty="0" smtClean="0"/>
-              <a:t>에서 </a:t>
-            </a:r>
-            <a:r>
-              <a:rPr lang="en-US" altLang="ko-KR" baseline="0" dirty="0" smtClean="0"/>
-              <a:t>Drug Pair similarity</a:t>
-            </a:r>
-            <a:r>
-              <a:rPr lang="ko-KR" altLang="en-US" baseline="0" dirty="0" smtClean="0"/>
-              <a:t>는 </a:t>
-            </a:r>
-            <a:r>
-              <a:rPr lang="en-US" altLang="ko-KR" baseline="0" dirty="0" smtClean="0"/>
-              <a:t>drug chemical structure similarity and common drug targets and their interaction</a:t>
-            </a:r>
-            <a:r>
-              <a:rPr lang="ko-KR" altLang="en-US" baseline="0" dirty="0" smtClean="0"/>
-              <a:t>을 포함하고 있다</a:t>
+              <a:t>이전 연구들을 통해 많은 </a:t>
+            </a:r>
+            <a:r>
+              <a:rPr lang="ko-KR" altLang="en-US" baseline="0" dirty="0" smtClean="0"/>
+              <a:t>네트워크들이 </a:t>
+            </a:r>
+            <a:r>
+              <a:rPr lang="ko-KR" altLang="en-US" baseline="0" dirty="0" smtClean="0"/>
+              <a:t>치료하기 위한 </a:t>
+            </a:r>
+            <a:r>
+              <a:rPr lang="ko-KR" altLang="en-US" baseline="0" dirty="0" err="1" smtClean="0"/>
+              <a:t>타겟의</a:t>
+            </a:r>
+            <a:r>
+              <a:rPr lang="ko-KR" altLang="en-US" baseline="0" dirty="0" smtClean="0"/>
+              <a:t> 식별에서 많은 네트워크들이 </a:t>
+            </a:r>
+            <a:r>
+              <a:rPr lang="ko-KR" altLang="en-US" baseline="0" dirty="0" smtClean="0"/>
+              <a:t>유용함을 보여주었다</a:t>
             </a:r>
             <a:r>
               <a:rPr lang="en-US" altLang="ko-KR" baseline="0" dirty="0" smtClean="0"/>
               <a:t>.</a:t>
             </a:r>
-          </a:p>
-          <a:p>
-            <a:endParaRPr lang="en-US" altLang="ko-KR" dirty="0" smtClean="0"/>
-          </a:p>
-          <a:p>
-            <a:r>
-              <a:rPr lang="ko-KR" altLang="en-US" dirty="0" smtClean="0"/>
-              <a:t>추가적으로 </a:t>
-            </a:r>
-            <a:r>
-              <a:rPr lang="en-US" altLang="ko-KR" dirty="0" smtClean="0"/>
-              <a:t>Li</a:t>
-            </a:r>
-            <a:r>
-              <a:rPr lang="ko-KR" altLang="en-US" dirty="0" smtClean="0"/>
-              <a:t>는 </a:t>
-            </a:r>
-            <a:r>
-              <a:rPr lang="ko-KR" altLang="en-US" dirty="0" err="1" smtClean="0"/>
-              <a:t>다계층의</a:t>
-            </a:r>
-            <a:r>
-              <a:rPr lang="ko-KR" altLang="en-US" dirty="0" smtClean="0"/>
-              <a:t> </a:t>
-            </a:r>
-            <a:r>
-              <a:rPr lang="en-US" altLang="ko-KR" dirty="0" err="1" smtClean="0"/>
-              <a:t>CauseNet</a:t>
-            </a:r>
-            <a:r>
-              <a:rPr lang="ko-KR" altLang="en-US" dirty="0" smtClean="0"/>
-              <a:t>을 만들었고</a:t>
-            </a:r>
-            <a:r>
-              <a:rPr lang="en-US" altLang="ko-KR" dirty="0" smtClean="0"/>
-              <a:t>, </a:t>
-            </a:r>
-            <a:r>
-              <a:rPr lang="ko-KR" altLang="en-US" dirty="0" smtClean="0"/>
-              <a:t>이를 이용하여 </a:t>
-            </a:r>
-            <a:endParaRPr lang="en-US" altLang="ko-KR" dirty="0" smtClean="0"/>
-          </a:p>
-          <a:p>
-            <a:r>
-              <a:rPr lang="ko-KR" altLang="en-US" dirty="0" smtClean="0"/>
-              <a:t>각 </a:t>
-            </a:r>
-            <a:r>
-              <a:rPr lang="en-US" altLang="ko-KR" dirty="0" smtClean="0"/>
-              <a:t>Chain</a:t>
-            </a:r>
-            <a:r>
-              <a:rPr lang="ko-KR" altLang="en-US" dirty="0" smtClean="0"/>
-              <a:t>이 실제 치료방법으로 바뀔 수 있는 가능성을 이미 잘 알려진 </a:t>
-            </a:r>
-            <a:r>
-              <a:rPr lang="en-US" altLang="ko-KR" dirty="0" smtClean="0"/>
-              <a:t>drug-disease</a:t>
-            </a:r>
-            <a:r>
-              <a:rPr lang="en-US" altLang="ko-KR" baseline="0" dirty="0" smtClean="0"/>
-              <a:t> treatment association</a:t>
-            </a:r>
-            <a:r>
-              <a:rPr lang="ko-KR" altLang="en-US" baseline="0" dirty="0" smtClean="0"/>
-              <a:t>에 기반하여 평가하면서</a:t>
-            </a:r>
-            <a:r>
-              <a:rPr lang="en-US" altLang="ko-KR" baseline="0" dirty="0" smtClean="0"/>
-              <a:t>,</a:t>
-            </a:r>
-            <a:endParaRPr lang="en-US" altLang="ko-KR" dirty="0" smtClean="0"/>
-          </a:p>
-          <a:p>
-            <a:r>
-              <a:rPr lang="ko-KR" altLang="en-US" dirty="0" smtClean="0"/>
-              <a:t>이미 존재하는 약의 새로운 치료 방법을 찾아내고 있다</a:t>
-            </a:r>
-            <a:r>
-              <a:rPr lang="en-US" altLang="ko-KR" dirty="0" smtClean="0"/>
-              <a:t>.</a:t>
-            </a:r>
+            <a:endParaRPr lang="en-US" altLang="ko-KR" baseline="0" dirty="0" smtClean="0"/>
           </a:p>
         </p:txBody>
       </p:sp>
@@ -1942,7 +2077,7 @@
           <a:p>
             <a:fld id="{CDFAA85D-13B5-4E8D-B933-74E9D559D487}" type="slidenum">
               <a:rPr lang="ko-KR" altLang="en-US" smtClean="0"/>
-              <a:t>3</a:t>
+              <a:t>2</a:t>
             </a:fld>
             <a:endParaRPr lang="ko-KR" altLang="en-US"/>
           </a:p>
@@ -1951,7 +2086,7 @@
     </p:spTree>
     <p:extLst>
       <p:ext uri="{BB962C8B-B14F-4D97-AF65-F5344CB8AC3E}">
-        <p14:creationId xmlns:p14="http://schemas.microsoft.com/office/powerpoint/2010/main" val="2821867305"/>
+        <p14:creationId xmlns:p14="http://schemas.microsoft.com/office/powerpoint/2010/main" val="103948362"/>
       </p:ext>
     </p:extLst>
   </p:cSld>
@@ -2006,24 +2141,132 @@
           <a:lstStyle/>
           <a:p>
             <a:r>
-              <a:rPr lang="en-US" altLang="ko-KR" dirty="0" smtClean="0"/>
-              <a:t>Wu</a:t>
-            </a:r>
-            <a:r>
               <a:rPr lang="ko-KR" altLang="en-US" dirty="0" smtClean="0"/>
-              <a:t>는 이질적 네트워크에 </a:t>
-            </a:r>
-            <a:r>
-              <a:rPr lang="en-US" altLang="ko-KR" dirty="0" smtClean="0"/>
-              <a:t>network </a:t>
+              <a:t>한번 읽기</a:t>
+            </a:r>
+            <a:endParaRPr lang="en-US" altLang="ko-KR" dirty="0" smtClean="0"/>
+          </a:p>
+          <a:p>
+            <a:r>
+              <a:rPr lang="en-US" altLang="ko-KR" dirty="0" smtClean="0"/>
+              <a:t>Li</a:t>
+            </a:r>
+            <a:r>
+              <a:rPr lang="en-US" altLang="ko-KR" baseline="0" dirty="0" smtClean="0"/>
+              <a:t> </a:t>
+            </a:r>
+            <a:r>
+              <a:rPr lang="ko-KR" altLang="en-US" baseline="0" dirty="0" smtClean="0"/>
+              <a:t>라는 사람은 비슷한 </a:t>
+            </a:r>
+            <a:r>
+              <a:rPr lang="en-US" altLang="ko-KR" baseline="0" dirty="0" smtClean="0"/>
+              <a:t>drug</a:t>
+            </a:r>
+            <a:r>
+              <a:rPr lang="ko-KR" altLang="en-US" baseline="0" dirty="0" smtClean="0"/>
+              <a:t>와의 관계를 통해 이미 존재하는 약의 새로운 잠재적 </a:t>
+            </a:r>
+            <a:r>
+              <a:rPr lang="en-US" altLang="ko-KR" baseline="0" dirty="0" smtClean="0"/>
+              <a:t>indication</a:t>
+            </a:r>
+            <a:r>
+              <a:rPr lang="ko-KR" altLang="en-US" baseline="0" dirty="0" smtClean="0"/>
+              <a:t>을 </a:t>
+            </a:r>
+            <a:r>
+              <a:rPr lang="ko-KR" altLang="en-US" baseline="0" dirty="0" err="1" smtClean="0"/>
+              <a:t>발견하기위해</a:t>
+            </a:r>
+            <a:endParaRPr lang="en-US" altLang="ko-KR" baseline="0" dirty="0" smtClean="0"/>
+          </a:p>
+          <a:p>
+            <a:r>
+              <a:rPr lang="en-US" altLang="ko-KR" dirty="0" smtClean="0"/>
+              <a:t>Drug-target</a:t>
+            </a:r>
+            <a:r>
+              <a:rPr lang="en-US" altLang="ko-KR" baseline="0" dirty="0" smtClean="0"/>
+              <a:t> network</a:t>
+            </a:r>
+            <a:r>
+              <a:rPr lang="ko-KR" altLang="en-US" baseline="0" dirty="0" smtClean="0"/>
+              <a:t>를 이용했다고 한다</a:t>
+            </a:r>
+            <a:r>
+              <a:rPr lang="en-US" altLang="ko-KR" baseline="0" dirty="0" smtClean="0"/>
+              <a:t>.</a:t>
+            </a:r>
+          </a:p>
+          <a:p>
+            <a:endParaRPr lang="en-US" altLang="ko-KR" baseline="0" dirty="0" smtClean="0"/>
+          </a:p>
+          <a:p>
+            <a:r>
+              <a:rPr lang="ko-KR" altLang="en-US" baseline="0" dirty="0" smtClean="0"/>
+              <a:t>이 </a:t>
+            </a:r>
+            <a:r>
+              <a:rPr lang="en-US" altLang="ko-KR" baseline="0" dirty="0" smtClean="0"/>
+              <a:t>bipartite network model</a:t>
+            </a:r>
+            <a:r>
+              <a:rPr lang="ko-KR" altLang="en-US" baseline="0" dirty="0" smtClean="0"/>
+              <a:t>에서 </a:t>
+            </a:r>
+            <a:r>
+              <a:rPr lang="en-US" altLang="ko-KR" baseline="0" dirty="0" smtClean="0"/>
+              <a:t>Drug Pair similarity</a:t>
+            </a:r>
+            <a:r>
+              <a:rPr lang="ko-KR" altLang="en-US" baseline="0" dirty="0" smtClean="0"/>
+              <a:t>는 </a:t>
+            </a:r>
+            <a:r>
+              <a:rPr lang="en-US" altLang="ko-KR" baseline="0" dirty="0" smtClean="0"/>
+              <a:t>drug chemical structure similarity and common drug targets and their interaction</a:t>
+            </a:r>
+            <a:r>
+              <a:rPr lang="ko-KR" altLang="en-US" baseline="0" dirty="0" smtClean="0"/>
+              <a:t>을 포함하고 있다</a:t>
+            </a:r>
+            <a:r>
+              <a:rPr lang="en-US" altLang="ko-KR" baseline="0" dirty="0" smtClean="0"/>
+              <a:t>.</a:t>
+            </a:r>
+          </a:p>
+          <a:p>
+            <a:endParaRPr lang="en-US" altLang="ko-KR" dirty="0" smtClean="0"/>
+          </a:p>
+          <a:p>
+            <a:r>
+              <a:rPr lang="ko-KR" altLang="en-US" dirty="0" smtClean="0"/>
+              <a:t>추가적으로 </a:t>
+            </a:r>
+            <a:r>
+              <a:rPr lang="en-US" altLang="ko-KR" dirty="0" smtClean="0"/>
+              <a:t>Li</a:t>
+            </a:r>
+            <a:r>
+              <a:rPr lang="ko-KR" altLang="en-US" dirty="0" smtClean="0"/>
+              <a:t>는 </a:t>
             </a:r>
             <a:r>
               <a:rPr lang="ko-KR" altLang="en-US" dirty="0" err="1" smtClean="0"/>
-              <a:t>클러스터링을</a:t>
+              <a:t>다계층의</a:t>
             </a:r>
             <a:r>
               <a:rPr lang="ko-KR" altLang="en-US" dirty="0" smtClean="0"/>
-              <a:t> 도입하였고</a:t>
+              <a:t> </a:t>
+            </a:r>
+            <a:r>
+              <a:rPr lang="en-US" altLang="ko-KR" dirty="0" err="1" smtClean="0"/>
+              <a:t>CauseNet</a:t>
+            </a:r>
+            <a:r>
+              <a:rPr lang="ko-KR" altLang="en-US" dirty="0" smtClean="0"/>
+              <a:t>을 만들었고</a:t>
             </a:r>
             <a:r>
               <a:rPr lang="en-US" altLang="ko-KR" dirty="0" smtClean="0"/>
@@ -2033,131 +2276,49 @@
               <a:rPr lang="ko-KR" altLang="en-US" dirty="0" smtClean="0"/>
               <a:t>이를 이용하여 </a:t>
             </a:r>
-            <a:r>
-              <a:rPr lang="en-US" altLang="ko-KR" dirty="0" smtClean="0"/>
-              <a:t>drug</a:t>
-            </a:r>
-            <a:r>
-              <a:rPr lang="en-US" altLang="ko-KR" baseline="0" dirty="0" smtClean="0"/>
-              <a:t> repositioning</a:t>
-            </a:r>
-            <a:r>
-              <a:rPr lang="ko-KR" altLang="en-US" baseline="0" dirty="0" smtClean="0"/>
-              <a:t>이 가능한 </a:t>
-            </a:r>
-            <a:r>
-              <a:rPr lang="en-US" altLang="ko-KR" baseline="0" dirty="0" smtClean="0"/>
-              <a:t>drug-disease pairs</a:t>
-            </a:r>
-            <a:r>
-              <a:rPr lang="ko-KR" altLang="en-US" baseline="0" dirty="0" smtClean="0"/>
-              <a:t>를 추출하는데 사용할 수 있는</a:t>
-            </a:r>
-            <a:endParaRPr lang="en-US" altLang="ko-KR" baseline="0" dirty="0" smtClean="0"/>
-          </a:p>
-          <a:p>
-            <a:r>
-              <a:rPr lang="ko-KR" altLang="en-US" baseline="0" dirty="0" smtClean="0"/>
-              <a:t>가깝게 연결된 </a:t>
-            </a:r>
-            <a:r>
-              <a:rPr lang="en-US" altLang="ko-KR" baseline="0" dirty="0" smtClean="0"/>
-              <a:t>Disease and drugs </a:t>
-            </a:r>
-            <a:r>
-              <a:rPr lang="ko-KR" altLang="en-US" baseline="0" dirty="0" smtClean="0"/>
-              <a:t>모듈들을 찾아내고자 하였다</a:t>
-            </a:r>
-            <a:r>
-              <a:rPr lang="en-US" altLang="ko-KR" baseline="0" dirty="0" smtClean="0"/>
+            <a:endParaRPr lang="en-US" altLang="ko-KR" dirty="0" smtClean="0"/>
+          </a:p>
+          <a:p>
+            <a:r>
+              <a:rPr lang="ko-KR" altLang="en-US" dirty="0" smtClean="0"/>
+              <a:t>각 </a:t>
+            </a:r>
+            <a:r>
+              <a:rPr lang="en-US" altLang="ko-KR" dirty="0" smtClean="0"/>
+              <a:t>Chain</a:t>
+            </a:r>
+            <a:r>
+              <a:rPr lang="ko-KR" altLang="en-US" dirty="0" smtClean="0"/>
+              <a:t>이 실제 치료방법으로 바뀔 수 있는 가능성을 이미 잘 알려진 </a:t>
+            </a:r>
+            <a:r>
+              <a:rPr lang="en-US" altLang="ko-KR" dirty="0" smtClean="0"/>
+              <a:t>drug-disease</a:t>
+            </a:r>
+            <a:r>
+              <a:rPr lang="en-US" altLang="ko-KR" baseline="0" dirty="0" smtClean="0"/>
+              <a:t> treatment association</a:t>
+            </a:r>
+            <a:r>
+              <a:rPr lang="ko-KR" altLang="en-US" baseline="0" dirty="0" smtClean="0"/>
+              <a:t>에 기반하여 평가하면서</a:t>
+            </a:r>
+            <a:r>
+              <a:rPr lang="en-US" altLang="ko-KR" baseline="0" dirty="0" smtClean="0"/>
+              <a:t>,</a:t>
+            </a:r>
+            <a:endParaRPr lang="en-US" altLang="ko-KR" dirty="0" smtClean="0"/>
+          </a:p>
+          <a:p>
+            <a:r>
+              <a:rPr lang="ko-KR" altLang="en-US" dirty="0" smtClean="0"/>
+              <a:t>이미 존재하는 약의 새로운 치료 방법을 찾아내고 있다</a:t>
+            </a:r>
+            <a:r>
+              <a:rPr lang="en-US" altLang="ko-KR" dirty="0" smtClean="0"/>
               <a:t>.</a:t>
             </a:r>
           </a:p>
-          <a:p>
-            <a:endParaRPr lang="en-US" altLang="ko-KR" baseline="0" dirty="0" smtClean="0"/>
-          </a:p>
-          <a:p>
-            <a:r>
-              <a:rPr lang="ko-KR" altLang="en-US" baseline="0" dirty="0" smtClean="0"/>
-              <a:t>이 네트워크에서 두 </a:t>
-            </a:r>
-            <a:r>
-              <a:rPr lang="en-US" altLang="ko-KR" baseline="0" dirty="0" smtClean="0"/>
-              <a:t>Node</a:t>
-            </a:r>
-            <a:r>
-              <a:rPr lang="ko-KR" altLang="en-US" baseline="0" dirty="0" smtClean="0"/>
-              <a:t>는 유전자와 </a:t>
-            </a:r>
-            <a:r>
-              <a:rPr lang="ko-KR" altLang="en-US" baseline="0" dirty="0" err="1" smtClean="0"/>
-              <a:t>타겟</a:t>
-            </a:r>
-            <a:r>
-              <a:rPr lang="en-US" altLang="ko-KR" baseline="0" dirty="0" smtClean="0"/>
-              <a:t>, </a:t>
-            </a:r>
-            <a:r>
-              <a:rPr lang="ko-KR" altLang="en-US" baseline="0" dirty="0" smtClean="0"/>
-              <a:t>그리고 </a:t>
-            </a:r>
-            <a:r>
-              <a:rPr lang="en-US" altLang="ko-KR" baseline="0" dirty="0" smtClean="0"/>
-              <a:t>biological process, pathway, and phenotypes</a:t>
-            </a:r>
-            <a:r>
-              <a:rPr lang="ko-KR" altLang="en-US" baseline="0" dirty="0" smtClean="0"/>
-              <a:t>와 같은 특징들로 연결 되어있으며</a:t>
-            </a:r>
-            <a:r>
-              <a:rPr lang="en-US" altLang="ko-KR" baseline="0" dirty="0" smtClean="0"/>
-              <a:t>,</a:t>
-            </a:r>
-          </a:p>
-          <a:p>
-            <a:r>
-              <a:rPr lang="en-US" altLang="ko-KR" baseline="0" dirty="0" err="1" smtClean="0"/>
-              <a:t>Jaccard</a:t>
-            </a:r>
-            <a:r>
-              <a:rPr lang="en-US" altLang="ko-KR" baseline="0" dirty="0" smtClean="0"/>
-              <a:t> score</a:t>
-            </a:r>
-            <a:r>
-              <a:rPr lang="ko-KR" altLang="en-US" baseline="0" dirty="0" smtClean="0"/>
-              <a:t>로 </a:t>
-            </a:r>
-            <a:r>
-              <a:rPr lang="en-US" altLang="ko-KR" baseline="0" dirty="0" smtClean="0"/>
-              <a:t>Weighted </a:t>
-            </a:r>
-            <a:r>
-              <a:rPr lang="ko-KR" altLang="en-US" baseline="0" dirty="0" smtClean="0"/>
-              <a:t>되어있다</a:t>
-            </a:r>
-            <a:r>
-              <a:rPr lang="en-US" altLang="ko-KR" baseline="0" dirty="0" smtClean="0"/>
-              <a:t>.</a:t>
-            </a:r>
-          </a:p>
-          <a:p>
-            <a:endParaRPr lang="en-US" altLang="ko-KR" baseline="0" dirty="0" smtClean="0"/>
-          </a:p>
-          <a:p>
-            <a:r>
-              <a:rPr lang="en-US" altLang="ko-KR" baseline="0" dirty="0" err="1" smtClean="0"/>
-              <a:t>Jaccard</a:t>
-            </a:r>
-            <a:r>
-              <a:rPr lang="en-US" altLang="ko-KR" baseline="0" dirty="0" smtClean="0"/>
-              <a:t> score : </a:t>
-            </a:r>
-            <a:r>
-              <a:rPr lang="ko-KR" altLang="en-US" baseline="0" dirty="0" smtClean="0"/>
-              <a:t>두 집합간 얼마나 일치하는 부분이 존재하는지 나타내는 계수</a:t>
-            </a:r>
-            <a:endParaRPr lang="ko-KR" altLang="en-US" dirty="0"/>
-          </a:p>
         </p:txBody>
       </p:sp>
       <p:sp>
@@ -2177,7 +2338,7 @@
           <a:p>
             <a:fld id="{CDFAA85D-13B5-4E8D-B933-74E9D559D487}" type="slidenum">
               <a:rPr lang="ko-KR" altLang="en-US" smtClean="0"/>
-              <a:t>4</a:t>
+              <a:t>3</a:t>
             </a:fld>
             <a:endParaRPr lang="ko-KR" altLang="en-US"/>
           </a:p>
@@ -2186,7 +2347,7 @@
     </p:spTree>
     <p:extLst>
       <p:ext uri="{BB962C8B-B14F-4D97-AF65-F5344CB8AC3E}">
-        <p14:creationId xmlns:p14="http://schemas.microsoft.com/office/powerpoint/2010/main" val="27947039"/>
+        <p14:creationId xmlns:p14="http://schemas.microsoft.com/office/powerpoint/2010/main" val="2821867305"/>
       </p:ext>
     </p:extLst>
   </p:cSld>
@@ -2241,58 +2402,108 @@
           <a:lstStyle/>
           <a:p>
             <a:r>
+              <a:rPr lang="en-US" altLang="ko-KR" dirty="0" smtClean="0"/>
+              <a:t>Wu</a:t>
+            </a:r>
+            <a:r>
               <a:rPr lang="ko-KR" altLang="en-US" dirty="0" smtClean="0"/>
-              <a:t>텍스트 </a:t>
+              <a:t>는 이질적 네트워크에 </a:t>
+            </a:r>
+            <a:r>
+              <a:rPr lang="en-US" altLang="ko-KR" dirty="0" smtClean="0"/>
+              <a:t>network </a:t>
             </a:r>
             <a:r>
               <a:rPr lang="ko-KR" altLang="en-US" dirty="0" err="1" smtClean="0"/>
-              <a:t>마이닝</a:t>
+              <a:t>클러스터링을</a:t>
             </a:r>
             <a:r>
               <a:rPr lang="ko-KR" altLang="en-US" dirty="0" smtClean="0"/>
-              <a:t> 그리고 의미론적 추론</a:t>
-            </a:r>
-            <a:endParaRPr lang="en-US" altLang="ko-KR" dirty="0" smtClean="0"/>
-          </a:p>
-          <a:p>
-            <a:endParaRPr lang="en-US" altLang="ko-KR" dirty="0" smtClean="0"/>
-          </a:p>
-          <a:p>
-            <a:r>
-              <a:rPr lang="en-US" altLang="ko-KR" dirty="0" smtClean="0"/>
-              <a:t>Biomedical</a:t>
+              <a:t> 도입하였고</a:t>
+            </a:r>
+            <a:r>
+              <a:rPr lang="en-US" altLang="ko-KR" dirty="0" smtClean="0"/>
+              <a:t>, </a:t>
             </a:r>
             <a:r>
               <a:rPr lang="ko-KR" altLang="en-US" dirty="0" smtClean="0"/>
-              <a:t>이나 제약지식과 같이</a:t>
-            </a:r>
-            <a:r>
-              <a:rPr lang="ko-KR" altLang="en-US" baseline="0" dirty="0" smtClean="0"/>
-              <a:t> 사용할 수 있는 문서나 </a:t>
-            </a:r>
-            <a:r>
-              <a:rPr lang="en-US" altLang="ko-KR" baseline="0" dirty="0" smtClean="0"/>
-              <a:t>DB</a:t>
-            </a:r>
-            <a:r>
-              <a:rPr lang="ko-KR" altLang="en-US" baseline="0" dirty="0" smtClean="0"/>
-              <a:t>는 </a:t>
-            </a:r>
-            <a:r>
-              <a:rPr lang="en-US" altLang="ko-KR" baseline="0" dirty="0" smtClean="0"/>
-              <a:t>Drugs </a:t>
-            </a:r>
-            <a:r>
-              <a:rPr lang="ko-KR" altLang="en-US" baseline="0" dirty="0" smtClean="0"/>
-              <a:t>와 </a:t>
-            </a:r>
-            <a:r>
-              <a:rPr lang="en-US" altLang="ko-KR" baseline="0" dirty="0" smtClean="0"/>
-              <a:t>diseases</a:t>
-            </a:r>
-            <a:r>
-              <a:rPr lang="ko-KR" altLang="en-US" baseline="0" dirty="0" smtClean="0"/>
-              <a:t>에 대한 방대한 정보를 가지고 있는데</a:t>
+              <a:t>이를 이용하여 </a:t>
+            </a:r>
+            <a:r>
+              <a:rPr lang="en-US" altLang="ko-KR" dirty="0" smtClean="0"/>
+              <a:t>drug</a:t>
+            </a:r>
+            <a:r>
+              <a:rPr lang="en-US" altLang="ko-KR" baseline="0" dirty="0" smtClean="0"/>
+              <a:t> repositioning</a:t>
+            </a:r>
+            <a:r>
+              <a:rPr lang="ko-KR" altLang="en-US" baseline="0" dirty="0" smtClean="0"/>
+              <a:t>이 가능한 </a:t>
+            </a:r>
+            <a:r>
+              <a:rPr lang="en-US" altLang="ko-KR" baseline="0" dirty="0" smtClean="0"/>
+              <a:t>drug-disease pairs</a:t>
+            </a:r>
+            <a:r>
+              <a:rPr lang="ko-KR" altLang="en-US" baseline="0" dirty="0" smtClean="0"/>
+              <a:t>를 추출하는데 사용할 수 있는</a:t>
+            </a:r>
+            <a:endParaRPr lang="en-US" altLang="ko-KR" baseline="0" dirty="0" smtClean="0"/>
+          </a:p>
+          <a:p>
+            <a:r>
+              <a:rPr lang="ko-KR" altLang="en-US" baseline="0" dirty="0" smtClean="0"/>
+              <a:t>가깝게 연결된 </a:t>
+            </a:r>
+            <a:r>
+              <a:rPr lang="en-US" altLang="ko-KR" baseline="0" dirty="0" smtClean="0"/>
+              <a:t>Disease and drugs </a:t>
+            </a:r>
+            <a:r>
+              <a:rPr lang="ko-KR" altLang="en-US" baseline="0" dirty="0" smtClean="0"/>
+              <a:t>모듈들을 찾아내고자 하였다</a:t>
+            </a:r>
+            <a:r>
+              <a:rPr lang="en-US" altLang="ko-KR" baseline="0" dirty="0" smtClean="0"/>
+              <a:t>.</a:t>
+            </a:r>
+          </a:p>
+          <a:p>
+            <a:endParaRPr lang="en-US" altLang="ko-KR" baseline="0" dirty="0" smtClean="0"/>
+          </a:p>
+          <a:p>
+            <a:r>
+              <a:rPr lang="ko-KR" altLang="en-US" baseline="0" dirty="0" smtClean="0"/>
+              <a:t>이 네트워크에서 두 </a:t>
+            </a:r>
+            <a:r>
+              <a:rPr lang="en-US" altLang="ko-KR" baseline="0" dirty="0" smtClean="0"/>
+              <a:t>Node</a:t>
+            </a:r>
+            <a:r>
+              <a:rPr lang="ko-KR" altLang="en-US" baseline="0" dirty="0" smtClean="0"/>
+              <a:t>는 유전자와 </a:t>
+            </a:r>
+            <a:r>
+              <a:rPr lang="ko-KR" altLang="en-US" baseline="0" dirty="0" err="1" smtClean="0"/>
+              <a:t>타겟</a:t>
+            </a:r>
+            <a:r>
+              <a:rPr lang="en-US" altLang="ko-KR" baseline="0" dirty="0" smtClean="0"/>
+              <a:t>, </a:t>
+            </a:r>
+            <a:r>
+              <a:rPr lang="ko-KR" altLang="en-US" baseline="0" dirty="0" smtClean="0"/>
+              <a:t>그리고 </a:t>
+            </a:r>
+            <a:r>
+              <a:rPr lang="en-US" altLang="ko-KR" baseline="0" dirty="0" smtClean="0"/>
+              <a:t>biological process, pathway, and phenotypes</a:t>
+            </a:r>
+            <a:r>
+              <a:rPr lang="ko-KR" altLang="en-US" baseline="0" dirty="0" smtClean="0"/>
+              <a:t>와 같은 특징들로 연결 되어있으며</a:t>
             </a:r>
             <a:r>
               <a:rPr lang="en-US" altLang="ko-KR" baseline="0" dirty="0" smtClean="0"/>
@@ -2300,77 +2511,49 @@
             </a:r>
           </a:p>
           <a:p>
+            <a:r>
+              <a:rPr lang="en-US" altLang="ko-KR" baseline="0" dirty="0" err="1" smtClean="0"/>
+              <a:t>Jaccard</a:t>
+            </a:r>
+            <a:r>
+              <a:rPr lang="en-US" altLang="ko-KR" baseline="0" dirty="0" smtClean="0"/>
+              <a:t> score</a:t>
+            </a:r>
+            <a:r>
+              <a:rPr lang="ko-KR" altLang="en-US" baseline="0" dirty="0" smtClean="0"/>
+              <a:t>로 </a:t>
+            </a:r>
+            <a:r>
+              <a:rPr lang="en-US" altLang="ko-KR" baseline="0" dirty="0" smtClean="0"/>
+              <a:t>Weighted, </a:t>
+            </a:r>
+            <a:r>
+              <a:rPr lang="ko-KR" altLang="en-US" baseline="0" dirty="0" smtClean="0"/>
+              <a:t>즉 가중치가 </a:t>
+            </a:r>
+            <a:r>
+              <a:rPr lang="ko-KR" altLang="en-US" baseline="0" dirty="0" err="1" smtClean="0"/>
+              <a:t>매겨져있다</a:t>
+            </a:r>
             <a:endParaRPr lang="en-US" altLang="ko-KR" baseline="0" dirty="0" smtClean="0"/>
           </a:p>
           <a:p>
-            <a:r>
-              <a:rPr lang="ko-KR" altLang="en-US" baseline="0" dirty="0" smtClean="0"/>
-              <a:t>이 정보를 가지고 관련된 지식을 찾아 존재하는 </a:t>
-            </a:r>
-            <a:r>
-              <a:rPr lang="en-US" altLang="ko-KR" baseline="0" dirty="0" smtClean="0"/>
-              <a:t>drugs</a:t>
-            </a:r>
-            <a:r>
-              <a:rPr lang="ko-KR" altLang="en-US" baseline="0" dirty="0" smtClean="0"/>
-              <a:t>의 새로운 </a:t>
-            </a:r>
-            <a:r>
-              <a:rPr lang="en-US" altLang="ko-KR" baseline="0" dirty="0" smtClean="0"/>
-              <a:t>indications </a:t>
-            </a:r>
-            <a:r>
-              <a:rPr lang="ko-KR" altLang="en-US" baseline="0" dirty="0" smtClean="0"/>
-              <a:t>를 발견하는 것이 가능하다</a:t>
-            </a:r>
-            <a:r>
-              <a:rPr lang="en-US" altLang="ko-KR" baseline="0" dirty="0" smtClean="0"/>
-              <a:t>.</a:t>
-            </a:r>
-          </a:p>
-          <a:p>
             <a:endParaRPr lang="en-US" altLang="ko-KR" baseline="0" dirty="0" smtClean="0"/>
           </a:p>
           <a:p>
             <a:r>
-              <a:rPr lang="ko-KR" altLang="en-US" baseline="0" dirty="0" smtClean="0"/>
-              <a:t>이 방법은 </a:t>
-            </a:r>
-            <a:r>
-              <a:rPr lang="en-US" altLang="ko-KR" baseline="0" dirty="0" smtClean="0"/>
-              <a:t>ontology</a:t>
-            </a:r>
-            <a:r>
-              <a:rPr lang="ko-KR" altLang="en-US" baseline="0" dirty="0" smtClean="0"/>
-              <a:t>를 생성하는데</a:t>
-            </a:r>
-            <a:endParaRPr lang="en-US" altLang="ko-KR" baseline="0" dirty="0" smtClean="0"/>
-          </a:p>
-          <a:p>
-            <a:r>
-              <a:rPr lang="ko-KR" altLang="en-US" baseline="0" dirty="0" smtClean="0"/>
-              <a:t>이는 다른 </a:t>
-            </a:r>
-            <a:r>
-              <a:rPr lang="ko-KR" altLang="en-US" baseline="0" dirty="0" err="1" smtClean="0"/>
-              <a:t>소스으로부터의</a:t>
-            </a:r>
-            <a:r>
-              <a:rPr lang="ko-KR" altLang="en-US" baseline="0" dirty="0" smtClean="0"/>
-              <a:t> </a:t>
-            </a:r>
-            <a:r>
-              <a:rPr lang="en-US" altLang="ko-KR" baseline="0" dirty="0" smtClean="0"/>
-              <a:t>biological </a:t>
-            </a:r>
-            <a:r>
-              <a:rPr lang="ko-KR" altLang="en-US" baseline="0" dirty="0" smtClean="0"/>
-              <a:t>정보들의 분석과 비교를 가능하게 한다</a:t>
-            </a:r>
-            <a:r>
-              <a:rPr lang="en-US" altLang="ko-KR" baseline="0" dirty="0" smtClean="0"/>
-              <a:t>.</a:t>
-            </a:r>
+              <a:rPr lang="en-US" altLang="ko-KR" baseline="0" dirty="0" err="1" smtClean="0"/>
+              <a:t>Jaccard</a:t>
+            </a:r>
+            <a:r>
+              <a:rPr lang="en-US" altLang="ko-KR" baseline="0" dirty="0" smtClean="0"/>
+              <a:t> score : </a:t>
+            </a:r>
+            <a:r>
+              <a:rPr lang="ko-KR" altLang="en-US" baseline="0" dirty="0" smtClean="0"/>
+              <a:t>두 집합간 얼마나 일치하는 부분이 존재하는지 나타내는 계수</a:t>
+            </a:r>
+            <a:endParaRPr lang="ko-KR" altLang="en-US" dirty="0"/>
           </a:p>
         </p:txBody>
       </p:sp>
@@ -2391,7 +2574,7 @@
           <a:p>
             <a:fld id="{CDFAA85D-13B5-4E8D-B933-74E9D559D487}" type="slidenum">
               <a:rPr lang="ko-KR" altLang="en-US" smtClean="0"/>
-              <a:t>5</a:t>
+              <a:t>4</a:t>
             </a:fld>
             <a:endParaRPr lang="ko-KR" altLang="en-US"/>
           </a:p>
@@ -2400,7 +2583,7 @@
     </p:spTree>
     <p:extLst>
       <p:ext uri="{BB962C8B-B14F-4D97-AF65-F5344CB8AC3E}">
-        <p14:creationId xmlns:p14="http://schemas.microsoft.com/office/powerpoint/2010/main" val="2998866675"/>
+        <p14:creationId xmlns:p14="http://schemas.microsoft.com/office/powerpoint/2010/main" val="27947039"/>
       </p:ext>
     </p:extLst>
   </p:cSld>
@@ -2460,129 +2643,161 @@
             </a:r>
             <a:r>
               <a:rPr lang="ko-KR" altLang="en-US" dirty="0" err="1" smtClean="0"/>
-              <a:t>마이닝을</a:t>
+              <a:t>마이닝</a:t>
             </a:r>
             <a:r>
               <a:rPr lang="ko-KR" altLang="en-US" dirty="0" smtClean="0"/>
-              <a:t> 통해</a:t>
+              <a:t> 그리고 의미론적 추론</a:t>
             </a:r>
             <a:endParaRPr lang="en-US" altLang="ko-KR" dirty="0" smtClean="0"/>
           </a:p>
           <a:p>
+            <a:endParaRPr lang="en-US" altLang="ko-KR" dirty="0" smtClean="0"/>
+          </a:p>
+          <a:p>
+            <a:r>
+              <a:rPr lang="en-US" altLang="ko-KR" dirty="0" smtClean="0"/>
+              <a:t>Biomedical</a:t>
+            </a:r>
             <a:r>
               <a:rPr lang="ko-KR" altLang="en-US" dirty="0" smtClean="0"/>
-              <a:t>한 연구에서 영양소 </a:t>
-            </a:r>
-            <a:r>
-              <a:rPr lang="en-US" altLang="ko-KR" dirty="0" smtClean="0"/>
-              <a:t>B</a:t>
-            </a:r>
-            <a:r>
-              <a:rPr lang="ko-KR" altLang="en-US" dirty="0" smtClean="0"/>
-              <a:t>의 부족으로 인한 질병 </a:t>
-            </a:r>
-            <a:r>
-              <a:rPr lang="en-US" altLang="ko-KR" dirty="0" smtClean="0"/>
-              <a:t>A</a:t>
-            </a:r>
-            <a:r>
-              <a:rPr lang="ko-KR" altLang="en-US" dirty="0" smtClean="0"/>
-              <a:t>를 발견하고</a:t>
-            </a:r>
-            <a:r>
-              <a:rPr lang="en-US" altLang="ko-KR" dirty="0" smtClean="0"/>
+              <a:t>이나 제약지식과 같이</a:t>
+            </a:r>
+            <a:r>
+              <a:rPr lang="ko-KR" altLang="en-US" baseline="0" dirty="0" smtClean="0"/>
+              <a:t> 사용할 수 있는 문서나 </a:t>
+            </a:r>
+            <a:r>
+              <a:rPr lang="en-US" altLang="ko-KR" baseline="0" dirty="0" smtClean="0"/>
+              <a:t>DB</a:t>
+            </a:r>
+            <a:r>
+              <a:rPr lang="ko-KR" altLang="en-US" baseline="0" dirty="0" smtClean="0"/>
+              <a:t>는 </a:t>
+            </a:r>
+            <a:r>
+              <a:rPr lang="en-US" altLang="ko-KR" baseline="0" dirty="0" smtClean="0"/>
+              <a:t>Drugs </a:t>
+            </a:r>
+            <a:r>
+              <a:rPr lang="ko-KR" altLang="en-US" baseline="0" dirty="0" smtClean="0"/>
+              <a:t>와 </a:t>
+            </a:r>
+            <a:r>
+              <a:rPr lang="en-US" altLang="ko-KR" baseline="0" dirty="0" smtClean="0"/>
+              <a:t>diseases</a:t>
+            </a:r>
+            <a:r>
+              <a:rPr lang="ko-KR" altLang="en-US" baseline="0" dirty="0" smtClean="0"/>
+              <a:t>에 대한 방대한 정보를 가지고 있는데</a:t>
+            </a:r>
+            <a:r>
+              <a:rPr lang="en-US" altLang="ko-KR" baseline="0" dirty="0" smtClean="0"/>
+              <a:t>,</a:t>
+            </a:r>
+          </a:p>
+          <a:p>
+            <a:endParaRPr lang="en-US" altLang="ko-KR" baseline="0" dirty="0" smtClean="0"/>
+          </a:p>
+          <a:p>
+            <a:r>
+              <a:rPr lang="ko-KR" altLang="en-US" baseline="0" dirty="0" smtClean="0"/>
+              <a:t>이 정보를 가지고 관련된 지식을 찾아 존재하는 </a:t>
+            </a:r>
+            <a:r>
+              <a:rPr lang="en-US" altLang="ko-KR" baseline="0" dirty="0" smtClean="0"/>
+              <a:t>drugs</a:t>
+            </a:r>
+            <a:r>
+              <a:rPr lang="ko-KR" altLang="en-US" baseline="0" dirty="0" smtClean="0"/>
+              <a:t>의 새로운 </a:t>
+            </a:r>
+            <a:r>
+              <a:rPr lang="en-US" altLang="ko-KR" baseline="0" dirty="0" smtClean="0"/>
+              <a:t>indications </a:t>
+            </a:r>
+            <a:r>
+              <a:rPr lang="ko-KR" altLang="en-US" baseline="0" dirty="0" smtClean="0"/>
+              <a:t>를 발견하는 것이 가능하다</a:t>
+            </a:r>
+            <a:r>
+              <a:rPr lang="en-US" altLang="ko-KR" baseline="0" dirty="0" smtClean="0"/>
+              <a:t>.</a:t>
+            </a:r>
+          </a:p>
+          <a:p>
+            <a:endParaRPr lang="en-US" altLang="ko-KR" baseline="0" dirty="0" smtClean="0"/>
+          </a:p>
+          <a:p>
+            <a:r>
+              <a:rPr lang="ko-KR" altLang="en-US" baseline="0" dirty="0" smtClean="0"/>
+              <a:t>이 방법은 </a:t>
+            </a:r>
+            <a:r>
+              <a:rPr lang="en-US" altLang="ko-KR" baseline="0" dirty="0" smtClean="0"/>
+              <a:t>ontology</a:t>
+            </a:r>
+            <a:r>
+              <a:rPr lang="ko-KR" altLang="en-US" baseline="0" dirty="0" smtClean="0"/>
+              <a:t>를 생성하는데</a:t>
+            </a:r>
+            <a:endParaRPr lang="en-US" altLang="ko-KR" baseline="0" dirty="0" smtClean="0"/>
+          </a:p>
+          <a:p>
+            <a:r>
+              <a:rPr lang="ko-KR" altLang="en-US" baseline="0" dirty="0" smtClean="0"/>
+              <a:t>이는 다른 </a:t>
+            </a:r>
+            <a:r>
+              <a:rPr lang="ko-KR" altLang="en-US" baseline="0" dirty="0" err="1" smtClean="0"/>
+              <a:t>소스으로부터의</a:t>
+            </a:r>
+            <a:r>
+              <a:rPr lang="ko-KR" altLang="en-US" baseline="0" dirty="0" smtClean="0"/>
+              <a:t> </a:t>
+            </a:r>
+            <a:r>
+              <a:rPr lang="en-US" altLang="ko-KR" baseline="0" dirty="0" smtClean="0"/>
+              <a:t>biological </a:t>
+            </a:r>
+            <a:r>
+              <a:rPr lang="ko-KR" altLang="en-US" baseline="0" dirty="0" smtClean="0"/>
+              <a:t>정보들의 분석과 비교를 가능하게 한다</a:t>
+            </a:r>
+            <a:r>
+              <a:rPr lang="en-US" altLang="ko-KR" baseline="0" dirty="0" smtClean="0"/>
+              <a:t>.</a:t>
+            </a:r>
+          </a:p>
+          <a:p>
+            <a:endParaRPr lang="en-US" altLang="ko-KR" baseline="0" dirty="0" smtClean="0"/>
+          </a:p>
+          <a:p>
+            <a:r>
+              <a:rPr lang="en-US" altLang="ko-KR" baseline="0" dirty="0" smtClean="0"/>
+              <a:t>Ontology </a:t>
+            </a:r>
+            <a:r>
+              <a:rPr lang="ko-KR" altLang="en-US" baseline="0" dirty="0" smtClean="0"/>
+              <a:t>는 내용을 정리하고 있는데</a:t>
+            </a:r>
+            <a:r>
+              <a:rPr lang="en-US" altLang="ko-KR" baseline="0" dirty="0" smtClean="0"/>
               <a:t>, </a:t>
             </a:r>
             <a:r>
-              <a:rPr lang="ko-KR" altLang="en-US" dirty="0" smtClean="0"/>
-              <a:t>다른 연구에서 </a:t>
-            </a:r>
-            <a:r>
-              <a:rPr lang="en-US" altLang="ko-KR" dirty="0" smtClean="0"/>
-              <a:t>drug</a:t>
-            </a:r>
-            <a:r>
-              <a:rPr lang="en-US" altLang="ko-KR" baseline="0" dirty="0" smtClean="0"/>
-              <a:t> C</a:t>
-            </a:r>
-            <a:r>
-              <a:rPr lang="ko-KR" altLang="en-US" baseline="0" dirty="0" smtClean="0"/>
-              <a:t>가 다른 질병에서 영양소 </a:t>
-            </a:r>
-            <a:r>
-              <a:rPr lang="en-US" altLang="ko-KR" baseline="0" dirty="0" smtClean="0"/>
-              <a:t>B</a:t>
-            </a:r>
-            <a:r>
-              <a:rPr lang="ko-KR" altLang="en-US" baseline="0" dirty="0" smtClean="0"/>
-              <a:t>의 </a:t>
-            </a:r>
-            <a:r>
-              <a:rPr lang="en-US" altLang="ko-KR" baseline="0" dirty="0" smtClean="0"/>
-              <a:t>activator</a:t>
+              <a:rPr lang="ko-KR" altLang="en-US" baseline="0" dirty="0" smtClean="0"/>
+              <a:t>공식적 이름이나 관계들과 같은 정보들을 </a:t>
             </a:r>
             <a:r>
               <a:rPr lang="ko-KR" altLang="en-US" baseline="0" dirty="0" err="1" smtClean="0"/>
-              <a:t>일때</a:t>
-            </a:r>
-            <a:r>
-              <a:rPr lang="en-US" altLang="ko-KR" baseline="0" dirty="0" smtClean="0"/>
-              <a:t>,</a:t>
-            </a:r>
-          </a:p>
-          <a:p>
-            <a:r>
-              <a:rPr lang="en-US" altLang="ko-KR" baseline="0" dirty="0" smtClean="0"/>
-              <a:t>Drug C</a:t>
-            </a:r>
-            <a:r>
-              <a:rPr lang="ko-KR" altLang="en-US" baseline="0" dirty="0" smtClean="0"/>
-              <a:t>는 질병 </a:t>
-            </a:r>
-            <a:r>
-              <a:rPr lang="en-US" altLang="ko-KR" baseline="0" dirty="0" smtClean="0"/>
-              <a:t>A</a:t>
-            </a:r>
-            <a:r>
-              <a:rPr lang="ko-KR" altLang="en-US" baseline="0" dirty="0" smtClean="0"/>
-              <a:t>에 대해 </a:t>
-            </a:r>
-            <a:r>
-              <a:rPr lang="en-US" altLang="ko-KR" baseline="0" dirty="0" smtClean="0"/>
-              <a:t>repurposed </a:t>
-            </a:r>
-            <a:r>
-              <a:rPr lang="ko-KR" altLang="en-US" baseline="0" dirty="0" smtClean="0"/>
-              <a:t>될 수 있다고 </a:t>
-            </a:r>
-            <a:r>
-              <a:rPr lang="ko-KR" altLang="en-US" baseline="0" dirty="0" err="1" smtClean="0"/>
-              <a:t>보는것이다</a:t>
+              <a:t>저장하고있다</a:t>
             </a:r>
             <a:r>
               <a:rPr lang="en-US" altLang="ko-KR" baseline="0" dirty="0" smtClean="0"/>
               <a:t>.</a:t>
             </a:r>
-            <a:r>
-              <a:rPr lang="en-US" altLang="ko-KR" dirty="0" smtClean="0"/>
-              <a:t/>
-            </a:r>
-            <a:br>
-              <a:rPr lang="en-US" altLang="ko-KR" dirty="0" smtClean="0"/>
-            </a:br>
-            <a:r>
-              <a:rPr lang="en-US" altLang="ko-KR" sz="1200" b="0" i="0" kern="1200" dirty="0" smtClean="0">
-                <a:solidFill>
-                  <a:schemeClr val="tx1"/>
-                </a:solidFill>
-                <a:effectLst/>
-                <a:latin typeface="+mn-lt"/>
-                <a:ea typeface="+mn-ea"/>
-                <a:cs typeface="+mn-cs"/>
-              </a:rPr>
-              <a:t>Guilt by association ?</a:t>
-            </a:r>
-            <a:endParaRPr lang="ko-KR" altLang="en-US" dirty="0"/>
+            <a:endParaRPr lang="en-US" altLang="ko-KR" baseline="0" dirty="0" smtClean="0"/>
           </a:p>
         </p:txBody>
       </p:sp>
@@ -2603,7 +2818,7 @@
           <a:p>
             <a:fld id="{CDFAA85D-13B5-4E8D-B933-74E9D559D487}" type="slidenum">
               <a:rPr lang="ko-KR" altLang="en-US" smtClean="0"/>
-              <a:t>6</a:t>
+              <a:t>5</a:t>
             </a:fld>
             <a:endParaRPr lang="ko-KR" altLang="en-US"/>
           </a:p>
@@ -2612,7 +2827,7 @@
     </p:spTree>
     <p:extLst>
       <p:ext uri="{BB962C8B-B14F-4D97-AF65-F5344CB8AC3E}">
-        <p14:creationId xmlns:p14="http://schemas.microsoft.com/office/powerpoint/2010/main" val="3623725108"/>
+        <p14:creationId xmlns:p14="http://schemas.microsoft.com/office/powerpoint/2010/main" val="2998866675"/>
       </p:ext>
     </p:extLst>
   </p:cSld>
@@ -2668,42 +2883,66 @@
           <a:p>
             <a:r>
               <a:rPr lang="ko-KR" altLang="en-US" dirty="0" smtClean="0"/>
-              <a:t>읽고 </a:t>
+              <a:t>텍스트 </a:t>
+            </a:r>
+            <a:r>
+              <a:rPr lang="ko-KR" altLang="en-US" dirty="0" err="1" smtClean="0"/>
+              <a:t>마이닝을</a:t>
+            </a:r>
+            <a:r>
+              <a:rPr lang="ko-KR" altLang="en-US" dirty="0" smtClean="0"/>
+              <a:t> 통해</a:t>
             </a:r>
             <a:endParaRPr lang="en-US" altLang="ko-KR" dirty="0" smtClean="0"/>
           </a:p>
           <a:p>
             <a:r>
-              <a:rPr lang="en-US" altLang="ko-KR" dirty="0" smtClean="0"/>
-              <a:t>Zhu</a:t>
-            </a:r>
-            <a:r>
               <a:rPr lang="ko-KR" altLang="en-US" dirty="0" smtClean="0"/>
-              <a:t>는 </a:t>
-            </a:r>
-            <a:r>
-              <a:rPr lang="en-US" altLang="ko-KR" dirty="0" smtClean="0"/>
-              <a:t>FDA</a:t>
-            </a:r>
-            <a:r>
-              <a:rPr lang="en-US" altLang="ko-KR" baseline="0" dirty="0" smtClean="0"/>
-              <a:t> </a:t>
-            </a:r>
-            <a:r>
-              <a:rPr lang="ko-KR" altLang="en-US" baseline="0" dirty="0" smtClean="0"/>
-              <a:t>승인된 유방암 </a:t>
-            </a:r>
-            <a:r>
-              <a:rPr lang="en-US" altLang="ko-KR" baseline="0" dirty="0" smtClean="0"/>
-              <a:t>drugs</a:t>
-            </a:r>
-            <a:r>
-              <a:rPr lang="ko-KR" altLang="en-US" baseline="0" dirty="0" smtClean="0"/>
-              <a:t>와 </a:t>
-            </a:r>
-            <a:r>
-              <a:rPr lang="en-US" altLang="ko-KR" baseline="0" dirty="0" smtClean="0"/>
-              <a:t>drugs</a:t>
+              <a:t>한 연구에서 영양소 </a:t>
+            </a:r>
+            <a:r>
+              <a:rPr lang="en-US" altLang="ko-KR" dirty="0" smtClean="0"/>
+              <a:t>B</a:t>
+            </a:r>
+            <a:r>
+              <a:rPr lang="ko-KR" altLang="en-US" dirty="0" smtClean="0"/>
+              <a:t>의 부족으로 인한 질병 </a:t>
+            </a:r>
+            <a:r>
+              <a:rPr lang="en-US" altLang="ko-KR" dirty="0" smtClean="0"/>
+              <a:t>A</a:t>
+            </a:r>
+            <a:r>
+              <a:rPr lang="ko-KR" altLang="en-US" dirty="0" smtClean="0"/>
+              <a:t>를 </a:t>
+            </a:r>
+            <a:r>
+              <a:rPr lang="ko-KR" altLang="en-US" dirty="0" smtClean="0"/>
+              <a:t>발견했고</a:t>
+            </a:r>
+            <a:r>
+              <a:rPr lang="en-US" altLang="ko-KR" dirty="0" smtClean="0"/>
+              <a:t>, </a:t>
+            </a:r>
+            <a:r>
+              <a:rPr lang="ko-KR" altLang="en-US" dirty="0" smtClean="0"/>
+              <a:t>다른 연구에서 </a:t>
+            </a:r>
+            <a:r>
+              <a:rPr lang="en-US" altLang="ko-KR" dirty="0" smtClean="0"/>
+              <a:t>drug</a:t>
+            </a:r>
+            <a:r>
+              <a:rPr lang="en-US" altLang="ko-KR" baseline="0" dirty="0" smtClean="0"/>
+              <a:t> C</a:t>
+            </a:r>
+            <a:r>
+              <a:rPr lang="ko-KR" altLang="en-US" baseline="0" dirty="0" smtClean="0"/>
+              <a:t>가 다른 질병에서 영양소 </a:t>
+            </a:r>
+            <a:r>
+              <a:rPr lang="en-US" altLang="ko-KR" baseline="0" dirty="0" smtClean="0"/>
+              <a:t>B</a:t>
             </a:r>
             <a:r>
               <a:rPr lang="ko-KR" altLang="en-US" baseline="0" dirty="0" smtClean="0"/>
@@ -2711,23 +2950,11 @@
             </a:r>
             <a:r>
               <a:rPr lang="en-US" altLang="ko-KR" baseline="0" dirty="0" smtClean="0"/>
-              <a:t>pathways, drugs, genes, SNPs and diseases</a:t>
-            </a:r>
-            <a:r>
-              <a:rPr lang="ko-KR" altLang="en-US" baseline="0" dirty="0" smtClean="0"/>
-              <a:t>들의 연관을 모델화하는 </a:t>
-            </a:r>
-            <a:r>
-              <a:rPr lang="ko-KR" altLang="en-US" dirty="0" err="1" smtClean="0"/>
-              <a:t>온톨로지</a:t>
+              <a:t>activator</a:t>
             </a:r>
             <a:r>
               <a:rPr lang="ko-KR" altLang="en-US" baseline="0" dirty="0" err="1" smtClean="0"/>
-              <a:t>를</a:t>
-            </a:r>
-            <a:r>
-              <a:rPr lang="ko-KR" altLang="en-US" baseline="0" dirty="0" smtClean="0"/>
-              <a:t> 만들었고</a:t>
+              <a:t>일때</a:t>
             </a:r>
             <a:r>
               <a:rPr lang="en-US" altLang="ko-KR" baseline="0" dirty="0" smtClean="0"/>
@@ -2736,29 +2963,57 @@
           </a:p>
           <a:p>
             <a:r>
-              <a:rPr lang="ko-KR" altLang="en-US" baseline="0" dirty="0" smtClean="0"/>
-              <a:t>그 </a:t>
+              <a:rPr lang="en-US" altLang="ko-KR" baseline="0" dirty="0" smtClean="0"/>
+              <a:t>Drug C</a:t>
+            </a:r>
+            <a:r>
+              <a:rPr lang="ko-KR" altLang="en-US" baseline="0" dirty="0" smtClean="0"/>
+              <a:t>는 질병 </a:t>
+            </a:r>
+            <a:r>
+              <a:rPr lang="en-US" altLang="ko-KR" baseline="0" dirty="0" smtClean="0"/>
+              <a:t>A</a:t>
+            </a:r>
+            <a:r>
+              <a:rPr lang="ko-KR" altLang="en-US" baseline="0" dirty="0" smtClean="0"/>
+              <a:t>에 대해 </a:t>
+            </a:r>
+            <a:r>
+              <a:rPr lang="en-US" altLang="ko-KR" baseline="0" dirty="0" smtClean="0"/>
+              <a:t>repurposed </a:t>
+            </a:r>
+            <a:r>
+              <a:rPr lang="ko-KR" altLang="en-US" baseline="0" dirty="0" smtClean="0"/>
+              <a:t>될 수 있다고 </a:t>
             </a:r>
             <a:r>
               <a:rPr lang="ko-KR" altLang="en-US" baseline="0" dirty="0" err="1" smtClean="0"/>
-              <a:t>온톨로지를</a:t>
-            </a:r>
-            <a:r>
-              <a:rPr lang="ko-KR" altLang="en-US" baseline="0" dirty="0" smtClean="0"/>
-              <a:t> 통해 새로운 </a:t>
-            </a:r>
-            <a:r>
-              <a:rPr lang="en-US" altLang="ko-KR" baseline="0" dirty="0" smtClean="0"/>
-              <a:t>drug-disease</a:t>
-            </a:r>
-            <a:r>
-              <a:rPr lang="ko-KR" altLang="en-US" baseline="0" dirty="0" smtClean="0"/>
-              <a:t>를 추정할 수 있었다</a:t>
-            </a:r>
-            <a:endParaRPr lang="en-US" altLang="ko-KR" baseline="0" dirty="0" smtClean="0"/>
-          </a:p>
-          <a:p>
-            <a:endParaRPr lang="en-US" altLang="ko-KR" baseline="0" dirty="0" smtClean="0"/>
+              <a:t>보는것이다</a:t>
+            </a:r>
+            <a:r>
+              <a:rPr lang="en-US" altLang="ko-KR" baseline="0" dirty="0" smtClean="0"/>
+              <a:t>.</a:t>
+            </a:r>
+            <a:r>
+              <a:rPr lang="en-US" altLang="ko-KR" dirty="0" smtClean="0"/>
+              <a:t/>
+            </a:r>
+            <a:br>
+              <a:rPr lang="en-US" altLang="ko-KR" dirty="0" smtClean="0"/>
+            </a:br>
+            <a:r>
+              <a:rPr lang="en-US" altLang="ko-KR" sz="1200" b="0" i="0" kern="1200" dirty="0" smtClean="0">
+                <a:solidFill>
+                  <a:schemeClr val="tx1"/>
+                </a:solidFill>
+                <a:effectLst/>
+                <a:latin typeface="+mn-lt"/>
+                <a:ea typeface="+mn-ea"/>
+                <a:cs typeface="+mn-cs"/>
+              </a:rPr>
+              <a:t>Guilt by association ?</a:t>
+            </a:r>
+            <a:endParaRPr lang="ko-KR" altLang="en-US" dirty="0"/>
           </a:p>
         </p:txBody>
       </p:sp>
@@ -2779,7 +3034,7 @@
           <a:p>
             <a:fld id="{CDFAA85D-13B5-4E8D-B933-74E9D559D487}" type="slidenum">
               <a:rPr lang="ko-KR" altLang="en-US" smtClean="0"/>
-              <a:t>7</a:t>
+              <a:t>6</a:t>
             </a:fld>
             <a:endParaRPr lang="ko-KR" altLang="en-US"/>
           </a:p>
@@ -2788,7 +3043,7 @@
     </p:spTree>
     <p:extLst>
       <p:ext uri="{BB962C8B-B14F-4D97-AF65-F5344CB8AC3E}">
-        <p14:creationId xmlns:p14="http://schemas.microsoft.com/office/powerpoint/2010/main" val="3116666919"/>
+        <p14:creationId xmlns:p14="http://schemas.microsoft.com/office/powerpoint/2010/main" val="3623725108"/>
       </p:ext>
     </p:extLst>
   </p:cSld>
@@ -2844,156 +3099,105 @@
           <a:p>
             <a:r>
               <a:rPr lang="ko-KR" altLang="en-US" dirty="0" smtClean="0"/>
-              <a:t>읽고</a:t>
+              <a:t>읽고 </a:t>
             </a:r>
             <a:endParaRPr lang="en-US" altLang="ko-KR" dirty="0" smtClean="0"/>
           </a:p>
           <a:p>
             <a:r>
               <a:rPr lang="en-US" altLang="ko-KR" dirty="0" smtClean="0"/>
-              <a:t>Chen</a:t>
+              <a:t>Zhu</a:t>
             </a:r>
             <a:r>
               <a:rPr lang="ko-KR" altLang="en-US" dirty="0" smtClean="0"/>
-              <a:t>이라는 사람은</a:t>
-            </a:r>
-            <a:endParaRPr lang="en-US" altLang="ko-KR" dirty="0" smtClean="0"/>
-          </a:p>
-          <a:p>
-            <a:pPr marL="0" marR="0" indent="0" algn="l" defTabSz="914400" rtl="0" eaLnBrk="1" fontAlgn="auto" latinLnBrk="1" hangingPunct="1">
-              <a:lnSpc>
-                <a:spcPct val="100000"/>
-              </a:lnSpc>
-              <a:spcBef>
-                <a:spcPts val="0"/>
-              </a:spcBef>
-              <a:spcAft>
-                <a:spcPts val="0"/>
-              </a:spcAft>
-              <a:buClrTx/>
-              <a:buSzTx/>
-              <a:buFontTx/>
-              <a:buNone/>
-              <a:tabLst/>
-              <a:defRPr/>
-            </a:pPr>
-            <a:r>
-              <a:rPr lang="en-US" altLang="ko-KR" dirty="0" smtClean="0"/>
+              <a:t>는 </a:t>
+            </a:r>
+            <a:r>
+              <a:rPr lang="en-US" altLang="ko-KR" dirty="0" smtClean="0"/>
+              <a:t>FDA</a:t>
+            </a:r>
+            <a:r>
+              <a:rPr lang="en-US" altLang="ko-KR" baseline="0" dirty="0" smtClean="0"/>
+              <a:t> </a:t>
+            </a:r>
+            <a:r>
+              <a:rPr lang="ko-KR" altLang="en-US" baseline="0" dirty="0" smtClean="0"/>
+              <a:t>승인된 유방암 </a:t>
+            </a:r>
+            <a:r>
+              <a:rPr lang="en-US" altLang="ko-KR" baseline="0" dirty="0" smtClean="0"/>
               <a:t>drugs</a:t>
             </a:r>
             <a:r>
-              <a:rPr lang="en-US" altLang="ko-KR" baseline="0" dirty="0" smtClean="0"/>
-              <a:t>, chemical compounds, protein targets, diseases, side-effects </a:t>
-            </a:r>
-            <a:r>
-              <a:rPr lang="ko-KR" altLang="en-US" baseline="0" dirty="0" smtClean="0"/>
-              <a:t>그리고 </a:t>
+              <a:rPr lang="ko-KR" altLang="en-US" baseline="0" dirty="0" smtClean="0"/>
+              <a:t>와 </a:t>
+            </a:r>
+            <a:r>
+              <a:rPr lang="en-US" altLang="ko-KR" baseline="0" dirty="0" smtClean="0"/>
+              <a:t>drugs</a:t>
+            </a:r>
+            <a:r>
+              <a:rPr lang="ko-KR" altLang="en-US" baseline="0" dirty="0" smtClean="0"/>
+              <a:t>와 관련된 </a:t>
             </a:r>
             <a:r>
               <a:rPr lang="en-US" altLang="ko-KR" baseline="0" dirty="0" smtClean="0"/>
               <a:t>pathways</a:t>
             </a:r>
             <a:r>
-              <a:rPr lang="ko-KR" altLang="en-US" baseline="0" dirty="0" smtClean="0"/>
-              <a:t>등을 포함하고 있는</a:t>
-            </a:r>
-            <a:endParaRPr lang="en-US" altLang="ko-KR" dirty="0" smtClean="0"/>
-          </a:p>
-          <a:p>
-            <a:r>
-              <a:rPr lang="en-US" altLang="ko-KR" dirty="0" smtClean="0"/>
-              <a:t>Semantic</a:t>
-            </a:r>
-            <a:r>
-              <a:rPr lang="en-US" altLang="ko-KR" baseline="0" dirty="0" smtClean="0"/>
-              <a:t> linked networks </a:t>
-            </a:r>
-            <a:r>
-              <a:rPr lang="ko-KR" altLang="en-US" baseline="0" dirty="0" smtClean="0"/>
-              <a:t>로부터 </a:t>
-            </a:r>
-            <a:r>
-              <a:rPr lang="en-US" altLang="ko-KR" dirty="0" smtClean="0"/>
-              <a:t>Drug-target associations</a:t>
-            </a:r>
-            <a:r>
-              <a:rPr lang="ko-KR" altLang="en-US" dirty="0" smtClean="0"/>
-              <a:t>을 결정</a:t>
-            </a:r>
-            <a:r>
-              <a:rPr lang="ko-KR" altLang="en-US" baseline="0" dirty="0" smtClean="0"/>
-              <a:t>할 수 있는 </a:t>
-            </a:r>
-            <a:r>
-              <a:rPr lang="ko-KR" altLang="en-US" dirty="0" smtClean="0"/>
-              <a:t>통계적 모델을 만들었다</a:t>
-            </a:r>
-            <a:r>
-              <a:rPr lang="en-US" altLang="ko-KR" dirty="0" smtClean="0"/>
-              <a:t>.</a:t>
-            </a:r>
-          </a:p>
-          <a:p>
+              <a:rPr lang="en-US" altLang="ko-KR" baseline="0" dirty="0" smtClean="0"/>
+              <a:t>, drugs, genes, SNPs and </a:t>
+            </a:r>
+            <a:r>
+              <a:rPr lang="en-US" altLang="ko-KR" baseline="0" dirty="0" smtClean="0"/>
+              <a:t>diseases</a:t>
+            </a:r>
+            <a:r>
+              <a:rPr lang="ko-KR" altLang="en-US" baseline="0" dirty="0" smtClean="0"/>
+              <a:t>을 모델화하는 </a:t>
+            </a:r>
+            <a:r>
+              <a:rPr lang="ko-KR" altLang="en-US" dirty="0" err="1" smtClean="0"/>
+              <a:t>온톨로지</a:t>
+            </a:r>
+            <a:r>
+              <a:rPr lang="ko-KR" altLang="en-US" baseline="0" dirty="0" err="1" smtClean="0"/>
+              <a:t>를</a:t>
+            </a:r>
+            <a:r>
+              <a:rPr lang="ko-KR" altLang="en-US" baseline="0" dirty="0" smtClean="0"/>
+              <a:t> 만들었고</a:t>
+            </a:r>
+            <a:r>
+              <a:rPr lang="en-US" altLang="ko-KR" baseline="0" dirty="0" smtClean="0"/>
+              <a:t>,</a:t>
+            </a:r>
+          </a:p>
+          <a:p>
+            <a:r>
+              <a:rPr lang="ko-KR" altLang="en-US" baseline="0" dirty="0" smtClean="0"/>
+              <a:t>그 </a:t>
+            </a:r>
+            <a:r>
+              <a:rPr lang="ko-KR" altLang="en-US" baseline="0" dirty="0" err="1" smtClean="0"/>
+              <a:t>온톨로지를</a:t>
+            </a:r>
+            <a:r>
+              <a:rPr lang="ko-KR" altLang="en-US" baseline="0" dirty="0" smtClean="0"/>
+              <a:t> 통해 새로운 </a:t>
+            </a:r>
+            <a:r>
+              <a:rPr lang="en-US" altLang="ko-KR" baseline="0" dirty="0" smtClean="0"/>
+              <a:t>drug-disease</a:t>
+            </a:r>
+            <a:r>
+              <a:rPr lang="ko-KR" altLang="en-US" baseline="0" dirty="0" smtClean="0"/>
+              <a:t>를 추정할 수 있었다</a:t>
+            </a:r>
             <a:endParaRPr lang="en-US" altLang="ko-KR" baseline="0" dirty="0" smtClean="0"/>
           </a:p>
           <a:p>
-            <a:r>
-              <a:rPr lang="ko-KR" altLang="en-US" baseline="0" dirty="0" smtClean="0"/>
-              <a:t>이 통계적 모델은 </a:t>
-            </a:r>
-            <a:r>
-              <a:rPr lang="en-US" altLang="ko-KR" baseline="0" dirty="0" smtClean="0"/>
-              <a:t>drug</a:t>
-            </a:r>
-            <a:r>
-              <a:rPr lang="ko-KR" altLang="en-US" baseline="0" dirty="0" smtClean="0"/>
-              <a:t>와 </a:t>
-            </a:r>
-            <a:r>
-              <a:rPr lang="en-US" altLang="ko-KR" baseline="0" dirty="0" smtClean="0"/>
-              <a:t>disease </a:t>
-            </a:r>
-            <a:r>
-              <a:rPr lang="ko-KR" altLang="en-US" baseline="0" dirty="0" smtClean="0"/>
-              <a:t>사이의  부분그래프의 의미를 고려하여</a:t>
-            </a:r>
-            <a:r>
-              <a:rPr lang="en-US" altLang="ko-KR" baseline="0" dirty="0" smtClean="0"/>
-              <a:t>,</a:t>
-            </a:r>
-          </a:p>
-          <a:p>
-            <a:r>
-              <a:rPr lang="ko-KR" altLang="en-US" baseline="0" dirty="0" smtClean="0"/>
-              <a:t>다른 질병으로부터 나온 비슷한 </a:t>
-            </a:r>
-            <a:r>
-              <a:rPr lang="en-US" altLang="ko-KR" baseline="0" dirty="0" smtClean="0"/>
-              <a:t>drug-drug pair</a:t>
-            </a:r>
-            <a:r>
-              <a:rPr lang="ko-KR" altLang="en-US" baseline="0" dirty="0" smtClean="0"/>
-              <a:t>에게</a:t>
-            </a:r>
-            <a:r>
-              <a:rPr lang="en-US" altLang="ko-KR" baseline="0" dirty="0" smtClean="0"/>
-              <a:t> </a:t>
-            </a:r>
-            <a:r>
-              <a:rPr lang="ko-KR" altLang="en-US" baseline="0" dirty="0" err="1" smtClean="0"/>
-              <a:t>리포지셔닝의</a:t>
-            </a:r>
-            <a:r>
-              <a:rPr lang="ko-KR" altLang="en-US" baseline="0" dirty="0" smtClean="0"/>
-              <a:t> 기회를 부여한다</a:t>
-            </a:r>
-            <a:r>
-              <a:rPr lang="en-US" altLang="ko-KR" baseline="0" dirty="0" smtClean="0"/>
-              <a:t>.</a:t>
-            </a:r>
-          </a:p>
-          <a:p>
-            <a:endParaRPr lang="ko-KR" altLang="en-US" dirty="0"/>
+            <a:endParaRPr lang="en-US" altLang="ko-KR" baseline="0" dirty="0" smtClean="0"/>
           </a:p>
         </p:txBody>
       </p:sp>
@@ -3014,7 +3218,7 @@
           <a:p>
             <a:fld id="{CDFAA85D-13B5-4E8D-B933-74E9D559D487}" type="slidenum">
               <a:rPr lang="ko-KR" altLang="en-US" smtClean="0"/>
-              <a:t>8</a:t>
+              <a:t>7</a:t>
             </a:fld>
             <a:endParaRPr lang="ko-KR" altLang="en-US"/>
           </a:p>
@@ -3023,7 +3227,7 @@
     </p:spTree>
     <p:extLst>
       <p:ext uri="{BB962C8B-B14F-4D97-AF65-F5344CB8AC3E}">
-        <p14:creationId xmlns:p14="http://schemas.microsoft.com/office/powerpoint/2010/main" val="960263475"/>
+        <p14:creationId xmlns:p14="http://schemas.microsoft.com/office/powerpoint/2010/main" val="3116666919"/>
       </p:ext>
     </p:extLst>
   </p:cSld>
@@ -3078,16 +3282,119 @@
           <a:lstStyle/>
           <a:p>
             <a:r>
-              <a:rPr lang="en-US" altLang="ko-KR" dirty="0" err="1" smtClean="0"/>
-              <a:t>Computatonal</a:t>
-            </a:r>
-            <a:r>
-              <a:rPr lang="en-US" altLang="ko-KR" baseline="0" dirty="0" smtClean="0"/>
-              <a:t> model</a:t>
-            </a:r>
-            <a:r>
-              <a:rPr lang="ko-KR" altLang="en-US" baseline="0" dirty="0" smtClean="0"/>
-              <a:t>은 종종 소량의 예상을 하는데</a:t>
+              <a:rPr lang="ko-KR" altLang="en-US" dirty="0" smtClean="0"/>
+              <a:t>읽고</a:t>
+            </a:r>
+            <a:endParaRPr lang="en-US" altLang="ko-KR" dirty="0" smtClean="0"/>
+          </a:p>
+          <a:p>
+            <a:r>
+              <a:rPr lang="en-US" altLang="ko-KR" dirty="0" smtClean="0"/>
+              <a:t>Chen</a:t>
+            </a:r>
+            <a:r>
+              <a:rPr lang="ko-KR" altLang="en-US" dirty="0" smtClean="0"/>
+              <a:t>이라는 사람은</a:t>
+            </a:r>
+            <a:endParaRPr lang="en-US" altLang="ko-KR" dirty="0" smtClean="0"/>
+          </a:p>
+          <a:p>
+            <a:pPr marL="0" marR="0" indent="0" algn="l" defTabSz="914400" rtl="0" eaLnBrk="1" fontAlgn="auto" latinLnBrk="1" hangingPunct="1">
+              <a:lnSpc>
+                <a:spcPct val="100000"/>
+              </a:lnSpc>
+              <a:spcBef>
+                <a:spcPts val="0"/>
+              </a:spcBef>
+              <a:spcAft>
+                <a:spcPts val="0"/>
+              </a:spcAft>
+              <a:buClrTx/>
+              <a:buSzTx/>
+              <a:buFontTx/>
+              <a:buNone/>
+              <a:tabLst/>
+              <a:defRPr/>
+            </a:pPr>
+            <a:r>
+              <a:rPr lang="en-US" altLang="ko-KR" dirty="0" smtClean="0"/>
+              <a:t>drugs</a:t>
+            </a:r>
+            <a:r>
+              <a:rPr lang="en-US" altLang="ko-KR" baseline="0" dirty="0" smtClean="0"/>
+              <a:t>, chemical compounds, protein targets, diseases, side-effects </a:t>
+            </a:r>
+            <a:r>
+              <a:rPr lang="ko-KR" altLang="en-US" baseline="0" dirty="0" smtClean="0"/>
+              <a:t>그리고 </a:t>
+            </a:r>
+            <a:r>
+              <a:rPr lang="en-US" altLang="ko-KR" baseline="0" dirty="0" smtClean="0"/>
+              <a:t>pathways</a:t>
+            </a:r>
+            <a:r>
+              <a:rPr lang="ko-KR" altLang="en-US" baseline="0" dirty="0" smtClean="0"/>
+              <a:t>등을 포함하고 있는</a:t>
+            </a:r>
+            <a:endParaRPr lang="en-US" altLang="ko-KR" dirty="0" smtClean="0"/>
+          </a:p>
+          <a:p>
+            <a:r>
+              <a:rPr lang="en-US" altLang="ko-KR" dirty="0" smtClean="0"/>
+              <a:t>Semantic</a:t>
+            </a:r>
+            <a:r>
+              <a:rPr lang="en-US" altLang="ko-KR" baseline="0" dirty="0" smtClean="0"/>
+              <a:t> linked networks </a:t>
+            </a:r>
+            <a:r>
+              <a:rPr lang="ko-KR" altLang="en-US" baseline="0" dirty="0" smtClean="0"/>
+              <a:t>로부터 </a:t>
+            </a:r>
+            <a:r>
+              <a:rPr lang="en-US" altLang="ko-KR" dirty="0" smtClean="0"/>
+              <a:t>Drug-target associations</a:t>
+            </a:r>
+            <a:r>
+              <a:rPr lang="ko-KR" altLang="en-US" dirty="0" smtClean="0"/>
+              <a:t>을 결정</a:t>
+            </a:r>
+            <a:r>
+              <a:rPr lang="ko-KR" altLang="en-US" baseline="0" dirty="0" smtClean="0"/>
+              <a:t>할 수 있는 </a:t>
+            </a:r>
+            <a:r>
+              <a:rPr lang="ko-KR" altLang="en-US" dirty="0" smtClean="0"/>
+              <a:t>통계적 모델을 만들었다</a:t>
+            </a:r>
+            <a:r>
+              <a:rPr lang="en-US" altLang="ko-KR" dirty="0" smtClean="0"/>
+              <a:t>.</a:t>
+            </a:r>
+          </a:p>
+          <a:p>
+            <a:endParaRPr lang="en-US" altLang="ko-KR" baseline="0" dirty="0" smtClean="0"/>
+          </a:p>
+          <a:p>
+            <a:r>
+              <a:rPr lang="ko-KR" altLang="en-US" baseline="0" dirty="0" smtClean="0"/>
+              <a:t>이 통계적 모델은 </a:t>
+            </a:r>
+            <a:r>
+              <a:rPr lang="en-US" altLang="ko-KR" baseline="0" dirty="0" smtClean="0"/>
+              <a:t>drug</a:t>
+            </a:r>
+            <a:r>
+              <a:rPr lang="ko-KR" altLang="en-US" baseline="0" dirty="0" smtClean="0"/>
+              <a:t>와 </a:t>
+            </a:r>
+            <a:r>
+              <a:rPr lang="en-US" altLang="ko-KR" baseline="0" dirty="0" smtClean="0"/>
+              <a:t>disease </a:t>
+            </a:r>
+            <a:r>
+              <a:rPr lang="ko-KR" altLang="en-US" baseline="0" dirty="0" smtClean="0"/>
+              <a:t>사이의  부분그래프의 의미를 고려하여</a:t>
             </a:r>
             <a:r>
               <a:rPr lang="en-US" altLang="ko-KR" baseline="0" dirty="0" smtClean="0"/>
@@ -3095,58 +3402,38 @@
             </a:r>
           </a:p>
           <a:p>
-            <a:endParaRPr lang="en-US" altLang="ko-KR" baseline="0" dirty="0" smtClean="0"/>
-          </a:p>
-          <a:p>
-            <a:r>
-              <a:rPr lang="en-US" altLang="ko-KR" baseline="0" dirty="0" smtClean="0"/>
-              <a:t>Drug repositioning</a:t>
-            </a:r>
-            <a:r>
-              <a:rPr lang="ko-KR" altLang="en-US" baseline="0" dirty="0" smtClean="0"/>
-              <a:t>의 궁극적인 목표는</a:t>
-            </a:r>
-            <a:endParaRPr lang="en-US" altLang="ko-KR" baseline="0" dirty="0" smtClean="0"/>
-          </a:p>
-          <a:p>
-            <a:r>
-              <a:rPr lang="ko-KR" altLang="en-US" baseline="0" dirty="0" smtClean="0"/>
-              <a:t>이러한 예상들을 실제로 적용시켜 환자에게 이익을 제공하도록 </a:t>
+            <a:r>
+              <a:rPr lang="ko-KR" altLang="en-US" baseline="0" dirty="0" smtClean="0"/>
+              <a:t>다른 질병으로부터 나온 비슷한 </a:t>
+            </a:r>
+            <a:r>
+              <a:rPr lang="en-US" altLang="ko-KR" baseline="0" dirty="0" smtClean="0"/>
+              <a:t>drug-drug pair</a:t>
+            </a:r>
+            <a:r>
+              <a:rPr lang="ko-KR" altLang="en-US" baseline="0" dirty="0" smtClean="0"/>
+              <a:t>에게</a:t>
+            </a:r>
+            <a:r>
+              <a:rPr lang="en-US" altLang="ko-KR" baseline="0" dirty="0" smtClean="0"/>
+              <a:t> </a:t>
             </a:r>
             <a:r>
               <a:rPr lang="ko-KR" altLang="en-US" baseline="0" dirty="0" err="1" smtClean="0"/>
-              <a:t>하는것이며</a:t>
-            </a:r>
-            <a:r>
-              <a:rPr lang="en-US" altLang="ko-KR" baseline="0" dirty="0" smtClean="0"/>
-              <a:t>,</a:t>
-            </a:r>
-          </a:p>
-          <a:p>
-            <a:endParaRPr lang="en-US" altLang="ko-KR" baseline="0" dirty="0" smtClean="0"/>
-          </a:p>
-          <a:p>
-            <a:r>
-              <a:rPr lang="ko-KR" altLang="en-US" baseline="0" dirty="0" err="1" smtClean="0"/>
-              <a:t>그러기때문에</a:t>
-            </a:r>
-            <a:r>
-              <a:rPr lang="ko-KR" altLang="en-US" baseline="0" dirty="0" smtClean="0"/>
-              <a:t> </a:t>
-            </a:r>
-            <a:r>
-              <a:rPr lang="en-US" altLang="ko-KR" baseline="0" dirty="0" smtClean="0"/>
-              <a:t>validation</a:t>
-            </a:r>
-            <a:r>
-              <a:rPr lang="ko-KR" altLang="en-US" baseline="0" dirty="0" smtClean="0"/>
-              <a:t>이라는 과정은 중요할 수 밖에 없다</a:t>
+              <a:t>리포지셔닝의</a:t>
+            </a:r>
+            <a:r>
+              <a:rPr lang="ko-KR" altLang="en-US" baseline="0" dirty="0" smtClean="0"/>
+              <a:t> 기회를 부여한다</a:t>
             </a:r>
             <a:r>
               <a:rPr lang="en-US" altLang="ko-KR" baseline="0" dirty="0" smtClean="0"/>
               <a:t>.</a:t>
             </a:r>
           </a:p>
+          <a:p>
+            <a:endParaRPr lang="ko-KR" altLang="en-US" dirty="0"/>
+          </a:p>
         </p:txBody>
       </p:sp>
       <p:sp>
@@ -3166,7 +3453,7 @@
           <a:p>
             <a:fld id="{CDFAA85D-13B5-4E8D-B933-74E9D559D487}" type="slidenum">
               <a:rPr lang="ko-KR" altLang="en-US" smtClean="0"/>
-              <a:t>9</a:t>
+              <a:t>8</a:t>
             </a:fld>
             <a:endParaRPr lang="ko-KR" altLang="en-US"/>
           </a:p>
@@ -3175,7 +3462,7 @@
     </p:spTree>
     <p:extLst>
       <p:ext uri="{BB962C8B-B14F-4D97-AF65-F5344CB8AC3E}">
-        <p14:creationId xmlns:p14="http://schemas.microsoft.com/office/powerpoint/2010/main" val="1211339571"/>
+        <p14:creationId xmlns:p14="http://schemas.microsoft.com/office/powerpoint/2010/main" val="960263475"/>
       </p:ext>
     </p:extLst>
   </p:cSld>
@@ -3230,136 +3517,90 @@
           <a:lstStyle/>
           <a:p>
             <a:r>
-              <a:rPr lang="en-US" altLang="ko-KR" dirty="0" err="1" smtClean="0"/>
-              <a:t>Zerbini</a:t>
-            </a:r>
-            <a:r>
-              <a:rPr lang="ko-KR" altLang="en-US" dirty="0" smtClean="0"/>
-              <a:t>는 </a:t>
-            </a:r>
-            <a:r>
-              <a:rPr lang="en-US" altLang="ko-KR" dirty="0" smtClean="0"/>
-              <a:t>FDA</a:t>
-            </a:r>
-            <a:r>
-              <a:rPr lang="ko-KR" altLang="en-US" dirty="0" smtClean="0"/>
-              <a:t>에 승인된 몇몇 약들이 </a:t>
-            </a:r>
-            <a:r>
-              <a:rPr lang="en-US" altLang="ko-KR" dirty="0" err="1" smtClean="0"/>
-              <a:t>ccRCC</a:t>
-            </a:r>
-            <a:r>
-              <a:rPr lang="en-US" altLang="ko-KR" dirty="0" smtClean="0"/>
+              <a:rPr lang="en-US" altLang="ko-KR" dirty="0" smtClean="0"/>
+              <a:t>Computational</a:t>
+            </a:r>
+            <a:r>
+              <a:rPr lang="en-US" altLang="ko-KR" baseline="0" dirty="0" smtClean="0"/>
+              <a:t> </a:t>
+            </a:r>
+            <a:r>
+              <a:rPr lang="en-US" altLang="ko-KR" baseline="0" dirty="0" smtClean="0"/>
+              <a:t>model</a:t>
+            </a:r>
+            <a:r>
+              <a:rPr lang="ko-KR" altLang="en-US" baseline="0" dirty="0" smtClean="0"/>
+              <a:t>은 </a:t>
+            </a:r>
+            <a:r>
+              <a:rPr lang="ko-KR" altLang="en-US" baseline="0" dirty="0" smtClean="0"/>
+              <a:t>종종 흥미로운 결과를 내긴 하지만</a:t>
+            </a:r>
+            <a:r>
+              <a:rPr lang="en-US" altLang="ko-KR" baseline="0" dirty="0" smtClean="0"/>
               <a:t>,</a:t>
             </a:r>
-            <a:r>
-              <a:rPr lang="en-US" altLang="ko-KR" baseline="0" dirty="0" smtClean="0"/>
+            <a:endParaRPr lang="en-US" altLang="ko-KR" baseline="0" dirty="0" smtClean="0"/>
+          </a:p>
+          <a:p>
+            <a:endParaRPr lang="en-US" altLang="ko-KR" baseline="0" dirty="0" smtClean="0"/>
+          </a:p>
+          <a:p>
+            <a:r>
+              <a:rPr lang="en-US" altLang="ko-KR" baseline="0" dirty="0" smtClean="0"/>
+              <a:t>Drug repositioning</a:t>
+            </a:r>
+            <a:r>
+              <a:rPr lang="ko-KR" altLang="en-US" baseline="0" dirty="0" smtClean="0"/>
+              <a:t>의 궁극적인 목표는</a:t>
+            </a:r>
+            <a:endParaRPr lang="en-US" altLang="ko-KR" baseline="0" dirty="0" smtClean="0"/>
+          </a:p>
+          <a:p>
+            <a:r>
+              <a:rPr lang="ko-KR" altLang="en-US" baseline="0" dirty="0" smtClean="0"/>
+              <a:t>이러한 </a:t>
+            </a:r>
+            <a:r>
+              <a:rPr lang="ko-KR" altLang="en-US" baseline="0" dirty="0" smtClean="0"/>
+              <a:t>결과들을 </a:t>
+            </a:r>
+            <a:r>
+              <a:rPr lang="ko-KR" altLang="en-US" baseline="0" dirty="0" smtClean="0"/>
+              <a:t>실제로 적용시켜 환자에게 이익을 제공하도록 </a:t>
+            </a:r>
+            <a:r>
+              <a:rPr lang="ko-KR" altLang="en-US" baseline="0" dirty="0" err="1" smtClean="0"/>
+              <a:t>하는것이기</a:t>
+            </a:r>
+            <a:r>
+              <a:rPr lang="ko-KR" altLang="en-US" baseline="0" dirty="0" smtClean="0"/>
               <a:t> </a:t>
             </a:r>
             <a:r>
-              <a:rPr lang="ko-KR" altLang="en-US" baseline="0" dirty="0" smtClean="0"/>
-              <a:t>신장암세포에 민감한 것을 발견했습니다</a:t>
+              <a:rPr lang="ko-KR" altLang="en-US" baseline="0" dirty="0" err="1" smtClean="0"/>
+              <a:t>떄문에</a:t>
+            </a:r>
+            <a:r>
+              <a:rPr lang="en-US" altLang="ko-KR" baseline="0" dirty="0" smtClean="0"/>
+              <a:t>,</a:t>
+            </a:r>
+            <a:endParaRPr lang="en-US" altLang="ko-KR" baseline="0" dirty="0" smtClean="0"/>
+          </a:p>
+          <a:p>
+            <a:r>
+              <a:rPr lang="en-US" altLang="ko-KR" baseline="0" dirty="0" smtClean="0"/>
+              <a:t>validation</a:t>
+            </a:r>
+            <a:r>
+              <a:rPr lang="ko-KR" altLang="en-US" baseline="0" dirty="0" smtClean="0"/>
+              <a:t>이라는 과정은 중요할 수 밖에 없다</a:t>
             </a:r>
             <a:r>
               <a:rPr lang="en-US" altLang="ko-KR" baseline="0" dirty="0" smtClean="0"/>
               <a:t>.</a:t>
             </a:r>
           </a:p>
-          <a:p>
-            <a:r>
-              <a:rPr lang="ko-KR" altLang="en-US" baseline="0" dirty="0" smtClean="0"/>
-              <a:t>이 약의 효과를 증명하기 위해</a:t>
-            </a:r>
-            <a:r>
-              <a:rPr lang="en-US" altLang="ko-KR" baseline="0" dirty="0" smtClean="0"/>
-              <a:t>, </a:t>
-            </a:r>
-            <a:r>
-              <a:rPr lang="ko-KR" altLang="en-US" baseline="0" dirty="0" smtClean="0"/>
-              <a:t>세포자살에 관한 에세이와</a:t>
-            </a:r>
-            <a:r>
-              <a:rPr lang="en-US" altLang="ko-KR" baseline="0" dirty="0" smtClean="0"/>
-              <a:t>, </a:t>
-            </a:r>
-            <a:r>
-              <a:rPr lang="ko-KR" altLang="en-US" baseline="0" dirty="0" smtClean="0"/>
-              <a:t>이종이식 </a:t>
-            </a:r>
-            <a:r>
-              <a:rPr lang="en-US" altLang="ko-KR" baseline="0" dirty="0" smtClean="0"/>
-              <a:t>mouse models</a:t>
-            </a:r>
-            <a:r>
-              <a:rPr lang="ko-KR" altLang="en-US" baseline="0" dirty="0" smtClean="0"/>
-              <a:t>를 사용하였고</a:t>
-            </a:r>
-            <a:r>
-              <a:rPr lang="en-US" altLang="ko-KR" baseline="0" dirty="0" smtClean="0"/>
-              <a:t>,</a:t>
-            </a:r>
-          </a:p>
-          <a:p>
-            <a:r>
-              <a:rPr lang="en-US" altLang="ko-KR" baseline="0" dirty="0" err="1" smtClean="0"/>
-              <a:t>Pentamidine</a:t>
-            </a:r>
-            <a:r>
-              <a:rPr lang="ko-KR" altLang="en-US" baseline="0" dirty="0" smtClean="0"/>
-              <a:t>이 </a:t>
-            </a:r>
-            <a:r>
-              <a:rPr lang="en-US" altLang="ko-KR" baseline="0" dirty="0" err="1" smtClean="0"/>
-              <a:t>ccRCC</a:t>
-            </a:r>
-            <a:r>
-              <a:rPr lang="ko-KR" altLang="en-US" baseline="0" dirty="0" smtClean="0"/>
-              <a:t>에 대해 잠재적 치료 </a:t>
-            </a:r>
-            <a:r>
-              <a:rPr lang="en-US" altLang="ko-KR" baseline="0" dirty="0" smtClean="0"/>
-              <a:t>agent </a:t>
-            </a:r>
-            <a:r>
-              <a:rPr lang="ko-KR" altLang="en-US" baseline="0" dirty="0" smtClean="0"/>
-              <a:t>임을 보였습니다</a:t>
-            </a:r>
-            <a:r>
-              <a:rPr lang="en-US" altLang="ko-KR" baseline="0" dirty="0" smtClean="0"/>
-              <a:t>.</a:t>
-            </a:r>
-          </a:p>
-          <a:p>
-            <a:r>
-              <a:rPr lang="en-US" altLang="ko-KR" baseline="0" dirty="0" err="1" smtClean="0"/>
-              <a:t>Pentamidine</a:t>
-            </a:r>
-            <a:r>
-              <a:rPr lang="ko-KR" altLang="en-US" baseline="0" dirty="0" smtClean="0"/>
-              <a:t>은 </a:t>
-            </a:r>
-            <a:r>
-              <a:rPr lang="en-US" altLang="ko-KR" baseline="0" dirty="0" err="1" smtClean="0"/>
-              <a:t>ccRCC</a:t>
-            </a:r>
-            <a:r>
-              <a:rPr lang="ko-KR" altLang="en-US" baseline="0" dirty="0" smtClean="0"/>
-              <a:t>의 종양을 세포 자살로 유도하고</a:t>
-            </a:r>
-            <a:r>
-              <a:rPr lang="en-US" altLang="ko-KR" baseline="0" dirty="0" smtClean="0"/>
-              <a:t>, </a:t>
-            </a:r>
-            <a:r>
-              <a:rPr lang="ko-KR" altLang="en-US" baseline="0" dirty="0" smtClean="0"/>
-              <a:t>종양의 성장을 늦춘다고 한다</a:t>
-            </a:r>
-            <a:r>
-              <a:rPr lang="en-US" altLang="ko-KR" baseline="0" dirty="0" smtClean="0"/>
-              <a:t>.</a:t>
-            </a:r>
-          </a:p>
         </p:txBody>
       </p:sp>
       <p:sp>
@@ -3379,7 +3620,7 @@
           <a:p>
             <a:fld id="{CDFAA85D-13B5-4E8D-B933-74E9D559D487}" type="slidenum">
               <a:rPr lang="ko-KR" altLang="en-US" smtClean="0"/>
-              <a:t>10</a:t>
+              <a:t>9</a:t>
             </a:fld>
             <a:endParaRPr lang="ko-KR" altLang="en-US"/>
           </a:p>
@@ -3388,7 +3629,7 @@
     </p:spTree>
     <p:extLst>
       <p:ext uri="{BB962C8B-B14F-4D97-AF65-F5344CB8AC3E}">
-        <p14:creationId xmlns:p14="http://schemas.microsoft.com/office/powerpoint/2010/main" val="1433889537"/>
+        <p14:creationId xmlns:p14="http://schemas.microsoft.com/office/powerpoint/2010/main" val="1211339571"/>
       </p:ext>
     </p:extLst>
   </p:cSld>
@@ -6300,88 +6541,92 @@
         <p:spPr/>
         <p:txBody>
           <a:bodyPr>
-            <a:normAutofit fontScale="85000" lnSpcReduction="20000"/>
+            <a:normAutofit fontScale="92500"/>
           </a:bodyPr>
           <a:lstStyle/>
           <a:p>
             <a:pPr algn="r"/>
             <a:r>
-              <a:rPr lang="en-US" altLang="ko-KR" dirty="0" smtClean="0">
+              <a:rPr lang="en-US" altLang="ko-KR" sz="2100" dirty="0" smtClean="0">
                 <a:latin typeface="Adobe 고딕 Std B" panose="020B0800000000000000" pitchFamily="34" charset="-127"/>
                 <a:ea typeface="Adobe 고딕 Std B" panose="020B0800000000000000" pitchFamily="34" charset="-127"/>
               </a:rPr>
               <a:t>Jiao Li, Si </a:t>
             </a:r>
             <a:r>
-              <a:rPr lang="en-US" altLang="ko-KR" dirty="0" err="1" smtClean="0">
+              <a:rPr lang="en-US" altLang="ko-KR" sz="2100" dirty="0" err="1" smtClean="0">
                 <a:latin typeface="Adobe 고딕 Std B" panose="020B0800000000000000" pitchFamily="34" charset="-127"/>
                 <a:ea typeface="Adobe 고딕 Std B" panose="020B0800000000000000" pitchFamily="34" charset="-127"/>
               </a:rPr>
               <a:t>Zheng</a:t>
             </a:r>
             <a:r>
-              <a:rPr lang="en-US" altLang="ko-KR" dirty="0" smtClean="0">
+              <a:rPr lang="en-US" altLang="ko-KR" sz="2100" dirty="0" smtClean="0">
                 <a:latin typeface="Adobe 고딕 Std B" panose="020B0800000000000000" pitchFamily="34" charset="-127"/>
                 <a:ea typeface="Adobe 고딕 Std B" panose="020B0800000000000000" pitchFamily="34" charset="-127"/>
               </a:rPr>
               <a:t>, Bin Chen, </a:t>
             </a:r>
             <a:r>
-              <a:rPr lang="en-US" altLang="ko-KR" dirty="0" err="1" smtClean="0">
+              <a:rPr lang="en-US" altLang="ko-KR" sz="2100" dirty="0" err="1" smtClean="0">
                 <a:latin typeface="Adobe 고딕 Std B" panose="020B0800000000000000" pitchFamily="34" charset="-127"/>
                 <a:ea typeface="Adobe 고딕 Std B" panose="020B0800000000000000" pitchFamily="34" charset="-127"/>
               </a:rPr>
               <a:t>Atul</a:t>
             </a:r>
             <a:r>
-              <a:rPr lang="en-US" altLang="ko-KR" dirty="0" smtClean="0">
+              <a:rPr lang="en-US" altLang="ko-KR" sz="2100" dirty="0" smtClean="0">
                 <a:latin typeface="Adobe 고딕 Std B" panose="020B0800000000000000" pitchFamily="34" charset="-127"/>
                 <a:ea typeface="Adobe 고딕 Std B" panose="020B0800000000000000" pitchFamily="34" charset="-127"/>
               </a:rPr>
               <a:t> </a:t>
             </a:r>
             <a:r>
-              <a:rPr lang="en-US" altLang="ko-KR" dirty="0" err="1" smtClean="0">
+              <a:rPr lang="en-US" altLang="ko-KR" sz="2100" dirty="0" err="1" smtClean="0">
                 <a:latin typeface="Adobe 고딕 Std B" panose="020B0800000000000000" pitchFamily="34" charset="-127"/>
                 <a:ea typeface="Adobe 고딕 Std B" panose="020B0800000000000000" pitchFamily="34" charset="-127"/>
               </a:rPr>
               <a:t>j.Butte</a:t>
             </a:r>
             <a:r>
-              <a:rPr lang="en-US" altLang="ko-KR" dirty="0" smtClean="0">
+              <a:rPr lang="en-US" altLang="ko-KR" sz="2100" dirty="0" smtClean="0">
                 <a:latin typeface="Adobe 고딕 Std B" panose="020B0800000000000000" pitchFamily="34" charset="-127"/>
                 <a:ea typeface="Adobe 고딕 Std B" panose="020B0800000000000000" pitchFamily="34" charset="-127"/>
               </a:rPr>
               <a:t>, S. Joshua </a:t>
             </a:r>
             <a:r>
-              <a:rPr lang="en-US" altLang="ko-KR" dirty="0" err="1" smtClean="0">
+              <a:rPr lang="en-US" altLang="ko-KR" sz="2100" dirty="0" err="1" smtClean="0">
                 <a:latin typeface="Adobe 고딕 Std B" panose="020B0800000000000000" pitchFamily="34" charset="-127"/>
                 <a:ea typeface="Adobe 고딕 Std B" panose="020B0800000000000000" pitchFamily="34" charset="-127"/>
               </a:rPr>
               <a:t>Swamidass</a:t>
             </a:r>
             <a:r>
-              <a:rPr lang="en-US" altLang="ko-KR" dirty="0" smtClean="0">
+              <a:rPr lang="en-US" altLang="ko-KR" sz="2100" dirty="0" smtClean="0">
                 <a:latin typeface="Adobe 고딕 Std B" panose="020B0800000000000000" pitchFamily="34" charset="-127"/>
                 <a:ea typeface="Adobe 고딕 Std B" panose="020B0800000000000000" pitchFamily="34" charset="-127"/>
               </a:rPr>
               <a:t> and </a:t>
             </a:r>
             <a:r>
-              <a:rPr lang="en-US" altLang="ko-KR" dirty="0" err="1" smtClean="0">
+              <a:rPr lang="en-US" altLang="ko-KR" sz="2100" dirty="0" err="1" smtClean="0">
                 <a:latin typeface="Adobe 고딕 Std B" panose="020B0800000000000000" pitchFamily="34" charset="-127"/>
                 <a:ea typeface="Adobe 고딕 Std B" panose="020B0800000000000000" pitchFamily="34" charset="-127"/>
               </a:rPr>
               <a:t>Zhiyoung</a:t>
             </a:r>
             <a:r>
-              <a:rPr lang="en-US" altLang="ko-KR" dirty="0" smtClean="0">
+              <a:rPr lang="en-US" altLang="ko-KR" sz="2100" dirty="0" smtClean="0">
                 <a:latin typeface="Adobe 고딕 Std B" panose="020B0800000000000000" pitchFamily="34" charset="-127"/>
                 <a:ea typeface="Adobe 고딕 Std B" panose="020B0800000000000000" pitchFamily="34" charset="-127"/>
               </a:rPr>
               <a:t> Lu</a:t>
             </a:r>
+            <a:endParaRPr lang="en-US" altLang="ko-KR" dirty="0" smtClean="0">
+              <a:latin typeface="Adobe 고딕 Std B" panose="020B0800000000000000" pitchFamily="34" charset="-127"/>
+              <a:ea typeface="Adobe 고딕 Std B" panose="020B0800000000000000" pitchFamily="34" charset="-127"/>
+            </a:endParaRPr>
           </a:p>
           <a:p>
             <a:pPr algn="r"/>
@@ -6407,7 +6652,7 @@
                 <a:latin typeface="Adobe 고딕 Std B" panose="020B0800000000000000" pitchFamily="34" charset="-127"/>
                 <a:ea typeface="Adobe 고딕 Std B" panose="020B0800000000000000" pitchFamily="34" charset="-127"/>
               </a:rPr>
-              <a:t>16-07-06</a:t>
+              <a:t>16-07-07</a:t>
             </a:r>
             <a:endParaRPr lang="ko-KR" altLang="en-US" dirty="0">
               <a:latin typeface="Adobe 고딕 Std B" panose="020B0800000000000000" pitchFamily="34" charset="-127"/>
@@ -6416,6 +6661,37 @@
           </a:p>
         </p:txBody>
       </p:sp>
+      <p:cxnSp>
+        <p:nvCxnSpPr>
+          <p:cNvPr id="5" name="직선 연결선 4"/>
+          <p:cNvCxnSpPr/>
+          <p:nvPr/>
+        </p:nvCxnSpPr>
+        <p:spPr>
+          <a:xfrm flipH="1">
+            <a:off x="9134475" y="4429919"/>
+            <a:ext cx="1450977" cy="0"/>
+          </a:xfrm>
+          <a:prstGeom prst="line">
+            <a:avLst/>
+          </a:prstGeom>
+          <a:ln/>
+        </p:spPr>
+        <p:style>
+          <a:lnRef idx="3">
+            <a:schemeClr val="dk1"/>
+          </a:lnRef>
+          <a:fillRef idx="0">
+            <a:schemeClr val="dk1"/>
+          </a:fillRef>
+          <a:effectRef idx="2">
+            <a:schemeClr val="dk1"/>
+          </a:effectRef>
+          <a:fontRef idx="minor">
+            <a:schemeClr val="tx1"/>
+          </a:fontRef>
+        </p:style>
+      </p:cxnSp>
     </p:spTree>
     <p:extLst>
       <p:ext uri="{BB962C8B-B14F-4D97-AF65-F5344CB8AC3E}">
@@ -6535,7 +6811,6 @@
               <a:rPr lang="en-US" altLang="ko-KR" dirty="0" smtClean="0"/>
               <a:t>). </a:t>
             </a:r>
-            <a:endParaRPr lang="en-US" altLang="ko-KR" dirty="0" smtClean="0"/>
           </a:p>
           <a:p>
             <a:pPr marL="457200" lvl="1" indent="0">
@@ -6549,15 +6824,7 @@
             </a:pPr>
             <a:r>
               <a:rPr lang="en-US" altLang="ko-KR" dirty="0" smtClean="0"/>
-              <a:t>For validation, </a:t>
-            </a:r>
-            <a:r>
-              <a:rPr lang="en-US" altLang="ko-KR" dirty="0" smtClean="0"/>
-              <a:t>using </a:t>
-            </a:r>
-            <a:r>
-              <a:rPr lang="en-US" altLang="ko-KR" dirty="0" smtClean="0"/>
-              <a:t>apoptosis assays and </a:t>
+              <a:t>For validation, using apoptosis assays and </a:t>
             </a:r>
             <a:r>
               <a:rPr lang="en-US" altLang="ko-KR" dirty="0" err="1" smtClean="0"/>
@@ -6573,7 +6840,22 @@
             </a:r>
             <a:r>
               <a:rPr lang="en-US" altLang="ko-KR" dirty="0" smtClean="0"/>
-              <a:t>models and demonstrated </a:t>
+              <a:t>models</a:t>
+            </a:r>
+          </a:p>
+          <a:p>
+            <a:pPr marL="457200" lvl="1" indent="0">
+              <a:buNone/>
+            </a:pPr>
+            <a:endParaRPr lang="en-US" altLang="ko-KR" dirty="0"/>
+          </a:p>
+          <a:p>
+            <a:pPr marL="457200" lvl="1" indent="0">
+              <a:buNone/>
+            </a:pPr>
+            <a:r>
+              <a:rPr lang="en-US" altLang="ko-KR" dirty="0" smtClean="0"/>
+              <a:t>Demonstrated </a:t>
             </a:r>
             <a:r>
               <a:rPr lang="en-US" altLang="ko-KR" dirty="0" err="1" smtClean="0"/>
@@ -6581,15 +6863,7 @@
             </a:r>
             <a:r>
               <a:rPr lang="en-US" altLang="ko-KR" dirty="0" smtClean="0"/>
-              <a:t> as a </a:t>
-            </a:r>
-            <a:r>
-              <a:rPr lang="en-US" altLang="ko-KR" dirty="0" smtClean="0"/>
-              <a:t>potential therapeutic </a:t>
-            </a:r>
-            <a:r>
-              <a:rPr lang="en-US" altLang="ko-KR" dirty="0" smtClean="0"/>
-              <a:t>agent for </a:t>
+              <a:t> as a potential therapeutic agent for </a:t>
             </a:r>
             <a:r>
               <a:rPr lang="en-US" altLang="ko-KR" dirty="0" err="1" smtClean="0"/>
@@ -6597,11 +6871,7 @@
             </a:r>
             <a:r>
               <a:rPr lang="en-US" altLang="ko-KR" dirty="0" smtClean="0"/>
-              <a:t>, as it can </a:t>
-            </a:r>
-            <a:r>
-              <a:rPr lang="en-US" altLang="ko-KR" dirty="0" smtClean="0"/>
-              <a:t>induce</a:t>
+              <a:t>, as it can induce</a:t>
             </a:r>
             <a:r>
               <a:rPr lang="en-US" altLang="ko-KR" dirty="0"/>
@@ -6609,11 +6879,7 @@
             </a:r>
             <a:r>
               <a:rPr lang="en-US" altLang="ko-KR" dirty="0" smtClean="0"/>
-              <a:t>apoptosis </a:t>
-            </a:r>
-            <a:r>
-              <a:rPr lang="en-US" altLang="ko-KR" dirty="0" smtClean="0"/>
-              <a:t>in tumor cells and slow tumor growth. </a:t>
+              <a:t>apoptosis in tumor cells and slow tumor growth. </a:t>
             </a:r>
           </a:p>
           <a:p>
@@ -6706,15 +6972,7 @@
             </a:pPr>
             <a:r>
               <a:rPr lang="en-US" altLang="ko-KR" dirty="0" smtClean="0"/>
-              <a:t>Kang </a:t>
-            </a:r>
-            <a:r>
-              <a:rPr lang="en-US" altLang="ko-KR" dirty="0" smtClean="0"/>
-              <a:t>et </a:t>
-            </a:r>
-            <a:r>
-              <a:rPr lang="en-US" altLang="ko-KR" dirty="0" smtClean="0"/>
-              <a:t>al</a:t>
+              <a:t>Kang et al</a:t>
             </a:r>
           </a:p>
           <a:p>
@@ -6903,11 +7161,7 @@
             </a:r>
             <a:r>
               <a:rPr lang="en-US" altLang="ko-KR" dirty="0" smtClean="0"/>
-              <a:t> </a:t>
-            </a:r>
-            <a:r>
-              <a:rPr lang="en-US" altLang="ko-KR" dirty="0" smtClean="0"/>
-              <a:t>el al</a:t>
+              <a:t> el al</a:t>
             </a:r>
           </a:p>
           <a:p>
@@ -6951,15 +7205,23 @@
             </a:r>
             <a:r>
               <a:rPr lang="en-US" altLang="ko-KR" dirty="0" smtClean="0"/>
-              <a:t>Identified atorvastatin </a:t>
+              <a:t>Identified </a:t>
+            </a:r>
+            <a:r>
+              <a:rPr lang="en-US" altLang="ko-KR" dirty="0" smtClean="0"/>
+              <a:t>drug atorvastatin </a:t>
             </a:r>
             <a:r>
               <a:rPr lang="en-US" altLang="ko-KR" dirty="0"/>
-              <a:t>as a new therapeutic for organ </a:t>
-            </a:r>
-            <a:r>
-              <a:rPr lang="en-US" altLang="ko-KR" dirty="0" smtClean="0"/>
-              <a:t>	plantation, and </a:t>
+              <a:t>as a new therapeutic for </a:t>
+            </a:r>
+            <a:r>
+              <a:rPr lang="en-US" altLang="ko-KR" dirty="0" smtClean="0"/>
+              <a:t>	organ plantation</a:t>
+            </a:r>
+            <a:r>
+              <a:rPr lang="en-US" altLang="ko-KR" dirty="0" smtClean="0"/>
+              <a:t>, and </a:t>
             </a:r>
             <a:r>
               <a:rPr lang="en-US" altLang="ko-KR" dirty="0"/>
@@ -7086,12 +7348,12 @@
               <a:t>Integrative methods including drug chemical structures, drug side-effects, </a:t>
             </a:r>
             <a:r>
-              <a:rPr lang="en-US" altLang="ko-KR" dirty="0" err="1" smtClean="0"/>
-              <a:t>etc</a:t>
-            </a:r>
-            <a:r>
-              <a:rPr lang="en-US" altLang="ko-KR" dirty="0" smtClean="0"/>
-              <a:t> showed better performance in both sensitivity and specificity, comparing with individual methods.</a:t>
+              <a:rPr lang="en-US" altLang="ko-KR" dirty="0" smtClean="0"/>
+              <a:t>etc. </a:t>
+            </a:r>
+            <a:r>
+              <a:rPr lang="en-US" altLang="ko-KR" dirty="0" smtClean="0"/>
+              <a:t>showed better performance in both sensitivity and specificity, comparing with individual methods.</a:t>
             </a:r>
           </a:p>
         </p:txBody>
@@ -7340,7 +7602,6 @@
               <a:rPr lang="en-US" altLang="ko-KR" dirty="0"/>
               <a:t>in the biological systems can be modeled by networks.</a:t>
             </a:r>
-            <a:endParaRPr lang="en-US" altLang="ko-KR" dirty="0"/>
           </a:p>
           <a:p>
             <a:r>
@@ -7351,11 +7612,7 @@
           <a:p>
             <a:r>
               <a:rPr lang="en-US" altLang="ko-KR" sz="1100" dirty="0" smtClean="0"/>
-              <a:t>drug-target </a:t>
-            </a:r>
-            <a:r>
-              <a:rPr lang="en-US" altLang="ko-KR" sz="1100" dirty="0" smtClean="0"/>
-              <a:t>network</a:t>
+              <a:t>drug-target network</a:t>
             </a:r>
           </a:p>
           <a:p>
@@ -7483,7 +7740,15 @@
             </a:pPr>
             <a:r>
               <a:rPr lang="en-US" altLang="ko-KR" sz="1800" dirty="0" smtClean="0"/>
-              <a:t>Li developed a bipartite drug-target network to identity potential new indications of an existing drug through its relation to similar drugs.</a:t>
+              <a:t>Li developed a bipartite drug-target network to </a:t>
+            </a:r>
+            <a:r>
+              <a:rPr lang="en-US" altLang="ko-KR" sz="1800" dirty="0" smtClean="0"/>
+              <a:t>identify </a:t>
+            </a:r>
+            <a:r>
+              <a:rPr lang="en-US" altLang="ko-KR" sz="1800" dirty="0" smtClean="0"/>
+              <a:t>potential new indications of an existing drug through its relation to similar drugs.</a:t>
             </a:r>
           </a:p>
           <a:p>
@@ -7536,27 +7801,7 @@
             </a:pPr>
             <a:r>
               <a:rPr lang="en-US" altLang="ko-KR" sz="1800" dirty="0" smtClean="0"/>
-              <a:t>And, the </a:t>
-            </a:r>
-            <a:r>
-              <a:rPr lang="en-US" altLang="ko-KR" sz="1800" dirty="0" smtClean="0"/>
-              <a:t>transition likelihood of </a:t>
-            </a:r>
-            <a:r>
-              <a:rPr lang="en-US" altLang="ko-KR" sz="1800" dirty="0" smtClean="0"/>
-              <a:t>each chain </a:t>
-            </a:r>
-            <a:r>
-              <a:rPr lang="en-US" altLang="ko-KR" sz="1800" dirty="0" smtClean="0"/>
-              <a:t>is estimated on the basis of known drug–disease </a:t>
-            </a:r>
-            <a:r>
-              <a:rPr lang="en-US" altLang="ko-KR" sz="1800" dirty="0" smtClean="0"/>
-              <a:t>treatment association</a:t>
-            </a:r>
-            <a:r>
-              <a:rPr lang="en-US" altLang="ko-KR" sz="1800" dirty="0" smtClean="0"/>
-              <a:t>.</a:t>
+              <a:t>And, the transition likelihood of each chain is estimated on the basis of known drug–disease treatment association.</a:t>
             </a:r>
           </a:p>
           <a:p>
@@ -8241,11 +8486,7 @@
             </a:pPr>
             <a:r>
               <a:rPr lang="en-US" altLang="ko-KR" dirty="0" smtClean="0"/>
-              <a:t>	The model considered the topology and semantics of the </a:t>
-            </a:r>
-            <a:r>
-              <a:rPr lang="en-US" altLang="ko-KR" dirty="0" smtClean="0"/>
-              <a:t>	sub-graph.</a:t>
+              <a:t>	The model considered the topology and semantics of the 	sub-graph.</a:t>
             </a:r>
           </a:p>
           <a:p>
@@ -8264,43 +8505,7 @@
             </a:r>
             <a:r>
               <a:rPr lang="en-US" altLang="ko-KR" dirty="0" smtClean="0"/>
-              <a:t>The </a:t>
-            </a:r>
-            <a:r>
-              <a:rPr lang="en-US" altLang="ko-KR" dirty="0" smtClean="0"/>
-              <a:t>similar </a:t>
-            </a:r>
-            <a:r>
-              <a:rPr lang="en-US" altLang="ko-KR" dirty="0" smtClean="0"/>
-              <a:t>drug–drug </a:t>
-            </a:r>
-            <a:r>
-              <a:rPr lang="en-US" altLang="ko-KR" dirty="0" smtClean="0"/>
-              <a:t>pair from </a:t>
-            </a:r>
-            <a:r>
-              <a:rPr lang="en-US" altLang="ko-KR" dirty="0" smtClean="0"/>
-              <a:t>different</a:t>
-            </a:r>
-            <a:r>
-              <a:rPr lang="en-US" altLang="ko-KR" dirty="0" smtClean="0"/>
-              <a:t>	disease </a:t>
-            </a:r>
-            <a:r>
-              <a:rPr lang="en-US" altLang="ko-KR" dirty="0" smtClean="0"/>
-              <a:t>areas 	may indicate </a:t>
-            </a:r>
-            <a:r>
-              <a:rPr lang="en-US" altLang="ko-KR" dirty="0" smtClean="0"/>
-              <a:t>a potential repositioning </a:t>
-            </a:r>
-            <a:r>
-              <a:rPr lang="en-US" altLang="ko-KR" dirty="0" smtClean="0"/>
-              <a:t>opportunity</a:t>
-            </a:r>
-            <a:r>
-              <a:rPr lang="en-US" altLang="ko-KR" dirty="0" smtClean="0"/>
-              <a:t>.</a:t>
+              <a:t>The similar drug–drug pair from different	disease areas 	may indicate a potential repositioning opportunity.</a:t>
             </a:r>
             <a:endParaRPr lang="ko-KR" altLang="en-US" dirty="0"/>
           </a:p>
@@ -8385,13 +8590,8 @@
           <a:p>
             <a:r>
               <a:rPr lang="en-US" altLang="ko-KR" dirty="0" smtClean="0"/>
-              <a:t>Computational models often predict a handful interesting </a:t>
-            </a:r>
-            <a:r>
-              <a:rPr lang="en-US" altLang="ko-KR" dirty="0" smtClean="0"/>
-              <a:t>hits.</a:t>
-            </a:r>
-            <a:endParaRPr lang="en-US" altLang="ko-KR" dirty="0" smtClean="0"/>
+              <a:t>Computational models often predict a handful interesting hits.</a:t>
+            </a:r>
           </a:p>
           <a:p>
             <a:endParaRPr lang="en-US" altLang="ko-KR" dirty="0" smtClean="0"/>
@@ -8416,15 +8616,7 @@
           <a:p>
             <a:r>
               <a:rPr lang="en-US" altLang="ko-KR" dirty="0" smtClean="0"/>
-              <a:t>Therefore, experimental validation of these computer-generated hits </a:t>
-            </a:r>
-            <a:r>
-              <a:rPr lang="en-US" altLang="ko-KR" dirty="0" smtClean="0"/>
-              <a:t>becomes </a:t>
-            </a:r>
-            <a:r>
-              <a:rPr lang="en-US" altLang="ko-KR" dirty="0" smtClean="0"/>
-              <a:t>important. </a:t>
+              <a:t>Therefore, experimental validation of these computer-generated hits becomes important. </a:t>
             </a:r>
             <a:endParaRPr lang="ko-KR" altLang="en-US" dirty="0"/>
           </a:p>
@@ -8705,7 +8897,7 @@
   <a:extraClrSchemeLst/>
   <a:extLst>
     <a:ext uri="{05A4C25C-085E-4340-85A3-A5531E510DB2}">
-      <thm15:themeFamily xmlns:thm15="http://schemas.microsoft.com/office/thememl/2012/main" xmlns="" name="Office Theme" id="{62F939B6-93AF-4DB8-9C6B-D6C7DFDC589F}" vid="{4A3C46E8-61CC-4603-A589-7422A47A8E4A}"/>
+      <thm15:themeFamily xmlns:thm15="http://schemas.microsoft.com/office/thememl/2012/main" name="Office Theme" id="{62F939B6-93AF-4DB8-9C6B-D6C7DFDC589F}" vid="{4A3C46E8-61CC-4603-A589-7422A47A8E4A}"/>
     </a:ext>
   </a:extLst>
 </a:theme>

</xml_diff>